<commit_message>
drop logo in cheatsheet
</commit_message>
<xml_diff>
--- a/instructors/cheatsheet/GDCU2025_cheatsheet.pptx
+++ b/instructors/cheatsheet/GDCU2025_cheatsheet.pptx
@@ -2275,7 +2275,7 @@
           </a:ln>
           <a:extLst>
             <a:ext uri="{C572A759-6A51-4108-AA02-DFA0A04FC94B}">
-              <ma14:wrappingTextBoxFlag xmlns:ma14="http://schemas.microsoft.com/office/mac/drawingml/2011/main" xmlns:a14="http://schemas.microsoft.com/office/drawing/2010/main" xmlns:m="http://schemas.openxmlformats.org/officeDocument/2006/math" xmlns="" val="1"/>
+              <ma14:wrappingTextBoxFlag xmlns="" xmlns:m="http://schemas.openxmlformats.org/officeDocument/2006/math" xmlns:a14="http://schemas.microsoft.com/office/drawing/2010/main" xmlns:ma14="http://schemas.microsoft.com/office/mac/drawingml/2011/main" val="1"/>
             </a:ext>
           </a:extLst>
         </p:spPr>
@@ -2314,7 +2314,7 @@
           </a:ln>
           <a:extLst>
             <a:ext uri="{C572A759-6A51-4108-AA02-DFA0A04FC94B}">
-              <ma14:wrappingTextBoxFlag xmlns:ma14="http://schemas.microsoft.com/office/mac/drawingml/2011/main" xmlns:a14="http://schemas.microsoft.com/office/drawing/2010/main" xmlns:m="http://schemas.openxmlformats.org/officeDocument/2006/math" xmlns="" val="1"/>
+              <ma14:wrappingTextBoxFlag xmlns="" xmlns:m="http://schemas.openxmlformats.org/officeDocument/2006/math" xmlns:a14="http://schemas.microsoft.com/office/drawing/2010/main" xmlns:ma14="http://schemas.microsoft.com/office/mac/drawingml/2011/main" val="1"/>
             </a:ext>
           </a:extLst>
         </p:spPr>
@@ -3287,8 +3287,8 @@
         </p:nvSpPr>
         <p:spPr>
           <a:xfrm>
-            <a:off x="275721" y="361177"/>
-            <a:ext cx="12279932" cy="803346"/>
+            <a:off x="275720" y="361177"/>
+            <a:ext cx="13399781" cy="803346"/>
           </a:xfrm>
           <a:prstGeom prst="rect">
             <a:avLst/>
@@ -3301,7 +3301,7 @@
           <a:lstStyle/>
           <a:p>
             <a:r>
-              <a:rPr lang="en-US" sz="3600" dirty="0"/>
+              <a:rPr lang="en-US" sz="4000" dirty="0"/>
               <a:t>Geospatial Data Carpentry Workshop for Urbanism: : </a:t>
             </a:r>
             <a:r>
@@ -3340,7 +3340,7 @@
           </a:ln>
           <a:extLst>
             <a:ext uri="{C572A759-6A51-4108-AA02-DFA0A04FC94B}">
-              <ma14:wrappingTextBoxFlag xmlns:ma14="http://schemas.microsoft.com/office/mac/drawingml/2011/main" xmlns:a14="http://schemas.microsoft.com/office/drawing/2010/main" xmlns:m="http://schemas.openxmlformats.org/officeDocument/2006/math" xmlns="" val="1"/>
+              <ma14:wrappingTextBoxFlag xmlns="" xmlns:m="http://schemas.openxmlformats.org/officeDocument/2006/math" xmlns:a14="http://schemas.microsoft.com/office/drawing/2010/main" xmlns:ma14="http://schemas.microsoft.com/office/mac/drawingml/2011/main" val="1"/>
             </a:ext>
           </a:extLst>
         </p:spPr>
@@ -3466,10 +3466,10 @@
       </p:sp>
       <p:pic>
         <p:nvPicPr>
-          <p:cNvPr id="327" name="rstudio.png">
+          <p:cNvPr id="137" name="Picture 136" descr="A logo with colorful lines&#10;&#10;AI-generated content may be incorrect.">
             <a:extLst>
               <a:ext uri="{FF2B5EF4-FFF2-40B4-BE49-F238E27FC236}">
-                <a16:creationId xmlns:a16="http://schemas.microsoft.com/office/drawing/2014/main" id="{691BDA71-3F31-3049-2135-69A543970717}"/>
+                <a16:creationId xmlns:a16="http://schemas.microsoft.com/office/drawing/2014/main" id="{4D5A7432-B61A-5080-1914-C4FCCD8E46CF}"/>
               </a:ext>
             </a:extLst>
           </p:cNvPr>
@@ -3486,52 +3486,14 @@
               </a:ext>
             </a:extLst>
           </a:blip>
-          <a:srcRect/>
-          <a:stretch/>
-        </p:blipFill>
-        <p:spPr>
-          <a:xfrm>
-            <a:off x="12633597" y="200407"/>
-            <a:ext cx="1047744" cy="1206960"/>
-          </a:xfrm>
-          <a:prstGeom prst="rect">
-            <a:avLst/>
-          </a:prstGeom>
-          <a:ln w="12700">
-            <a:miter lim="400000"/>
-          </a:ln>
-        </p:spPr>
-      </p:pic>
-      <p:pic>
-        <p:nvPicPr>
-          <p:cNvPr id="137" name="Picture 136" descr="A logo with colorful lines&#10;&#10;AI-generated content may be incorrect.">
-            <a:extLst>
-              <a:ext uri="{FF2B5EF4-FFF2-40B4-BE49-F238E27FC236}">
-                <a16:creationId xmlns:a16="http://schemas.microsoft.com/office/drawing/2014/main" id="{4D5A7432-B61A-5080-1914-C4FCCD8E46CF}"/>
-              </a:ext>
-            </a:extLst>
-          </p:cNvPr>
-          <p:cNvPicPr>
-            <a:picLocks noChangeAspect="1"/>
-          </p:cNvPicPr>
-          <p:nvPr/>
-        </p:nvPicPr>
-        <p:blipFill>
-          <a:blip r:embed="rId8">
-            <a:extLst>
-              <a:ext uri="{28A0092B-C50C-407E-A947-70E740481C1C}">
-                <a14:useLocalDpi xmlns:a14="http://schemas.microsoft.com/office/drawing/2010/main" val="0"/>
-              </a:ext>
-            </a:extLst>
-          </a:blip>
           <a:stretch>
             <a:fillRect/>
           </a:stretch>
         </p:blipFill>
         <p:spPr>
           <a:xfrm>
-            <a:off x="401010" y="9716569"/>
-            <a:ext cx="1576277" cy="898164"/>
+            <a:off x="440200" y="9673495"/>
+            <a:ext cx="1804178" cy="1028022"/>
           </a:xfrm>
           <a:prstGeom prst="rect">
             <a:avLst/>
@@ -3563,7 +3525,7 @@
           </a:ln>
           <a:extLst>
             <a:ext uri="{C572A759-6A51-4108-AA02-DFA0A04FC94B}">
-              <ma14:wrappingTextBoxFlag xmlns="" xmlns:m="http://schemas.openxmlformats.org/officeDocument/2006/math" xmlns:a14="http://schemas.microsoft.com/office/drawing/2010/main" xmlns:ma14="http://schemas.microsoft.com/office/mac/drawingml/2011/main" val="1"/>
+              <ma14:wrappingTextBoxFlag xmlns:ma14="http://schemas.microsoft.com/office/mac/drawingml/2011/main" xmlns:a14="http://schemas.microsoft.com/office/drawing/2010/main" xmlns:m="http://schemas.openxmlformats.org/officeDocument/2006/math" xmlns="" val="1"/>
             </a:ext>
           </a:extLst>
         </p:spPr>
@@ -3725,7 +3687,7 @@
           <p:nvPr/>
         </p:nvPicPr>
         <p:blipFill>
-          <a:blip r:embed="rId9">
+          <a:blip r:embed="rId8">
             <a:extLst>
               <a:ext uri="{28A0092B-C50C-407E-A947-70E740481C1C}">
                 <a14:useLocalDpi xmlns:a14="http://schemas.microsoft.com/office/drawing/2010/main" val="0"/>
@@ -3773,7 +3735,7 @@
           </a:ln>
           <a:extLst>
             <a:ext uri="{C572A759-6A51-4108-AA02-DFA0A04FC94B}">
-              <ma14:wrappingTextBoxFlag xmlns="" xmlns:m="http://schemas.openxmlformats.org/officeDocument/2006/math" xmlns:a14="http://schemas.microsoft.com/office/drawing/2010/main" xmlns:ma14="http://schemas.microsoft.com/office/mac/drawingml/2011/main" val="1"/>
+              <ma14:wrappingTextBoxFlag xmlns:ma14="http://schemas.microsoft.com/office/mac/drawingml/2011/main" xmlns:a14="http://schemas.microsoft.com/office/drawing/2010/main" xmlns:m="http://schemas.openxmlformats.org/officeDocument/2006/math" xmlns="" val="1"/>
             </a:ext>
           </a:extLst>
         </p:spPr>
@@ -3877,7 +3839,7 @@
           </a:ln>
           <a:extLst>
             <a:ext uri="{C572A759-6A51-4108-AA02-DFA0A04FC94B}">
-              <ma14:wrappingTextBoxFlag xmlns="" xmlns:m="http://schemas.openxmlformats.org/officeDocument/2006/math" xmlns:a14="http://schemas.microsoft.com/office/drawing/2010/main" xmlns:ma14="http://schemas.microsoft.com/office/mac/drawingml/2011/main" val="1"/>
+              <ma14:wrappingTextBoxFlag xmlns:ma14="http://schemas.microsoft.com/office/mac/drawingml/2011/main" xmlns:a14="http://schemas.microsoft.com/office/drawing/2010/main" xmlns:m="http://schemas.openxmlformats.org/officeDocument/2006/math" xmlns="" val="1"/>
             </a:ext>
           </a:extLst>
         </p:spPr>
@@ -3981,7 +3943,7 @@
           </a:ln>
           <a:extLst>
             <a:ext uri="{C572A759-6A51-4108-AA02-DFA0A04FC94B}">
-              <ma14:wrappingTextBoxFlag xmlns="" xmlns:m="http://schemas.openxmlformats.org/officeDocument/2006/math" xmlns:a14="http://schemas.microsoft.com/office/drawing/2010/main" xmlns:ma14="http://schemas.microsoft.com/office/mac/drawingml/2011/main" val="1"/>
+              <ma14:wrappingTextBoxFlag xmlns:ma14="http://schemas.microsoft.com/office/mac/drawingml/2011/main" xmlns:a14="http://schemas.microsoft.com/office/drawing/2010/main" xmlns:m="http://schemas.openxmlformats.org/officeDocument/2006/math" xmlns="" val="1"/>
             </a:ext>
           </a:extLst>
         </p:spPr>
@@ -4061,7 +4023,7 @@
           </a:ln>
           <a:extLst>
             <a:ext uri="{C572A759-6A51-4108-AA02-DFA0A04FC94B}">
-              <ma14:wrappingTextBoxFlag xmlns="" xmlns:m="http://schemas.openxmlformats.org/officeDocument/2006/math" xmlns:a14="http://schemas.microsoft.com/office/drawing/2010/main" xmlns:ma14="http://schemas.microsoft.com/office/mac/drawingml/2011/main" val="1"/>
+              <ma14:wrappingTextBoxFlag xmlns:ma14="http://schemas.microsoft.com/office/mac/drawingml/2011/main" xmlns:a14="http://schemas.microsoft.com/office/drawing/2010/main" xmlns:m="http://schemas.openxmlformats.org/officeDocument/2006/math" xmlns="" val="1"/>
             </a:ext>
           </a:extLst>
         </p:spPr>
@@ -4289,7 +4251,7 @@
           </a:ln>
           <a:extLst>
             <a:ext uri="{C572A759-6A51-4108-AA02-DFA0A04FC94B}">
-              <ma14:wrappingTextBoxFlag xmlns="" xmlns:m="http://schemas.openxmlformats.org/officeDocument/2006/math" xmlns:a14="http://schemas.microsoft.com/office/drawing/2010/main" xmlns:ma14="http://schemas.microsoft.com/office/mac/drawingml/2011/main" val="1"/>
+              <ma14:wrappingTextBoxFlag xmlns:ma14="http://schemas.microsoft.com/office/mac/drawingml/2011/main" xmlns:a14="http://schemas.microsoft.com/office/drawing/2010/main" xmlns:m="http://schemas.openxmlformats.org/officeDocument/2006/math" xmlns="" val="1"/>
             </a:ext>
           </a:extLst>
         </p:spPr>
@@ -4477,7 +4439,7 @@
           </a:ln>
           <a:extLst>
             <a:ext uri="{C572A759-6A51-4108-AA02-DFA0A04FC94B}">
-              <ma14:wrappingTextBoxFlag xmlns="" xmlns:m="http://schemas.openxmlformats.org/officeDocument/2006/math" xmlns:a14="http://schemas.microsoft.com/office/drawing/2010/main" xmlns:ma14="http://schemas.microsoft.com/office/mac/drawingml/2011/main" val="1"/>
+              <ma14:wrappingTextBoxFlag xmlns:ma14="http://schemas.microsoft.com/office/mac/drawingml/2011/main" xmlns:a14="http://schemas.microsoft.com/office/drawing/2010/main" xmlns:m="http://schemas.openxmlformats.org/officeDocument/2006/math" xmlns="" val="1"/>
             </a:ext>
           </a:extLst>
         </p:spPr>
@@ -4683,7 +4645,7 @@
           </a:ln>
           <a:extLst>
             <a:ext uri="{C572A759-6A51-4108-AA02-DFA0A04FC94B}">
-              <ma14:wrappingTextBoxFlag xmlns="" xmlns:m="http://schemas.openxmlformats.org/officeDocument/2006/math" xmlns:a14="http://schemas.microsoft.com/office/drawing/2010/main" xmlns:ma14="http://schemas.microsoft.com/office/mac/drawingml/2011/main" val="1"/>
+              <ma14:wrappingTextBoxFlag xmlns:ma14="http://schemas.microsoft.com/office/mac/drawingml/2011/main" xmlns:a14="http://schemas.microsoft.com/office/drawing/2010/main" xmlns:m="http://schemas.openxmlformats.org/officeDocument/2006/math" xmlns="" val="1"/>
             </a:ext>
           </a:extLst>
         </p:spPr>
@@ -4799,7 +4761,7 @@
           </a:ln>
           <a:extLst>
             <a:ext uri="{C572A759-6A51-4108-AA02-DFA0A04FC94B}">
-              <ma14:wrappingTextBoxFlag xmlns="" xmlns:m="http://schemas.openxmlformats.org/officeDocument/2006/math" xmlns:a14="http://schemas.microsoft.com/office/drawing/2010/main" xmlns:ma14="http://schemas.microsoft.com/office/mac/drawingml/2011/main" val="1"/>
+              <ma14:wrappingTextBoxFlag xmlns:ma14="http://schemas.microsoft.com/office/mac/drawingml/2011/main" xmlns:a14="http://schemas.microsoft.com/office/drawing/2010/main" xmlns:m="http://schemas.openxmlformats.org/officeDocument/2006/math" xmlns="" val="1"/>
             </a:ext>
           </a:extLst>
         </p:spPr>
@@ -4897,7 +4859,7 @@
           </a:ln>
           <a:extLst>
             <a:ext uri="{C572A759-6A51-4108-AA02-DFA0A04FC94B}">
-              <ma14:wrappingTextBoxFlag xmlns="" xmlns:m="http://schemas.openxmlformats.org/officeDocument/2006/math" xmlns:a14="http://schemas.microsoft.com/office/drawing/2010/main" xmlns:ma14="http://schemas.microsoft.com/office/mac/drawingml/2011/main" val="1"/>
+              <ma14:wrappingTextBoxFlag xmlns:ma14="http://schemas.microsoft.com/office/mac/drawingml/2011/main" xmlns:a14="http://schemas.microsoft.com/office/drawing/2010/main" xmlns:m="http://schemas.openxmlformats.org/officeDocument/2006/math" xmlns="" val="1"/>
             </a:ext>
           </a:extLst>
         </p:spPr>
@@ -5022,7 +4984,7 @@
           </a:ln>
           <a:extLst>
             <a:ext uri="{C572A759-6A51-4108-AA02-DFA0A04FC94B}">
-              <ma14:wrappingTextBoxFlag xmlns="" xmlns:m="http://schemas.openxmlformats.org/officeDocument/2006/math" xmlns:a14="http://schemas.microsoft.com/office/drawing/2010/main" xmlns:ma14="http://schemas.microsoft.com/office/mac/drawingml/2011/main" val="1"/>
+              <ma14:wrappingTextBoxFlag xmlns:ma14="http://schemas.microsoft.com/office/mac/drawingml/2011/main" xmlns:a14="http://schemas.microsoft.com/office/drawing/2010/main" xmlns:m="http://schemas.openxmlformats.org/officeDocument/2006/math" xmlns="" val="1"/>
             </a:ext>
           </a:extLst>
         </p:spPr>
@@ -5116,7 +5078,7 @@
           </a:ln>
           <a:extLst>
             <a:ext uri="{C572A759-6A51-4108-AA02-DFA0A04FC94B}">
-              <ma14:wrappingTextBoxFlag xmlns="" xmlns:m="http://schemas.openxmlformats.org/officeDocument/2006/math" xmlns:a14="http://schemas.microsoft.com/office/drawing/2010/main" xmlns:ma14="http://schemas.microsoft.com/office/mac/drawingml/2011/main" val="1"/>
+              <ma14:wrappingTextBoxFlag xmlns:ma14="http://schemas.microsoft.com/office/mac/drawingml/2011/main" xmlns:a14="http://schemas.microsoft.com/office/drawing/2010/main" xmlns:m="http://schemas.openxmlformats.org/officeDocument/2006/math" xmlns="" val="1"/>
             </a:ext>
           </a:extLst>
         </p:spPr>
@@ -5210,7 +5172,7 @@
           </a:ln>
           <a:extLst>
             <a:ext uri="{C572A759-6A51-4108-AA02-DFA0A04FC94B}">
-              <ma14:wrappingTextBoxFlag xmlns="" xmlns:m="http://schemas.openxmlformats.org/officeDocument/2006/math" xmlns:a14="http://schemas.microsoft.com/office/drawing/2010/main" xmlns:ma14="http://schemas.microsoft.com/office/mac/drawingml/2011/main" val="1"/>
+              <ma14:wrappingTextBoxFlag xmlns:ma14="http://schemas.microsoft.com/office/mac/drawingml/2011/main" xmlns:a14="http://schemas.microsoft.com/office/drawing/2010/main" xmlns:m="http://schemas.openxmlformats.org/officeDocument/2006/math" xmlns="" val="1"/>
             </a:ext>
           </a:extLst>
         </p:spPr>
@@ -5313,7 +5275,7 @@
           </a:ln>
           <a:extLst>
             <a:ext uri="{C572A759-6A51-4108-AA02-DFA0A04FC94B}">
-              <ma14:wrappingTextBoxFlag xmlns="" xmlns:m="http://schemas.openxmlformats.org/officeDocument/2006/math" xmlns:a14="http://schemas.microsoft.com/office/drawing/2010/main" xmlns:ma14="http://schemas.microsoft.com/office/mac/drawingml/2011/main" val="1"/>
+              <ma14:wrappingTextBoxFlag xmlns:ma14="http://schemas.microsoft.com/office/mac/drawingml/2011/main" xmlns:a14="http://schemas.microsoft.com/office/drawing/2010/main" xmlns:m="http://schemas.openxmlformats.org/officeDocument/2006/math" xmlns="" val="1"/>
             </a:ext>
           </a:extLst>
         </p:spPr>
@@ -5453,7 +5415,7 @@
           </a:ln>
           <a:extLst>
             <a:ext uri="{C572A759-6A51-4108-AA02-DFA0A04FC94B}">
-              <ma14:wrappingTextBoxFlag xmlns="" xmlns:m="http://schemas.openxmlformats.org/officeDocument/2006/math" xmlns:a14="http://schemas.microsoft.com/office/drawing/2010/main" xmlns:ma14="http://schemas.microsoft.com/office/mac/drawingml/2011/main" val="1"/>
+              <ma14:wrappingTextBoxFlag xmlns:ma14="http://schemas.microsoft.com/office/mac/drawingml/2011/main" xmlns:a14="http://schemas.microsoft.com/office/drawing/2010/main" xmlns:m="http://schemas.openxmlformats.org/officeDocument/2006/math" xmlns="" val="1"/>
             </a:ext>
           </a:extLst>
         </p:spPr>
@@ -5716,7 +5678,7 @@
           <p:nvPr/>
         </p:nvPicPr>
         <p:blipFill>
-          <a:blip r:embed="rId10"/>
+          <a:blip r:embed="rId9"/>
           <a:srcRect t="8958"/>
           <a:stretch/>
         </p:blipFill>
@@ -5998,7 +5960,7 @@
           <a:effectLst/>
           <a:extLst>
             <a:ext uri="{C572A759-6A51-4108-AA02-DFA0A04FC94B}">
-              <ma14:wrappingTextBoxFlag xmlns="" xmlns:m="http://schemas.openxmlformats.org/officeDocument/2006/math" xmlns:a14="http://schemas.microsoft.com/office/drawing/2010/main" xmlns:ma14="http://schemas.microsoft.com/office/mac/drawingml/2011/main" val="1"/>
+              <ma14:wrappingTextBoxFlag xmlns:ma14="http://schemas.microsoft.com/office/mac/drawingml/2011/main" xmlns:a14="http://schemas.microsoft.com/office/drawing/2010/main" xmlns:m="http://schemas.openxmlformats.org/officeDocument/2006/math" xmlns="" val="1"/>
             </a:ext>
           </a:extLst>
         </p:spPr>
@@ -6050,7 +6012,7 @@
           </a:ln>
           <a:extLst>
             <a:ext uri="{C572A759-6A51-4108-AA02-DFA0A04FC94B}">
-              <ma14:wrappingTextBoxFlag xmlns="" xmlns:m="http://schemas.openxmlformats.org/officeDocument/2006/math" xmlns:a14="http://schemas.microsoft.com/office/drawing/2010/main" xmlns:ma14="http://schemas.microsoft.com/office/mac/drawingml/2011/main" val="1"/>
+              <ma14:wrappingTextBoxFlag xmlns:ma14="http://schemas.microsoft.com/office/mac/drawingml/2011/main" xmlns:a14="http://schemas.microsoft.com/office/drawing/2010/main" xmlns:m="http://schemas.openxmlformats.org/officeDocument/2006/math" xmlns="" val="1"/>
             </a:ext>
           </a:extLst>
         </p:spPr>
@@ -6202,7 +6164,7 @@
           </a:ln>
           <a:extLst>
             <a:ext uri="{C572A759-6A51-4108-AA02-DFA0A04FC94B}">
-              <ma14:wrappingTextBoxFlag xmlns="" xmlns:m="http://schemas.openxmlformats.org/officeDocument/2006/math" xmlns:a14="http://schemas.microsoft.com/office/drawing/2010/main" xmlns:ma14="http://schemas.microsoft.com/office/mac/drawingml/2011/main" val="1"/>
+              <ma14:wrappingTextBoxFlag xmlns:ma14="http://schemas.microsoft.com/office/mac/drawingml/2011/main" xmlns:a14="http://schemas.microsoft.com/office/drawing/2010/main" xmlns:m="http://schemas.openxmlformats.org/officeDocument/2006/math" xmlns="" val="1"/>
             </a:ext>
           </a:extLst>
         </p:spPr>
@@ -6296,7 +6258,7 @@
           <p:nvPr/>
         </p:nvPicPr>
         <p:blipFill>
-          <a:blip r:embed="rId11"/>
+          <a:blip r:embed="rId10"/>
           <a:stretch>
             <a:fillRect/>
           </a:stretch>
@@ -6467,7 +6429,7 @@
                 <a:effectLst/>
                 <a:extLst>
                   <a:ext uri="{C572A759-6A51-4108-AA02-DFA0A04FC94B}">
-                    <ma14:wrappingTextBoxFlag xmlns="" xmlns:m="http://schemas.openxmlformats.org/officeDocument/2006/math" xmlns:a14="http://schemas.microsoft.com/office/drawing/2010/main" xmlns:ma14="http://schemas.microsoft.com/office/mac/drawingml/2011/main" val="1"/>
+                    <ma14:wrappingTextBoxFlag xmlns:ma14="http://schemas.microsoft.com/office/mac/drawingml/2011/main" xmlns:a14="http://schemas.microsoft.com/office/drawing/2010/main" xmlns:m="http://schemas.openxmlformats.org/officeDocument/2006/math" xmlns="" val="1"/>
                   </a:ext>
                 </a:extLst>
               </p:spPr>
@@ -6522,10 +6484,10 @@
               <p:nvPr/>
             </p:nvPicPr>
             <p:blipFill>
-              <a:blip r:embed="rId12">
+              <a:blip r:embed="rId11">
                 <a:extLst>
                   <a:ext uri="{96DAC541-7B7A-43D3-8B79-37D633B846F1}">
-                    <asvg:svgBlip xmlns:asvg="http://schemas.microsoft.com/office/drawing/2016/SVG/main" r:embed="rId13"/>
+                    <asvg:svgBlip xmlns:asvg="http://schemas.microsoft.com/office/drawing/2016/SVG/main" r:embed="rId12"/>
                   </a:ext>
                 </a:extLst>
               </a:blip>
@@ -6849,7 +6811,7 @@
           </a:ln>
           <a:extLst>
             <a:ext uri="{C572A759-6A51-4108-AA02-DFA0A04FC94B}">
-              <ma14:wrappingTextBoxFlag xmlns="" xmlns:m="http://schemas.openxmlformats.org/officeDocument/2006/math" xmlns:a14="http://schemas.microsoft.com/office/drawing/2010/main" xmlns:ma14="http://schemas.microsoft.com/office/mac/drawingml/2011/main" val="1"/>
+              <ma14:wrappingTextBoxFlag xmlns:ma14="http://schemas.microsoft.com/office/mac/drawingml/2011/main" xmlns:a14="http://schemas.microsoft.com/office/drawing/2010/main" xmlns:m="http://schemas.openxmlformats.org/officeDocument/2006/math" xmlns="" val="1"/>
             </a:ext>
           </a:extLst>
         </p:spPr>
@@ -8346,7 +8308,7 @@
             <a:effectLst/>
             <a:extLst>
               <a:ext uri="{C572A759-6A51-4108-AA02-DFA0A04FC94B}">
-                <ma14:wrappingTextBoxFlag xmlns="" xmlns:m="http://schemas.openxmlformats.org/officeDocument/2006/math" xmlns:a14="http://schemas.microsoft.com/office/drawing/2010/main" xmlns:ma14="http://schemas.microsoft.com/office/mac/drawingml/2011/main" val="1"/>
+                <ma14:wrappingTextBoxFlag xmlns:ma14="http://schemas.microsoft.com/office/mac/drawingml/2011/main" xmlns:a14="http://schemas.microsoft.com/office/drawing/2010/main" xmlns:m="http://schemas.openxmlformats.org/officeDocument/2006/math" xmlns="" val="1"/>
               </a:ext>
             </a:extLst>
           </p:spPr>
@@ -8678,7 +8640,7 @@
           </a:ln>
           <a:extLst>
             <a:ext uri="{C572A759-6A51-4108-AA02-DFA0A04FC94B}">
-              <ma14:wrappingTextBoxFlag xmlns="" xmlns:m="http://schemas.openxmlformats.org/officeDocument/2006/math" xmlns:a14="http://schemas.microsoft.com/office/drawing/2010/main" xmlns:ma14="http://schemas.microsoft.com/office/mac/drawingml/2011/main" val="1"/>
+              <ma14:wrappingTextBoxFlag xmlns:ma14="http://schemas.microsoft.com/office/mac/drawingml/2011/main" xmlns:a14="http://schemas.microsoft.com/office/drawing/2010/main" xmlns:m="http://schemas.openxmlformats.org/officeDocument/2006/math" xmlns="" val="1"/>
             </a:ext>
           </a:extLst>
         </p:spPr>
@@ -8837,7 +8799,7 @@
             <a:effectLst/>
             <a:extLst>
               <a:ext uri="{C572A759-6A51-4108-AA02-DFA0A04FC94B}">
-                <ma14:wrappingTextBoxFlag xmlns="" xmlns:m="http://schemas.openxmlformats.org/officeDocument/2006/math" xmlns:a14="http://schemas.microsoft.com/office/drawing/2010/main" xmlns:ma14="http://schemas.microsoft.com/office/mac/drawingml/2011/main" val="1"/>
+                <ma14:wrappingTextBoxFlag xmlns:ma14="http://schemas.microsoft.com/office/mac/drawingml/2011/main" xmlns:a14="http://schemas.microsoft.com/office/drawing/2010/main" xmlns:m="http://schemas.openxmlformats.org/officeDocument/2006/math" xmlns="" val="1"/>
               </a:ext>
             </a:extLst>
           </p:spPr>
@@ -9122,7 +9084,7 @@
             <a:effectLst/>
             <a:extLst>
               <a:ext uri="{C572A759-6A51-4108-AA02-DFA0A04FC94B}">
-                <ma14:wrappingTextBoxFlag xmlns="" xmlns:m="http://schemas.openxmlformats.org/officeDocument/2006/math" xmlns:a14="http://schemas.microsoft.com/office/drawing/2010/main" xmlns:ma14="http://schemas.microsoft.com/office/mac/drawingml/2011/main" val="1"/>
+                <ma14:wrappingTextBoxFlag xmlns:ma14="http://schemas.microsoft.com/office/mac/drawingml/2011/main" xmlns:a14="http://schemas.microsoft.com/office/drawing/2010/main" xmlns:m="http://schemas.openxmlformats.org/officeDocument/2006/math" xmlns="" val="1"/>
               </a:ext>
             </a:extLst>
           </p:spPr>
@@ -9493,7 +9455,7 @@
           <p:nvPr/>
         </p:nvPicPr>
         <p:blipFill rotWithShape="1">
-          <a:blip r:embed="rId14" cstate="print">
+          <a:blip r:embed="rId13" cstate="print">
             <a:extLst>
               <a:ext uri="{28A0092B-C50C-407E-A947-70E740481C1C}">
                 <a14:useLocalDpi xmlns:a14="http://schemas.microsoft.com/office/drawing/2010/main" val="0"/>
@@ -9714,7 +9676,7 @@
           </a:ln>
           <a:extLst>
             <a:ext uri="{C572A759-6A51-4108-AA02-DFA0A04FC94B}">
-              <ma14:wrappingTextBoxFlag xmlns:ma14="http://schemas.microsoft.com/office/mac/drawingml/2011/main" xmlns:a14="http://schemas.microsoft.com/office/drawing/2010/main" xmlns:m="http://schemas.openxmlformats.org/officeDocument/2006/math" xmlns="" val="1"/>
+              <ma14:wrappingTextBoxFlag xmlns="" xmlns:m="http://schemas.openxmlformats.org/officeDocument/2006/math" xmlns:a14="http://schemas.microsoft.com/office/drawing/2010/main" xmlns:ma14="http://schemas.microsoft.com/office/mac/drawingml/2011/main" val="1"/>
             </a:ext>
           </a:extLst>
         </p:spPr>
@@ -9786,7 +9748,7 @@
             </a:ln>
             <a:extLst>
               <a:ext uri="{C572A759-6A51-4108-AA02-DFA0A04FC94B}">
-                <ma14:wrappingTextBoxFlag xmlns="" xmlns:m="http://schemas.openxmlformats.org/officeDocument/2006/math" xmlns:a14="http://schemas.microsoft.com/office/drawing/2010/main" xmlns:ma14="http://schemas.microsoft.com/office/mac/drawingml/2011/main" val="1"/>
+                <ma14:wrappingTextBoxFlag xmlns:ma14="http://schemas.microsoft.com/office/mac/drawingml/2011/main" xmlns:a14="http://schemas.microsoft.com/office/drawing/2010/main" xmlns:m="http://schemas.openxmlformats.org/officeDocument/2006/math" xmlns="" val="1"/>
               </a:ext>
             </a:extLst>
           </p:spPr>
@@ -9842,7 +9804,7 @@
             <a:sp3d/>
             <a:extLst>
               <a:ext uri="{C572A759-6A51-4108-AA02-DFA0A04FC94B}">
-                <ma14:wrappingTextBoxFlag xmlns:ma14="http://schemas.microsoft.com/office/mac/drawingml/2011/main" xmlns:a14="http://schemas.microsoft.com/office/drawing/2010/main" xmlns:m="http://schemas.openxmlformats.org/officeDocument/2006/math" xmlns="" val="1"/>
+                <ma14:wrappingTextBoxFlag xmlns="" xmlns:m="http://schemas.openxmlformats.org/officeDocument/2006/math" xmlns:a14="http://schemas.microsoft.com/office/drawing/2010/main" xmlns:ma14="http://schemas.microsoft.com/office/mac/drawingml/2011/main" val="1"/>
               </a:ext>
             </a:extLst>
           </p:spPr>
@@ -9971,7 +9933,7 @@
             <p:nvPr/>
           </p:nvPicPr>
           <p:blipFill rotWithShape="1">
-            <a:blip r:embed="rId15"/>
+            <a:blip r:embed="rId14"/>
             <a:srcRect l="26508" t="8373" r="9476" b="17240"/>
             <a:stretch/>
           </p:blipFill>
@@ -10000,7 +9962,7 @@
             <p:nvPr/>
           </p:nvPicPr>
           <p:blipFill>
-            <a:blip r:embed="rId16"/>
+            <a:blip r:embed="rId15"/>
             <a:srcRect l="20585" t="7058" r="12311" b="15339"/>
             <a:stretch/>
           </p:blipFill>
@@ -10029,7 +9991,7 @@
             <p:nvPr/>
           </p:nvPicPr>
           <p:blipFill rotWithShape="1">
-            <a:blip r:embed="rId17"/>
+            <a:blip r:embed="rId16"/>
             <a:srcRect l="17490" t="6298" r="12761" b="14698"/>
             <a:stretch/>
           </p:blipFill>
@@ -10235,7 +10197,7 @@
             <a:sp3d/>
             <a:extLst>
               <a:ext uri="{C572A759-6A51-4108-AA02-DFA0A04FC94B}">
-                <ma14:wrappingTextBoxFlag xmlns:m="http://schemas.openxmlformats.org/officeDocument/2006/math" xmlns:a14="http://schemas.microsoft.com/office/drawing/2010/main" xmlns:ma14="http://schemas.microsoft.com/office/mac/drawingml/2011/main" xmlns="" val="1"/>
+                <ma14:wrappingTextBoxFlag xmlns="" xmlns:ma14="http://schemas.microsoft.com/office/mac/drawingml/2011/main" xmlns:a14="http://schemas.microsoft.com/office/drawing/2010/main" xmlns:m="http://schemas.openxmlformats.org/officeDocument/2006/math" val="1"/>
               </a:ext>
             </a:extLst>
           </p:spPr>
@@ -10575,7 +10537,7 @@
             </a:ln>
             <a:extLst>
               <a:ext uri="{C572A759-6A51-4108-AA02-DFA0A04FC94B}">
-                <ma14:wrappingTextBoxFlag xmlns="" xmlns:m="http://schemas.openxmlformats.org/officeDocument/2006/math" xmlns:a14="http://schemas.microsoft.com/office/drawing/2010/main" xmlns:ma14="http://schemas.microsoft.com/office/mac/drawingml/2011/main" val="1"/>
+                <ma14:wrappingTextBoxFlag xmlns:ma14="http://schemas.microsoft.com/office/mac/drawingml/2011/main" xmlns:a14="http://schemas.microsoft.com/office/drawing/2010/main" xmlns:m="http://schemas.openxmlformats.org/officeDocument/2006/math" xmlns="" val="1"/>
               </a:ext>
             </a:extLst>
           </p:spPr>
@@ -10690,7 +10652,7 @@
             </a:ln>
             <a:extLst>
               <a:ext uri="{C572A759-6A51-4108-AA02-DFA0A04FC94B}">
-                <ma14:wrappingTextBoxFlag xmlns="" xmlns:m="http://schemas.openxmlformats.org/officeDocument/2006/math" xmlns:a14="http://schemas.microsoft.com/office/drawing/2010/main" xmlns:ma14="http://schemas.microsoft.com/office/mac/drawingml/2011/main" val="1"/>
+                <ma14:wrappingTextBoxFlag xmlns:ma14="http://schemas.microsoft.com/office/mac/drawingml/2011/main" xmlns:a14="http://schemas.microsoft.com/office/drawing/2010/main" xmlns:m="http://schemas.openxmlformats.org/officeDocument/2006/math" xmlns="" val="1"/>
               </a:ext>
             </a:extLst>
           </p:spPr>
@@ -10805,7 +10767,7 @@
             </a:ln>
             <a:extLst>
               <a:ext uri="{C572A759-6A51-4108-AA02-DFA0A04FC94B}">
-                <ma14:wrappingTextBoxFlag xmlns="" xmlns:m="http://schemas.openxmlformats.org/officeDocument/2006/math" xmlns:a14="http://schemas.microsoft.com/office/drawing/2010/main" xmlns:ma14="http://schemas.microsoft.com/office/mac/drawingml/2011/main" val="1"/>
+                <ma14:wrappingTextBoxFlag xmlns:ma14="http://schemas.microsoft.com/office/mac/drawingml/2011/main" xmlns:a14="http://schemas.microsoft.com/office/drawing/2010/main" xmlns:m="http://schemas.openxmlformats.org/officeDocument/2006/math" xmlns="" val="1"/>
               </a:ext>
             </a:extLst>
           </p:spPr>
@@ -11920,7 +11882,7 @@
             </a:ln>
             <a:extLst>
               <a:ext uri="{C572A759-6A51-4108-AA02-DFA0A04FC94B}">
-                <ma14:wrappingTextBoxFlag xmlns="" xmlns:m="http://schemas.openxmlformats.org/officeDocument/2006/math" xmlns:a14="http://schemas.microsoft.com/office/drawing/2010/main" xmlns:ma14="http://schemas.microsoft.com/office/mac/drawingml/2011/main" val="1"/>
+                <ma14:wrappingTextBoxFlag xmlns:ma14="http://schemas.microsoft.com/office/mac/drawingml/2011/main" xmlns:a14="http://schemas.microsoft.com/office/drawing/2010/main" xmlns:m="http://schemas.openxmlformats.org/officeDocument/2006/math" xmlns="" val="1"/>
               </a:ext>
             </a:extLst>
           </p:spPr>
@@ -12073,7 +12035,7 @@
           <p:nvPr/>
         </p:nvPicPr>
         <p:blipFill>
-          <a:blip r:embed="rId18">
+          <a:blip r:embed="rId17">
             <a:extLst>
               <a:ext uri="{28A0092B-C50C-407E-A947-70E740481C1C}">
                 <a14:useLocalDpi xmlns:a14="http://schemas.microsoft.com/office/drawing/2010/main" val="0"/>
@@ -12545,7 +12507,7 @@
           </a:ln>
           <a:extLst>
             <a:ext uri="{C572A759-6A51-4108-AA02-DFA0A04FC94B}">
-              <ma14:wrappingTextBoxFlag xmlns="" xmlns:ma14="http://schemas.microsoft.com/office/mac/drawingml/2011/main" xmlns:a14="http://schemas.microsoft.com/office/drawing/2010/main" xmlns:m="http://schemas.openxmlformats.org/officeDocument/2006/math" val="1"/>
+              <ma14:wrappingTextBoxFlag xmlns:m="http://schemas.openxmlformats.org/officeDocument/2006/math" xmlns:a14="http://schemas.microsoft.com/office/drawing/2010/main" xmlns:ma14="http://schemas.microsoft.com/office/mac/drawingml/2011/main" xmlns="" val="1"/>
             </a:ext>
           </a:extLst>
         </p:spPr>
@@ -12601,7 +12563,7 @@
           </a:ln>
           <a:extLst>
             <a:ext uri="{C572A759-6A51-4108-AA02-DFA0A04FC94B}">
-              <ma14:wrappingTextBoxFlag xmlns="" xmlns:m="http://schemas.openxmlformats.org/officeDocument/2006/math" xmlns:a14="http://schemas.microsoft.com/office/drawing/2010/main" xmlns:ma14="http://schemas.microsoft.com/office/mac/drawingml/2011/main" val="1"/>
+              <ma14:wrappingTextBoxFlag xmlns:ma14="http://schemas.microsoft.com/office/mac/drawingml/2011/main" xmlns:a14="http://schemas.microsoft.com/office/drawing/2010/main" xmlns:m="http://schemas.openxmlformats.org/officeDocument/2006/math" xmlns="" val="1"/>
             </a:ext>
           </a:extLst>
         </p:spPr>
@@ -12855,7 +12817,7 @@
           </a:ln>
           <a:extLst>
             <a:ext uri="{C572A759-6A51-4108-AA02-DFA0A04FC94B}">
-              <ma14:wrappingTextBoxFlag xmlns="" xmlns:m="http://schemas.openxmlformats.org/officeDocument/2006/math" xmlns:a14="http://schemas.microsoft.com/office/drawing/2010/main" xmlns:ma14="http://schemas.microsoft.com/office/mac/drawingml/2011/main" val="1"/>
+              <ma14:wrappingTextBoxFlag xmlns:ma14="http://schemas.microsoft.com/office/mac/drawingml/2011/main" xmlns:a14="http://schemas.microsoft.com/office/drawing/2010/main" xmlns:m="http://schemas.openxmlformats.org/officeDocument/2006/math" xmlns="" val="1"/>
             </a:ext>
           </a:extLst>
         </p:spPr>
@@ -12965,7 +12927,7 @@
           </a:ln>
           <a:extLst>
             <a:ext uri="{C572A759-6A51-4108-AA02-DFA0A04FC94B}">
-              <ma14:wrappingTextBoxFlag xmlns="" xmlns:m="http://schemas.openxmlformats.org/officeDocument/2006/math" xmlns:a14="http://schemas.microsoft.com/office/drawing/2010/main" xmlns:ma14="http://schemas.microsoft.com/office/mac/drawingml/2011/main" val="1"/>
+              <ma14:wrappingTextBoxFlag xmlns:ma14="http://schemas.microsoft.com/office/mac/drawingml/2011/main" xmlns:a14="http://schemas.microsoft.com/office/drawing/2010/main" xmlns:m="http://schemas.openxmlformats.org/officeDocument/2006/math" xmlns="" val="1"/>
             </a:ext>
           </a:extLst>
         </p:spPr>
@@ -13065,7 +13027,7 @@
           <p:nvPr/>
         </p:nvPicPr>
         <p:blipFill>
-          <a:blip r:embed="rId19"/>
+          <a:blip r:embed="rId18"/>
           <a:srcRect t="7711" b="17733"/>
           <a:stretch/>
         </p:blipFill>
@@ -13094,7 +13056,7 @@
           <p:nvPr/>
         </p:nvPicPr>
         <p:blipFill>
-          <a:blip r:embed="rId20"/>
+          <a:blip r:embed="rId19"/>
           <a:srcRect l="5493" t="13681" b="-1"/>
           <a:stretch/>
         </p:blipFill>
@@ -13201,7 +13163,7 @@
           </a:ln>
           <a:extLst>
             <a:ext uri="{C572A759-6A51-4108-AA02-DFA0A04FC94B}">
-              <ma14:wrappingTextBoxFlag xmlns="" xmlns:m="http://schemas.openxmlformats.org/officeDocument/2006/math" xmlns:a14="http://schemas.microsoft.com/office/drawing/2010/main" xmlns:ma14="http://schemas.microsoft.com/office/mac/drawingml/2011/main" val="1"/>
+              <ma14:wrappingTextBoxFlag xmlns:ma14="http://schemas.microsoft.com/office/mac/drawingml/2011/main" xmlns:a14="http://schemas.microsoft.com/office/drawing/2010/main" xmlns:m="http://schemas.openxmlformats.org/officeDocument/2006/math" xmlns="" val="1"/>
             </a:ext>
           </a:extLst>
         </p:spPr>
@@ -13499,7 +13461,7 @@
           </a:ln>
           <a:extLst>
             <a:ext uri="{C572A759-6A51-4108-AA02-DFA0A04FC94B}">
-              <ma14:wrappingTextBoxFlag xmlns="" xmlns:m="http://schemas.openxmlformats.org/officeDocument/2006/math" xmlns:a14="http://schemas.microsoft.com/office/drawing/2010/main" xmlns:ma14="http://schemas.microsoft.com/office/mac/drawingml/2011/main" val="1"/>
+              <ma14:wrappingTextBoxFlag xmlns:ma14="http://schemas.microsoft.com/office/mac/drawingml/2011/main" xmlns:a14="http://schemas.microsoft.com/office/drawing/2010/main" xmlns:m="http://schemas.openxmlformats.org/officeDocument/2006/math" xmlns="" val="1"/>
             </a:ext>
           </a:extLst>
         </p:spPr>
@@ -13603,7 +13565,7 @@
           </a:ln>
           <a:extLst>
             <a:ext uri="{C572A759-6A51-4108-AA02-DFA0A04FC94B}">
-              <ma14:wrappingTextBoxFlag xmlns="" xmlns:m="http://schemas.openxmlformats.org/officeDocument/2006/math" xmlns:a14="http://schemas.microsoft.com/office/drawing/2010/main" xmlns:ma14="http://schemas.microsoft.com/office/mac/drawingml/2011/main" val="1"/>
+              <ma14:wrappingTextBoxFlag xmlns:ma14="http://schemas.microsoft.com/office/mac/drawingml/2011/main" xmlns:a14="http://schemas.microsoft.com/office/drawing/2010/main" xmlns:m="http://schemas.openxmlformats.org/officeDocument/2006/math" xmlns="" val="1"/>
             </a:ext>
           </a:extLst>
         </p:spPr>
@@ -13809,7 +13771,7 @@
           </a:ln>
           <a:extLst>
             <a:ext uri="{C572A759-6A51-4108-AA02-DFA0A04FC94B}">
-              <ma14:wrappingTextBoxFlag xmlns="" xmlns:ma14="http://schemas.microsoft.com/office/mac/drawingml/2011/main" xmlns:a14="http://schemas.microsoft.com/office/drawing/2010/main" xmlns:m="http://schemas.openxmlformats.org/officeDocument/2006/math" val="1"/>
+              <ma14:wrappingTextBoxFlag xmlns:m="http://schemas.openxmlformats.org/officeDocument/2006/math" xmlns:a14="http://schemas.microsoft.com/office/drawing/2010/main" xmlns:ma14="http://schemas.microsoft.com/office/mac/drawingml/2011/main" xmlns="" val="1"/>
             </a:ext>
           </a:extLst>
         </p:spPr>
@@ -13977,7 +13939,7 @@
           </a:ln>
           <a:extLst>
             <a:ext uri="{C572A759-6A51-4108-AA02-DFA0A04FC94B}">
-              <ma14:wrappingTextBoxFlag xmlns="" xmlns:ma14="http://schemas.microsoft.com/office/mac/drawingml/2011/main" xmlns:a14="http://schemas.microsoft.com/office/drawing/2010/main" xmlns:m="http://schemas.openxmlformats.org/officeDocument/2006/math" val="1"/>
+              <ma14:wrappingTextBoxFlag xmlns:m="http://schemas.openxmlformats.org/officeDocument/2006/math" xmlns:a14="http://schemas.microsoft.com/office/drawing/2010/main" xmlns:ma14="http://schemas.microsoft.com/office/mac/drawingml/2011/main" xmlns="" val="1"/>
             </a:ext>
           </a:extLst>
         </p:spPr>
@@ -14282,58 +14244,6 @@
       </p:sp>
       <p:sp>
         <p:nvSpPr>
-          <p:cNvPr id="151" name="Four Column Layout : : CHEAT SHEET">
-            <a:extLst>
-              <a:ext uri="{FF2B5EF4-FFF2-40B4-BE49-F238E27FC236}">
-                <a16:creationId xmlns:a16="http://schemas.microsoft.com/office/drawing/2014/main" id="{FD2A7025-F997-9B7C-C037-F40C922A9C02}"/>
-              </a:ext>
-            </a:extLst>
-          </p:cNvPr>
-          <p:cNvSpPr txBox="1">
-            <a:spLocks noGrp="1"/>
-          </p:cNvSpPr>
-          <p:nvPr>
-            <p:ph type="title"/>
-          </p:nvPr>
-        </p:nvSpPr>
-        <p:spPr>
-          <a:xfrm>
-            <a:off x="275721" y="361177"/>
-            <a:ext cx="12279932" cy="803346"/>
-          </a:xfrm>
-          <a:prstGeom prst="rect">
-            <a:avLst/>
-          </a:prstGeom>
-        </p:spPr>
-        <p:txBody>
-          <a:bodyPr lIns="0" tIns="0" rIns="0" bIns="0" anchor="t">
-            <a:normAutofit/>
-          </a:bodyPr>
-          <a:lstStyle/>
-          <a:p>
-            <a:r>
-              <a:rPr lang="en-US" sz="3600" dirty="0"/>
-              <a:t>Geospatial Data Carpentry Workshop for Urbanism: : </a:t>
-            </a:r>
-            <a:r>
-              <a:rPr lang="en-US" sz="3300" dirty="0">
-                <a:latin typeface="Source Sans Pro Semibold"/>
-                <a:ea typeface="Source Sans Pro Semibold"/>
-                <a:cs typeface="Source Sans Pro Semibold"/>
-                <a:sym typeface="Source Sans Pro Semibold"/>
-              </a:rPr>
-              <a:t>CHEATSHEET</a:t>
-            </a:r>
-            <a:r>
-              <a:rPr lang="en-US" dirty="0"/>
-              <a:t> </a:t>
-            </a:r>
-            <a:endParaRPr dirty="0"/>
-          </a:p>
-        </p:txBody>
-      </p:sp>
-      <p:sp>
-        <p:nvSpPr>
           <p:cNvPr id="152" name="RStudio® is a trademark of RStudio, Inc.  •  CC BY SA Your Name •  your@email.com  •  844-448-1212 • your.website.com •  Learn more at webpage or vignette   •  package version  0.5.0 •  Updated: 2017-01">
             <a:extLst>
               <a:ext uri="{FF2B5EF4-FFF2-40B4-BE49-F238E27FC236}">
@@ -14357,7 +14267,7 @@
           </a:ln>
           <a:extLst>
             <a:ext uri="{C572A759-6A51-4108-AA02-DFA0A04FC94B}">
-              <ma14:wrappingTextBoxFlag xmlns:ma14="http://schemas.microsoft.com/office/mac/drawingml/2011/main" xmlns:a14="http://schemas.microsoft.com/office/drawing/2010/main" xmlns:m="http://schemas.openxmlformats.org/officeDocument/2006/math" xmlns="" val="1"/>
+              <ma14:wrappingTextBoxFlag xmlns="" xmlns:m="http://schemas.openxmlformats.org/officeDocument/2006/math" xmlns:a14="http://schemas.microsoft.com/office/drawing/2010/main" xmlns:ma14="http://schemas.microsoft.com/office/mac/drawingml/2011/main" val="1"/>
             </a:ext>
           </a:extLst>
         </p:spPr>
@@ -14506,7 +14416,7 @@
           </a:ln>
           <a:extLst>
             <a:ext uri="{C572A759-6A51-4108-AA02-DFA0A04FC94B}">
-              <ma14:wrappingTextBoxFlag xmlns:ma14="http://schemas.microsoft.com/office/mac/drawingml/2011/main" xmlns:a14="http://schemas.microsoft.com/office/drawing/2010/main" xmlns:m="http://schemas.openxmlformats.org/officeDocument/2006/math" xmlns="" val="1"/>
+              <ma14:wrappingTextBoxFlag xmlns="" xmlns:m="http://schemas.openxmlformats.org/officeDocument/2006/math" xmlns:a14="http://schemas.microsoft.com/office/drawing/2010/main" xmlns:ma14="http://schemas.microsoft.com/office/mac/drawingml/2011/main" val="1"/>
             </a:ext>
           </a:extLst>
         </p:spPr>
@@ -14610,7 +14520,7 @@
           </a:ln>
           <a:extLst>
             <a:ext uri="{C572A759-6A51-4108-AA02-DFA0A04FC94B}">
-              <ma14:wrappingTextBoxFlag xmlns:ma14="http://schemas.microsoft.com/office/mac/drawingml/2011/main" xmlns:a14="http://schemas.microsoft.com/office/drawing/2010/main" xmlns:m="http://schemas.openxmlformats.org/officeDocument/2006/math" xmlns="" val="1"/>
+              <ma14:wrappingTextBoxFlag xmlns="" xmlns:m="http://schemas.openxmlformats.org/officeDocument/2006/math" xmlns:a14="http://schemas.microsoft.com/office/drawing/2010/main" xmlns:ma14="http://schemas.microsoft.com/office/mac/drawingml/2011/main" val="1"/>
             </a:ext>
           </a:extLst>
         </p:spPr>
@@ -14666,7 +14576,7 @@
           </a:ln>
           <a:extLst>
             <a:ext uri="{C572A759-6A51-4108-AA02-DFA0A04FC94B}">
-              <ma14:wrappingTextBoxFlag xmlns:ma14="http://schemas.microsoft.com/office/mac/drawingml/2011/main" xmlns:a14="http://schemas.microsoft.com/office/drawing/2010/main" xmlns:m="http://schemas.openxmlformats.org/officeDocument/2006/math" xmlns="" val="1"/>
+              <ma14:wrappingTextBoxFlag xmlns="" xmlns:m="http://schemas.openxmlformats.org/officeDocument/2006/math" xmlns:a14="http://schemas.microsoft.com/office/drawing/2010/main" xmlns:ma14="http://schemas.microsoft.com/office/mac/drawingml/2011/main" val="1"/>
             </a:ext>
           </a:extLst>
         </p:spPr>
@@ -14729,7 +14639,7 @@
           </a:ln>
           <a:extLst>
             <a:ext uri="{C572A759-6A51-4108-AA02-DFA0A04FC94B}">
-              <ma14:wrappingTextBoxFlag xmlns:ma14="http://schemas.microsoft.com/office/mac/drawingml/2011/main" xmlns:a14="http://schemas.microsoft.com/office/drawing/2010/main" xmlns:m="http://schemas.openxmlformats.org/officeDocument/2006/math" xmlns="" val="1"/>
+              <ma14:wrappingTextBoxFlag xmlns="" xmlns:m="http://schemas.openxmlformats.org/officeDocument/2006/math" xmlns:a14="http://schemas.microsoft.com/office/drawing/2010/main" xmlns:ma14="http://schemas.microsoft.com/office/mac/drawingml/2011/main" val="1"/>
             </a:ext>
           </a:extLst>
         </p:spPr>
@@ -14773,7 +14683,7 @@
           </a:ln>
           <a:extLst>
             <a:ext uri="{C572A759-6A51-4108-AA02-DFA0A04FC94B}">
-              <ma14:wrappingTextBoxFlag xmlns:ma14="http://schemas.microsoft.com/office/mac/drawingml/2011/main" xmlns:a14="http://schemas.microsoft.com/office/drawing/2010/main" xmlns:m="http://schemas.openxmlformats.org/officeDocument/2006/math" xmlns="" val="1"/>
+              <ma14:wrappingTextBoxFlag xmlns="" xmlns:m="http://schemas.openxmlformats.org/officeDocument/2006/math" xmlns:a14="http://schemas.microsoft.com/office/drawing/2010/main" xmlns:ma14="http://schemas.microsoft.com/office/mac/drawingml/2011/main" val="1"/>
             </a:ext>
           </a:extLst>
         </p:spPr>
@@ -14823,7 +14733,7 @@
           </a:ln>
           <a:extLst>
             <a:ext uri="{C572A759-6A51-4108-AA02-DFA0A04FC94B}">
-              <ma14:wrappingTextBoxFlag xmlns:ma14="http://schemas.microsoft.com/office/mac/drawingml/2011/main" xmlns:a14="http://schemas.microsoft.com/office/drawing/2010/main" xmlns:m="http://schemas.openxmlformats.org/officeDocument/2006/math" xmlns="" val="1"/>
+              <ma14:wrappingTextBoxFlag xmlns="" xmlns:m="http://schemas.openxmlformats.org/officeDocument/2006/math" xmlns:a14="http://schemas.microsoft.com/office/drawing/2010/main" xmlns:ma14="http://schemas.microsoft.com/office/mac/drawingml/2011/main" val="1"/>
             </a:ext>
           </a:extLst>
         </p:spPr>
@@ -14892,7 +14802,7 @@
           </a:ln>
           <a:extLst>
             <a:ext uri="{C572A759-6A51-4108-AA02-DFA0A04FC94B}">
-              <ma14:wrappingTextBoxFlag xmlns:ma14="http://schemas.microsoft.com/office/mac/drawingml/2011/main" xmlns:a14="http://schemas.microsoft.com/office/drawing/2010/main" xmlns:m="http://schemas.openxmlformats.org/officeDocument/2006/math" xmlns="" val="1"/>
+              <ma14:wrappingTextBoxFlag xmlns="" xmlns:m="http://schemas.openxmlformats.org/officeDocument/2006/math" xmlns:a14="http://schemas.microsoft.com/office/drawing/2010/main" xmlns:ma14="http://schemas.microsoft.com/office/mac/drawingml/2011/main" val="1"/>
             </a:ext>
           </a:extLst>
         </p:spPr>
@@ -15212,7 +15122,7 @@
           </a:ln>
           <a:extLst>
             <a:ext uri="{C572A759-6A51-4108-AA02-DFA0A04FC94B}">
-              <ma14:wrappingTextBoxFlag xmlns:ma14="http://schemas.microsoft.com/office/mac/drawingml/2011/main" xmlns:a14="http://schemas.microsoft.com/office/drawing/2010/main" xmlns:m="http://schemas.openxmlformats.org/officeDocument/2006/math" xmlns="" val="1"/>
+              <ma14:wrappingTextBoxFlag xmlns="" xmlns:m="http://schemas.openxmlformats.org/officeDocument/2006/math" xmlns:a14="http://schemas.microsoft.com/office/drawing/2010/main" xmlns:ma14="http://schemas.microsoft.com/office/mac/drawingml/2011/main" val="1"/>
             </a:ext>
           </a:extLst>
         </p:spPr>
@@ -15333,7 +15243,7 @@
           </a:ln>
           <a:extLst>
             <a:ext uri="{C572A759-6A51-4108-AA02-DFA0A04FC94B}">
-              <ma14:wrappingTextBoxFlag xmlns:ma14="http://schemas.microsoft.com/office/mac/drawingml/2011/main" xmlns:a14="http://schemas.microsoft.com/office/drawing/2010/main" xmlns:m="http://schemas.openxmlformats.org/officeDocument/2006/math" xmlns="" val="1"/>
+              <ma14:wrappingTextBoxFlag xmlns="" xmlns:m="http://schemas.openxmlformats.org/officeDocument/2006/math" xmlns:a14="http://schemas.microsoft.com/office/drawing/2010/main" xmlns:ma14="http://schemas.microsoft.com/office/mac/drawingml/2011/main" val="1"/>
             </a:ext>
           </a:extLst>
         </p:spPr>
@@ -15396,7 +15306,7 @@
           </a:ln>
           <a:extLst>
             <a:ext uri="{C572A759-6A51-4108-AA02-DFA0A04FC94B}">
-              <ma14:wrappingTextBoxFlag xmlns:ma14="http://schemas.microsoft.com/office/mac/drawingml/2011/main" xmlns:a14="http://schemas.microsoft.com/office/drawing/2010/main" xmlns:m="http://schemas.openxmlformats.org/officeDocument/2006/math" xmlns="" val="1"/>
+              <ma14:wrappingTextBoxFlag xmlns="" xmlns:m="http://schemas.openxmlformats.org/officeDocument/2006/math" xmlns:a14="http://schemas.microsoft.com/office/drawing/2010/main" xmlns:ma14="http://schemas.microsoft.com/office/mac/drawingml/2011/main" val="1"/>
             </a:ext>
           </a:extLst>
         </p:spPr>
@@ -15440,7 +15350,7 @@
           </a:ln>
           <a:extLst>
             <a:ext uri="{C572A759-6A51-4108-AA02-DFA0A04FC94B}">
-              <ma14:wrappingTextBoxFlag xmlns:ma14="http://schemas.microsoft.com/office/mac/drawingml/2011/main" xmlns:a14="http://schemas.microsoft.com/office/drawing/2010/main" xmlns:m="http://schemas.openxmlformats.org/officeDocument/2006/math" xmlns="" val="1"/>
+              <ma14:wrappingTextBoxFlag xmlns="" xmlns:m="http://schemas.openxmlformats.org/officeDocument/2006/math" xmlns:a14="http://schemas.microsoft.com/office/drawing/2010/main" xmlns:ma14="http://schemas.microsoft.com/office/mac/drawingml/2011/main" val="1"/>
             </a:ext>
           </a:extLst>
         </p:spPr>
@@ -15540,7 +15450,7 @@
           </a:ln>
           <a:extLst>
             <a:ext uri="{C572A759-6A51-4108-AA02-DFA0A04FC94B}">
-              <ma14:wrappingTextBoxFlag xmlns:ma14="http://schemas.microsoft.com/office/mac/drawingml/2011/main" xmlns:a14="http://schemas.microsoft.com/office/drawing/2010/main" xmlns:m="http://schemas.openxmlformats.org/officeDocument/2006/math" xmlns="" val="1"/>
+              <ma14:wrappingTextBoxFlag xmlns="" xmlns:m="http://schemas.openxmlformats.org/officeDocument/2006/math" xmlns:a14="http://schemas.microsoft.com/office/drawing/2010/main" xmlns:ma14="http://schemas.microsoft.com/office/mac/drawingml/2011/main" val="1"/>
             </a:ext>
           </a:extLst>
         </p:spPr>
@@ -15669,7 +15579,7 @@
           </a:ln>
           <a:extLst>
             <a:ext uri="{C572A759-6A51-4108-AA02-DFA0A04FC94B}">
-              <ma14:wrappingTextBoxFlag xmlns:ma14="http://schemas.microsoft.com/office/mac/drawingml/2011/main" xmlns:a14="http://schemas.microsoft.com/office/drawing/2010/main" xmlns:m="http://schemas.openxmlformats.org/officeDocument/2006/math" xmlns="" val="1"/>
+              <ma14:wrappingTextBoxFlag xmlns="" xmlns:m="http://schemas.openxmlformats.org/officeDocument/2006/math" xmlns:a14="http://schemas.microsoft.com/office/drawing/2010/main" xmlns:ma14="http://schemas.microsoft.com/office/mac/drawingml/2011/main" val="1"/>
             </a:ext>
           </a:extLst>
         </p:spPr>
@@ -15817,7 +15727,7 @@
           </a:ln>
           <a:extLst>
             <a:ext uri="{C572A759-6A51-4108-AA02-DFA0A04FC94B}">
-              <ma14:wrappingTextBoxFlag xmlns:ma14="http://schemas.microsoft.com/office/mac/drawingml/2011/main" xmlns:a14="http://schemas.microsoft.com/office/drawing/2010/main" xmlns:m="http://schemas.openxmlformats.org/officeDocument/2006/math" xmlns="" val="1"/>
+              <ma14:wrappingTextBoxFlag xmlns="" xmlns:m="http://schemas.openxmlformats.org/officeDocument/2006/math" xmlns:a14="http://schemas.microsoft.com/office/drawing/2010/main" xmlns:ma14="http://schemas.microsoft.com/office/mac/drawingml/2011/main" val="1"/>
             </a:ext>
           </a:extLst>
         </p:spPr>
@@ -16664,7 +16574,7 @@
           </a:ln>
           <a:extLst>
             <a:ext uri="{C572A759-6A51-4108-AA02-DFA0A04FC94B}">
-              <ma14:wrappingTextBoxFlag xmlns:ma14="http://schemas.microsoft.com/office/mac/drawingml/2011/main" xmlns:a14="http://schemas.microsoft.com/office/drawing/2010/main" xmlns:m="http://schemas.openxmlformats.org/officeDocument/2006/math" xmlns="" val="1"/>
+              <ma14:wrappingTextBoxFlag xmlns="" xmlns:m="http://schemas.openxmlformats.org/officeDocument/2006/math" xmlns:a14="http://schemas.microsoft.com/office/drawing/2010/main" xmlns:ma14="http://schemas.microsoft.com/office/mac/drawingml/2011/main" val="1"/>
             </a:ext>
           </a:extLst>
         </p:spPr>
@@ -16798,7 +16708,7 @@
           </a:ln>
           <a:extLst>
             <a:ext uri="{C572A759-6A51-4108-AA02-DFA0A04FC94B}">
-              <ma14:wrappingTextBoxFlag xmlns:ma14="http://schemas.microsoft.com/office/mac/drawingml/2011/main" xmlns:a14="http://schemas.microsoft.com/office/drawing/2010/main" xmlns:m="http://schemas.openxmlformats.org/officeDocument/2006/math" xmlns="" val="1"/>
+              <ma14:wrappingTextBoxFlag xmlns="" xmlns:m="http://schemas.openxmlformats.org/officeDocument/2006/math" xmlns:a14="http://schemas.microsoft.com/office/drawing/2010/main" xmlns:ma14="http://schemas.microsoft.com/office/mac/drawingml/2011/main" val="1"/>
             </a:ext>
           </a:extLst>
         </p:spPr>
@@ -16912,7 +16822,7 @@
           </a:ln>
           <a:extLst>
             <a:ext uri="{C572A759-6A51-4108-AA02-DFA0A04FC94B}">
-              <ma14:wrappingTextBoxFlag xmlns:ma14="http://schemas.microsoft.com/office/mac/drawingml/2011/main" xmlns:a14="http://schemas.microsoft.com/office/drawing/2010/main" xmlns:m="http://schemas.openxmlformats.org/officeDocument/2006/math" xmlns="" val="1"/>
+              <ma14:wrappingTextBoxFlag xmlns="" xmlns:m="http://schemas.openxmlformats.org/officeDocument/2006/math" xmlns:a14="http://schemas.microsoft.com/office/drawing/2010/main" xmlns:ma14="http://schemas.microsoft.com/office/mac/drawingml/2011/main" val="1"/>
             </a:ext>
           </a:extLst>
         </p:spPr>
@@ -17005,7 +16915,7 @@
           </a:ln>
           <a:extLst>
             <a:ext uri="{C572A759-6A51-4108-AA02-DFA0A04FC94B}">
-              <ma14:wrappingTextBoxFlag xmlns:ma14="http://schemas.microsoft.com/office/mac/drawingml/2011/main" xmlns:a14="http://schemas.microsoft.com/office/drawing/2010/main" xmlns:m="http://schemas.openxmlformats.org/officeDocument/2006/math" xmlns="" val="1"/>
+              <ma14:wrappingTextBoxFlag xmlns="" xmlns:m="http://schemas.openxmlformats.org/officeDocument/2006/math" xmlns:a14="http://schemas.microsoft.com/office/drawing/2010/main" xmlns:ma14="http://schemas.microsoft.com/office/mac/drawingml/2011/main" val="1"/>
             </a:ext>
           </a:extLst>
         </p:spPr>
@@ -17055,7 +16965,7 @@
           </a:ln>
           <a:extLst>
             <a:ext uri="{C572A759-6A51-4108-AA02-DFA0A04FC94B}">
-              <ma14:wrappingTextBoxFlag xmlns:ma14="http://schemas.microsoft.com/office/mac/drawingml/2011/main" xmlns:a14="http://schemas.microsoft.com/office/drawing/2010/main" xmlns:m="http://schemas.openxmlformats.org/officeDocument/2006/math" xmlns="" val="1"/>
+              <ma14:wrappingTextBoxFlag xmlns="" xmlns:m="http://schemas.openxmlformats.org/officeDocument/2006/math" xmlns:a14="http://schemas.microsoft.com/office/drawing/2010/main" xmlns:ma14="http://schemas.microsoft.com/office/mac/drawingml/2011/main" val="1"/>
             </a:ext>
           </a:extLst>
         </p:spPr>
@@ -17560,7 +17470,7 @@
           </a:ln>
           <a:extLst>
             <a:ext uri="{C572A759-6A51-4108-AA02-DFA0A04FC94B}">
-              <ma14:wrappingTextBoxFlag xmlns:ma14="http://schemas.microsoft.com/office/mac/drawingml/2011/main" xmlns:a14="http://schemas.microsoft.com/office/drawing/2010/main" xmlns:m="http://schemas.openxmlformats.org/officeDocument/2006/math" xmlns="" val="1"/>
+              <ma14:wrappingTextBoxFlag xmlns="" xmlns:m="http://schemas.openxmlformats.org/officeDocument/2006/math" xmlns:a14="http://schemas.microsoft.com/office/drawing/2010/main" xmlns:ma14="http://schemas.microsoft.com/office/mac/drawingml/2011/main" val="1"/>
             </a:ext>
           </a:extLst>
         </p:spPr>
@@ -17675,7 +17585,7 @@
           </a:ln>
           <a:extLst>
             <a:ext uri="{C572A759-6A51-4108-AA02-DFA0A04FC94B}">
-              <ma14:wrappingTextBoxFlag xmlns:ma14="http://schemas.microsoft.com/office/mac/drawingml/2011/main" xmlns:a14="http://schemas.microsoft.com/office/drawing/2010/main" xmlns:m="http://schemas.openxmlformats.org/officeDocument/2006/math" xmlns="" val="1"/>
+              <ma14:wrappingTextBoxFlag xmlns="" xmlns:m="http://schemas.openxmlformats.org/officeDocument/2006/math" xmlns:a14="http://schemas.microsoft.com/office/drawing/2010/main" xmlns:ma14="http://schemas.microsoft.com/office/mac/drawingml/2011/main" val="1"/>
             </a:ext>
           </a:extLst>
         </p:spPr>
@@ -17738,7 +17648,7 @@
           </a:ln>
           <a:extLst>
             <a:ext uri="{C572A759-6A51-4108-AA02-DFA0A04FC94B}">
-              <ma14:wrappingTextBoxFlag xmlns:ma14="http://schemas.microsoft.com/office/mac/drawingml/2011/main" xmlns:a14="http://schemas.microsoft.com/office/drawing/2010/main" xmlns:m="http://schemas.openxmlformats.org/officeDocument/2006/math" xmlns="" val="1"/>
+              <ma14:wrappingTextBoxFlag xmlns="" xmlns:m="http://schemas.openxmlformats.org/officeDocument/2006/math" xmlns:a14="http://schemas.microsoft.com/office/drawing/2010/main" xmlns:ma14="http://schemas.microsoft.com/office/mac/drawingml/2011/main" val="1"/>
             </a:ext>
           </a:extLst>
         </p:spPr>
@@ -17788,7 +17698,7 @@
           </a:ln>
           <a:extLst>
             <a:ext uri="{C572A759-6A51-4108-AA02-DFA0A04FC94B}">
-              <ma14:wrappingTextBoxFlag xmlns:ma14="http://schemas.microsoft.com/office/mac/drawingml/2011/main" xmlns:a14="http://schemas.microsoft.com/office/drawing/2010/main" xmlns:m="http://schemas.openxmlformats.org/officeDocument/2006/math" xmlns="" val="1"/>
+              <ma14:wrappingTextBoxFlag xmlns="" xmlns:m="http://schemas.openxmlformats.org/officeDocument/2006/math" xmlns:a14="http://schemas.microsoft.com/office/drawing/2010/main" xmlns:ma14="http://schemas.microsoft.com/office/mac/drawingml/2011/main" val="1"/>
             </a:ext>
           </a:extLst>
         </p:spPr>
@@ -17911,7 +17821,7 @@
           </a:ln>
           <a:extLst>
             <a:ext uri="{C572A759-6A51-4108-AA02-DFA0A04FC94B}">
-              <ma14:wrappingTextBoxFlag xmlns:ma14="http://schemas.microsoft.com/office/mac/drawingml/2011/main" xmlns:a14="http://schemas.microsoft.com/office/drawing/2010/main" xmlns:m="http://schemas.openxmlformats.org/officeDocument/2006/math" xmlns="" val="1"/>
+              <ma14:wrappingTextBoxFlag xmlns="" xmlns:m="http://schemas.openxmlformats.org/officeDocument/2006/math" xmlns:a14="http://schemas.microsoft.com/office/drawing/2010/main" xmlns:ma14="http://schemas.microsoft.com/office/mac/drawingml/2011/main" val="1"/>
             </a:ext>
           </a:extLst>
         </p:spPr>
@@ -18000,7 +17910,7 @@
           </a:ln>
           <a:extLst>
             <a:ext uri="{C572A759-6A51-4108-AA02-DFA0A04FC94B}">
-              <ma14:wrappingTextBoxFlag xmlns:ma14="http://schemas.microsoft.com/office/mac/drawingml/2011/main" xmlns:a14="http://schemas.microsoft.com/office/drawing/2010/main" xmlns:m="http://schemas.openxmlformats.org/officeDocument/2006/math" xmlns="" val="1"/>
+              <ma14:wrappingTextBoxFlag xmlns="" xmlns:m="http://schemas.openxmlformats.org/officeDocument/2006/math" xmlns:a14="http://schemas.microsoft.com/office/drawing/2010/main" xmlns:ma14="http://schemas.microsoft.com/office/mac/drawingml/2011/main" val="1"/>
             </a:ext>
           </a:extLst>
         </p:spPr>
@@ -18050,7 +17960,7 @@
           </a:ln>
           <a:extLst>
             <a:ext uri="{C572A759-6A51-4108-AA02-DFA0A04FC94B}">
-              <ma14:wrappingTextBoxFlag xmlns:ma14="http://schemas.microsoft.com/office/mac/drawingml/2011/main" xmlns:a14="http://schemas.microsoft.com/office/drawing/2010/main" xmlns:m="http://schemas.openxmlformats.org/officeDocument/2006/math" xmlns="" val="1"/>
+              <ma14:wrappingTextBoxFlag xmlns="" xmlns:m="http://schemas.openxmlformats.org/officeDocument/2006/math" xmlns:a14="http://schemas.microsoft.com/office/drawing/2010/main" xmlns:ma14="http://schemas.microsoft.com/office/mac/drawingml/2011/main" val="1"/>
             </a:ext>
           </a:extLst>
         </p:spPr>
@@ -18610,44 +18520,6 @@
           </a:ln>
         </p:spPr>
       </p:pic>
-      <p:pic>
-        <p:nvPicPr>
-          <p:cNvPr id="327" name="rstudio.png">
-            <a:extLst>
-              <a:ext uri="{FF2B5EF4-FFF2-40B4-BE49-F238E27FC236}">
-                <a16:creationId xmlns:a16="http://schemas.microsoft.com/office/drawing/2014/main" id="{D2694C90-CE90-E40E-C839-3C0A50350BB9}"/>
-              </a:ext>
-            </a:extLst>
-          </p:cNvPr>
-          <p:cNvPicPr>
-            <a:picLocks noChangeAspect="1"/>
-          </p:cNvPicPr>
-          <p:nvPr/>
-        </p:nvPicPr>
-        <p:blipFill>
-          <a:blip r:embed="rId10">
-            <a:extLst>
-              <a:ext uri="{28A0092B-C50C-407E-A947-70E740481C1C}">
-                <a14:useLocalDpi xmlns:a14="http://schemas.microsoft.com/office/drawing/2010/main" val="0"/>
-              </a:ext>
-            </a:extLst>
-          </a:blip>
-          <a:srcRect/>
-          <a:stretch/>
-        </p:blipFill>
-        <p:spPr>
-          <a:xfrm>
-            <a:off x="12633597" y="200407"/>
-            <a:ext cx="1047744" cy="1206960"/>
-          </a:xfrm>
-          <a:prstGeom prst="rect">
-            <a:avLst/>
-          </a:prstGeom>
-          <a:ln w="12700">
-            <a:miter lim="400000"/>
-          </a:ln>
-        </p:spPr>
-      </p:pic>
       <p:sp>
         <p:nvSpPr>
           <p:cNvPr id="328" name="ggplot(mpg, aes(hwy, cty)) +…">
@@ -18679,7 +18551,7 @@
           </a:ln>
           <a:extLst>
             <a:ext uri="{C572A759-6A51-4108-AA02-DFA0A04FC94B}">
-              <ma14:wrappingTextBoxFlag xmlns:ma14="http://schemas.microsoft.com/office/mac/drawingml/2011/main" xmlns:a14="http://schemas.microsoft.com/office/drawing/2010/main" xmlns:m="http://schemas.openxmlformats.org/officeDocument/2006/math" xmlns="" val="1"/>
+              <ma14:wrappingTextBoxFlag xmlns="" xmlns:m="http://schemas.openxmlformats.org/officeDocument/2006/math" xmlns:a14="http://schemas.microsoft.com/office/drawing/2010/main" xmlns:ma14="http://schemas.microsoft.com/office/mac/drawingml/2011/main" val="1"/>
             </a:ext>
           </a:extLst>
         </p:spPr>
@@ -18881,7 +18753,7 @@
           </a:ln>
           <a:extLst>
             <a:ext uri="{C572A759-6A51-4108-AA02-DFA0A04FC94B}">
-              <ma14:wrappingTextBoxFlag xmlns:ma14="http://schemas.microsoft.com/office/mac/drawingml/2011/main" xmlns:a14="http://schemas.microsoft.com/office/drawing/2010/main" xmlns:m="http://schemas.openxmlformats.org/officeDocument/2006/math" xmlns="" val="1"/>
+              <ma14:wrappingTextBoxFlag xmlns="" xmlns:m="http://schemas.openxmlformats.org/officeDocument/2006/math" xmlns:a14="http://schemas.microsoft.com/office/drawing/2010/main" xmlns:ma14="http://schemas.microsoft.com/office/mac/drawingml/2011/main" val="1"/>
             </a:ext>
           </a:extLst>
         </p:spPr>
@@ -18945,7 +18817,7 @@
           </a:ln>
           <a:extLst>
             <a:ext uri="{C572A759-6A51-4108-AA02-DFA0A04FC94B}">
-              <ma14:wrappingTextBoxFlag xmlns:ma14="http://schemas.microsoft.com/office/mac/drawingml/2011/main" xmlns:a14="http://schemas.microsoft.com/office/drawing/2010/main" xmlns:m="http://schemas.openxmlformats.org/officeDocument/2006/math" xmlns="" val="1"/>
+              <ma14:wrappingTextBoxFlag xmlns="" xmlns:m="http://schemas.openxmlformats.org/officeDocument/2006/math" xmlns:a14="http://schemas.microsoft.com/office/drawing/2010/main" xmlns:ma14="http://schemas.microsoft.com/office/mac/drawingml/2011/main" val="1"/>
             </a:ext>
           </a:extLst>
         </p:spPr>
@@ -19022,7 +18894,7 @@
           <p:nvPr/>
         </p:nvPicPr>
         <p:blipFill>
-          <a:blip r:embed="rId11">
+          <a:blip r:embed="rId10">
             <a:extLst>
               <a:ext uri="{28A0092B-C50C-407E-A947-70E740481C1C}">
                 <a14:useLocalDpi xmlns:a14="http://schemas.microsoft.com/office/drawing/2010/main" val="0"/>
@@ -19074,7 +18946,7 @@
           </a:ln>
           <a:extLst>
             <a:ext uri="{C572A759-6A51-4108-AA02-DFA0A04FC94B}">
-              <ma14:wrappingTextBoxFlag xmlns:ma14="http://schemas.microsoft.com/office/mac/drawingml/2011/main" xmlns:a14="http://schemas.microsoft.com/office/drawing/2010/main" xmlns:m="http://schemas.openxmlformats.org/officeDocument/2006/math" xmlns="" val="1"/>
+              <ma14:wrappingTextBoxFlag xmlns="" xmlns:m="http://schemas.openxmlformats.org/officeDocument/2006/math" xmlns:a14="http://schemas.microsoft.com/office/drawing/2010/main" xmlns:ma14="http://schemas.microsoft.com/office/mac/drawingml/2011/main" val="1"/>
             </a:ext>
           </a:extLst>
         </p:spPr>
@@ -19323,7 +19195,7 @@
           </a:ln>
           <a:extLst>
             <a:ext uri="{C572A759-6A51-4108-AA02-DFA0A04FC94B}">
-              <ma14:wrappingTextBoxFlag xmlns:ma14="http://schemas.microsoft.com/office/mac/drawingml/2011/main" xmlns:a14="http://schemas.microsoft.com/office/drawing/2010/main" xmlns:m="http://schemas.openxmlformats.org/officeDocument/2006/math" xmlns="" val="1"/>
+              <ma14:wrappingTextBoxFlag xmlns="" xmlns:m="http://schemas.openxmlformats.org/officeDocument/2006/math" xmlns:a14="http://schemas.microsoft.com/office/drawing/2010/main" xmlns:ma14="http://schemas.microsoft.com/office/mac/drawingml/2011/main" val="1"/>
             </a:ext>
           </a:extLst>
         </p:spPr>
@@ -19393,7 +19265,7 @@
           </a:ln>
           <a:extLst>
             <a:ext uri="{C572A759-6A51-4108-AA02-DFA0A04FC94B}">
-              <ma14:wrappingTextBoxFlag xmlns="" xmlns:m="http://schemas.openxmlformats.org/officeDocument/2006/math" xmlns:a14="http://schemas.microsoft.com/office/drawing/2010/main" xmlns:ma14="http://schemas.microsoft.com/office/mac/drawingml/2011/main" val="1"/>
+              <ma14:wrappingTextBoxFlag xmlns:ma14="http://schemas.microsoft.com/office/mac/drawingml/2011/main" xmlns:a14="http://schemas.microsoft.com/office/drawing/2010/main" xmlns:m="http://schemas.openxmlformats.org/officeDocument/2006/math" xmlns="" val="1"/>
             </a:ext>
           </a:extLst>
         </p:spPr>
@@ -19545,7 +19417,7 @@
           </a:ln>
           <a:extLst>
             <a:ext uri="{C572A759-6A51-4108-AA02-DFA0A04FC94B}">
-              <ma14:wrappingTextBoxFlag xmlns="" xmlns:m="http://schemas.openxmlformats.org/officeDocument/2006/math" xmlns:a14="http://schemas.microsoft.com/office/drawing/2010/main" xmlns:ma14="http://schemas.microsoft.com/office/mac/drawingml/2011/main" val="1"/>
+              <ma14:wrappingTextBoxFlag xmlns:ma14="http://schemas.microsoft.com/office/mac/drawingml/2011/main" xmlns:a14="http://schemas.microsoft.com/office/drawing/2010/main" xmlns:m="http://schemas.openxmlformats.org/officeDocument/2006/math" xmlns="" val="1"/>
             </a:ext>
           </a:extLst>
         </p:spPr>
@@ -19579,7 +19451,7 @@
           <p:nvPr/>
         </p:nvPicPr>
         <p:blipFill>
-          <a:blip r:embed="rId12" cstate="print">
+          <a:blip r:embed="rId11" cstate="print">
             <a:extLst>
               <a:ext uri="{28A0092B-C50C-407E-A947-70E740481C1C}">
                 <a14:useLocalDpi xmlns:a14="http://schemas.microsoft.com/office/drawing/2010/main" val="0"/>
@@ -19686,7 +19558,7 @@
           </a:ln>
           <a:extLst>
             <a:ext uri="{C572A759-6A51-4108-AA02-DFA0A04FC94B}">
-              <ma14:wrappingTextBoxFlag xmlns="" xmlns:m="http://schemas.openxmlformats.org/officeDocument/2006/math" xmlns:a14="http://schemas.microsoft.com/office/drawing/2010/main" xmlns:ma14="http://schemas.microsoft.com/office/mac/drawingml/2011/main" val="1"/>
+              <ma14:wrappingTextBoxFlag xmlns:ma14="http://schemas.microsoft.com/office/mac/drawingml/2011/main" xmlns:a14="http://schemas.microsoft.com/office/drawing/2010/main" xmlns:m="http://schemas.openxmlformats.org/officeDocument/2006/math" xmlns="" val="1"/>
             </a:ext>
           </a:extLst>
         </p:spPr>
@@ -19789,7 +19661,7 @@
           </a:ln>
           <a:extLst>
             <a:ext uri="{C572A759-6A51-4108-AA02-DFA0A04FC94B}">
-              <ma14:wrappingTextBoxFlag xmlns="" xmlns:m="http://schemas.openxmlformats.org/officeDocument/2006/math" xmlns:a14="http://schemas.microsoft.com/office/drawing/2010/main" xmlns:ma14="http://schemas.microsoft.com/office/mac/drawingml/2011/main" val="1"/>
+              <ma14:wrappingTextBoxFlag xmlns:ma14="http://schemas.microsoft.com/office/mac/drawingml/2011/main" xmlns:a14="http://schemas.microsoft.com/office/drawing/2010/main" xmlns:m="http://schemas.openxmlformats.org/officeDocument/2006/math" xmlns="" val="1"/>
             </a:ext>
           </a:extLst>
         </p:spPr>
@@ -19927,7 +19799,7 @@
           </a:ln>
           <a:extLst>
             <a:ext uri="{C572A759-6A51-4108-AA02-DFA0A04FC94B}">
-              <ma14:wrappingTextBoxFlag xmlns="" xmlns:m="http://schemas.openxmlformats.org/officeDocument/2006/math" xmlns:a14="http://schemas.microsoft.com/office/drawing/2010/main" xmlns:ma14="http://schemas.microsoft.com/office/mac/drawingml/2011/main" val="1"/>
+              <ma14:wrappingTextBoxFlag xmlns:ma14="http://schemas.microsoft.com/office/mac/drawingml/2011/main" xmlns:a14="http://schemas.microsoft.com/office/drawing/2010/main" xmlns:m="http://schemas.openxmlformats.org/officeDocument/2006/math" xmlns="" val="1"/>
             </a:ext>
           </a:extLst>
         </p:spPr>
@@ -20007,7 +19879,7 @@
           </a:ln>
           <a:extLst>
             <a:ext uri="{C572A759-6A51-4108-AA02-DFA0A04FC94B}">
-              <ma14:wrappingTextBoxFlag xmlns="" xmlns:m="http://schemas.openxmlformats.org/officeDocument/2006/math" xmlns:a14="http://schemas.microsoft.com/office/drawing/2010/main" xmlns:ma14="http://schemas.microsoft.com/office/mac/drawingml/2011/main" val="1"/>
+              <ma14:wrappingTextBoxFlag xmlns:ma14="http://schemas.microsoft.com/office/mac/drawingml/2011/main" xmlns:a14="http://schemas.microsoft.com/office/drawing/2010/main" xmlns:m="http://schemas.openxmlformats.org/officeDocument/2006/math" xmlns="" val="1"/>
             </a:ext>
           </a:extLst>
         </p:spPr>
@@ -20123,7 +19995,7 @@
           </a:ln>
           <a:extLst>
             <a:ext uri="{C572A759-6A51-4108-AA02-DFA0A04FC94B}">
-              <ma14:wrappingTextBoxFlag xmlns="" xmlns:m="http://schemas.openxmlformats.org/officeDocument/2006/math" xmlns:a14="http://schemas.microsoft.com/office/drawing/2010/main" xmlns:ma14="http://schemas.microsoft.com/office/mac/drawingml/2011/main" val="1"/>
+              <ma14:wrappingTextBoxFlag xmlns:ma14="http://schemas.microsoft.com/office/mac/drawingml/2011/main" xmlns:a14="http://schemas.microsoft.com/office/drawing/2010/main" xmlns:m="http://schemas.openxmlformats.org/officeDocument/2006/math" xmlns="" val="1"/>
             </a:ext>
           </a:extLst>
         </p:spPr>
@@ -20293,7 +20165,7 @@
           </a:ln>
           <a:extLst>
             <a:ext uri="{C572A759-6A51-4108-AA02-DFA0A04FC94B}">
-              <ma14:wrappingTextBoxFlag xmlns="" xmlns:m="http://schemas.openxmlformats.org/officeDocument/2006/math" xmlns:a14="http://schemas.microsoft.com/office/drawing/2010/main" xmlns:ma14="http://schemas.microsoft.com/office/mac/drawingml/2011/main" val="1"/>
+              <ma14:wrappingTextBoxFlag xmlns:ma14="http://schemas.microsoft.com/office/mac/drawingml/2011/main" xmlns:a14="http://schemas.microsoft.com/office/drawing/2010/main" xmlns:m="http://schemas.openxmlformats.org/officeDocument/2006/math" xmlns="" val="1"/>
             </a:ext>
           </a:extLst>
         </p:spPr>
@@ -20409,7 +20281,7 @@
           </a:ln>
           <a:extLst>
             <a:ext uri="{C572A759-6A51-4108-AA02-DFA0A04FC94B}">
-              <ma14:wrappingTextBoxFlag xmlns="" xmlns:m="http://schemas.openxmlformats.org/officeDocument/2006/math" xmlns:a14="http://schemas.microsoft.com/office/drawing/2010/main" xmlns:ma14="http://schemas.microsoft.com/office/mac/drawingml/2011/main" val="1"/>
+              <ma14:wrappingTextBoxFlag xmlns:ma14="http://schemas.microsoft.com/office/mac/drawingml/2011/main" xmlns:a14="http://schemas.microsoft.com/office/drawing/2010/main" xmlns:m="http://schemas.openxmlformats.org/officeDocument/2006/math" xmlns="" val="1"/>
             </a:ext>
           </a:extLst>
         </p:spPr>
@@ -20507,7 +20379,7 @@
           </a:ln>
           <a:extLst>
             <a:ext uri="{C572A759-6A51-4108-AA02-DFA0A04FC94B}">
-              <ma14:wrappingTextBoxFlag xmlns="" xmlns:m="http://schemas.openxmlformats.org/officeDocument/2006/math" xmlns:a14="http://schemas.microsoft.com/office/drawing/2010/main" xmlns:ma14="http://schemas.microsoft.com/office/mac/drawingml/2011/main" val="1"/>
+              <ma14:wrappingTextBoxFlag xmlns:ma14="http://schemas.microsoft.com/office/mac/drawingml/2011/main" xmlns:a14="http://schemas.microsoft.com/office/drawing/2010/main" xmlns:m="http://schemas.openxmlformats.org/officeDocument/2006/math" xmlns="" val="1"/>
             </a:ext>
           </a:extLst>
         </p:spPr>
@@ -20730,7 +20602,7 @@
           </a:ln>
           <a:extLst>
             <a:ext uri="{C572A759-6A51-4108-AA02-DFA0A04FC94B}">
-              <ma14:wrappingTextBoxFlag xmlns="" xmlns:m="http://schemas.openxmlformats.org/officeDocument/2006/math" xmlns:a14="http://schemas.microsoft.com/office/drawing/2010/main" xmlns:ma14="http://schemas.microsoft.com/office/mac/drawingml/2011/main" val="1"/>
+              <ma14:wrappingTextBoxFlag xmlns:ma14="http://schemas.microsoft.com/office/mac/drawingml/2011/main" xmlns:a14="http://schemas.microsoft.com/office/drawing/2010/main" xmlns:m="http://schemas.openxmlformats.org/officeDocument/2006/math" xmlns="" val="1"/>
             </a:ext>
           </a:extLst>
         </p:spPr>
@@ -20860,7 +20732,7 @@
           </a:ln>
           <a:extLst>
             <a:ext uri="{C572A759-6A51-4108-AA02-DFA0A04FC94B}">
-              <ma14:wrappingTextBoxFlag xmlns="" xmlns:m="http://schemas.openxmlformats.org/officeDocument/2006/math" xmlns:a14="http://schemas.microsoft.com/office/drawing/2010/main" xmlns:ma14="http://schemas.microsoft.com/office/mac/drawingml/2011/main" val="1"/>
+              <ma14:wrappingTextBoxFlag xmlns:ma14="http://schemas.microsoft.com/office/mac/drawingml/2011/main" xmlns:a14="http://schemas.microsoft.com/office/drawing/2010/main" xmlns:m="http://schemas.openxmlformats.org/officeDocument/2006/math" xmlns="" val="1"/>
             </a:ext>
           </a:extLst>
         </p:spPr>
@@ -21023,7 +20895,7 @@
           </a:ln>
           <a:extLst>
             <a:ext uri="{C572A759-6A51-4108-AA02-DFA0A04FC94B}">
-              <ma14:wrappingTextBoxFlag xmlns="" xmlns:m="http://schemas.openxmlformats.org/officeDocument/2006/math" xmlns:a14="http://schemas.microsoft.com/office/drawing/2010/main" xmlns:ma14="http://schemas.microsoft.com/office/mac/drawingml/2011/main" val="1"/>
+              <ma14:wrappingTextBoxFlag xmlns:ma14="http://schemas.microsoft.com/office/mac/drawingml/2011/main" xmlns:a14="http://schemas.microsoft.com/office/drawing/2010/main" xmlns:m="http://schemas.openxmlformats.org/officeDocument/2006/math" xmlns="" val="1"/>
             </a:ext>
           </a:extLst>
         </p:spPr>
@@ -21151,7 +21023,7 @@
           </a:ln>
           <a:extLst>
             <a:ext uri="{C572A759-6A51-4108-AA02-DFA0A04FC94B}">
-              <ma14:wrappingTextBoxFlag xmlns="" xmlns:m="http://schemas.openxmlformats.org/officeDocument/2006/math" xmlns:a14="http://schemas.microsoft.com/office/drawing/2010/main" xmlns:ma14="http://schemas.microsoft.com/office/mac/drawingml/2011/main" val="1"/>
+              <ma14:wrappingTextBoxFlag xmlns:ma14="http://schemas.microsoft.com/office/mac/drawingml/2011/main" xmlns:a14="http://schemas.microsoft.com/office/drawing/2010/main" xmlns:m="http://schemas.openxmlformats.org/officeDocument/2006/math" xmlns="" val="1"/>
             </a:ext>
           </a:extLst>
         </p:spPr>
@@ -21279,7 +21151,7 @@
           </a:ln>
           <a:extLst>
             <a:ext uri="{C572A759-6A51-4108-AA02-DFA0A04FC94B}">
-              <ma14:wrappingTextBoxFlag xmlns="" xmlns:m="http://schemas.openxmlformats.org/officeDocument/2006/math" xmlns:a14="http://schemas.microsoft.com/office/drawing/2010/main" xmlns:ma14="http://schemas.microsoft.com/office/mac/drawingml/2011/main" val="1"/>
+              <ma14:wrappingTextBoxFlag xmlns:ma14="http://schemas.microsoft.com/office/mac/drawingml/2011/main" xmlns:a14="http://schemas.microsoft.com/office/drawing/2010/main" xmlns:m="http://schemas.openxmlformats.org/officeDocument/2006/math" xmlns="" val="1"/>
             </a:ext>
           </a:extLst>
         </p:spPr>
@@ -21396,7 +21268,7 @@
           </a:ln>
           <a:extLst>
             <a:ext uri="{C572A759-6A51-4108-AA02-DFA0A04FC94B}">
-              <ma14:wrappingTextBoxFlag xmlns="" xmlns:m="http://schemas.openxmlformats.org/officeDocument/2006/math" xmlns:a14="http://schemas.microsoft.com/office/drawing/2010/main" xmlns:ma14="http://schemas.microsoft.com/office/mac/drawingml/2011/main" val="1"/>
+              <ma14:wrappingTextBoxFlag xmlns:ma14="http://schemas.microsoft.com/office/mac/drawingml/2011/main" xmlns:a14="http://schemas.microsoft.com/office/drawing/2010/main" xmlns:m="http://schemas.openxmlformats.org/officeDocument/2006/math" xmlns="" val="1"/>
             </a:ext>
           </a:extLst>
         </p:spPr>
@@ -21531,7 +21403,7 @@
           </a:ln>
           <a:extLst>
             <a:ext uri="{C572A759-6A51-4108-AA02-DFA0A04FC94B}">
-              <ma14:wrappingTextBoxFlag xmlns="" xmlns:m="http://schemas.openxmlformats.org/officeDocument/2006/math" xmlns:a14="http://schemas.microsoft.com/office/drawing/2010/main" xmlns:ma14="http://schemas.microsoft.com/office/mac/drawingml/2011/main" val="1"/>
+              <ma14:wrappingTextBoxFlag xmlns:ma14="http://schemas.microsoft.com/office/mac/drawingml/2011/main" xmlns:a14="http://schemas.microsoft.com/office/drawing/2010/main" xmlns:m="http://schemas.openxmlformats.org/officeDocument/2006/math" xmlns="" val="1"/>
             </a:ext>
           </a:extLst>
         </p:spPr>
@@ -22980,7 +22852,7 @@
           <p:nvPr/>
         </p:nvPicPr>
         <p:blipFill rotWithShape="1">
-          <a:blip r:embed="rId13">
+          <a:blip r:embed="rId12">
             <a:extLst>
               <a:ext uri="{28A0092B-C50C-407E-A947-70E740481C1C}">
                 <a14:useLocalDpi xmlns:a14="http://schemas.microsoft.com/office/drawing/2010/main" val="0"/>
@@ -23008,42 +22880,6 @@
               </a14:hiddenFill>
             </a:ext>
           </a:extLst>
-        </p:spPr>
-      </p:pic>
-      <p:pic>
-        <p:nvPicPr>
-          <p:cNvPr id="137" name="Picture 136" descr="A logo with colorful lines&#10;&#10;AI-generated content may be incorrect.">
-            <a:extLst>
-              <a:ext uri="{FF2B5EF4-FFF2-40B4-BE49-F238E27FC236}">
-                <a16:creationId xmlns:a16="http://schemas.microsoft.com/office/drawing/2014/main" id="{86A028C7-D868-4566-9C3B-79BA080FF022}"/>
-              </a:ext>
-            </a:extLst>
-          </p:cNvPr>
-          <p:cNvPicPr>
-            <a:picLocks noChangeAspect="1"/>
-          </p:cNvPicPr>
-          <p:nvPr/>
-        </p:nvPicPr>
-        <p:blipFill>
-          <a:blip r:embed="rId14">
-            <a:extLst>
-              <a:ext uri="{28A0092B-C50C-407E-A947-70E740481C1C}">
-                <a14:useLocalDpi xmlns:a14="http://schemas.microsoft.com/office/drawing/2010/main" val="0"/>
-              </a:ext>
-            </a:extLst>
-          </a:blip>
-          <a:stretch>
-            <a:fillRect/>
-          </a:stretch>
-        </p:blipFill>
-        <p:spPr>
-          <a:xfrm>
-            <a:off x="401010" y="9716569"/>
-            <a:ext cx="1576277" cy="898164"/>
-          </a:xfrm>
-          <a:prstGeom prst="rect">
-            <a:avLst/>
-          </a:prstGeom>
         </p:spPr>
       </p:pic>
       <p:sp>
@@ -23071,7 +22907,7 @@
           </a:ln>
           <a:extLst>
             <a:ext uri="{C572A759-6A51-4108-AA02-DFA0A04FC94B}">
-              <ma14:wrappingTextBoxFlag xmlns="" xmlns:m="http://schemas.openxmlformats.org/officeDocument/2006/math" xmlns:a14="http://schemas.microsoft.com/office/drawing/2010/main" xmlns:ma14="http://schemas.microsoft.com/office/mac/drawingml/2011/main" val="1"/>
+              <ma14:wrappingTextBoxFlag xmlns:ma14="http://schemas.microsoft.com/office/mac/drawingml/2011/main" xmlns:a14="http://schemas.microsoft.com/office/drawing/2010/main" xmlns:m="http://schemas.openxmlformats.org/officeDocument/2006/math" xmlns="" val="1"/>
             </a:ext>
           </a:extLst>
         </p:spPr>
@@ -23115,7 +22951,7 @@
           </a:ln>
           <a:extLst>
             <a:ext uri="{C572A759-6A51-4108-AA02-DFA0A04FC94B}">
-              <ma14:wrappingTextBoxFlag xmlns:ma14="http://schemas.microsoft.com/office/mac/drawingml/2011/main" xmlns:a14="http://schemas.microsoft.com/office/drawing/2010/main" xmlns:m="http://schemas.openxmlformats.org/officeDocument/2006/math" xmlns="" val="1"/>
+              <ma14:wrappingTextBoxFlag xmlns="" xmlns:m="http://schemas.openxmlformats.org/officeDocument/2006/math" xmlns:a14="http://schemas.microsoft.com/office/drawing/2010/main" xmlns:ma14="http://schemas.microsoft.com/office/mac/drawingml/2011/main" val="1"/>
             </a:ext>
           </a:extLst>
         </p:spPr>
@@ -23319,7 +23155,7 @@
           </a:ln>
           <a:extLst>
             <a:ext uri="{C572A759-6A51-4108-AA02-DFA0A04FC94B}">
-              <ma14:wrappingTextBoxFlag xmlns="" xmlns:m="http://schemas.openxmlformats.org/officeDocument/2006/math" xmlns:a14="http://schemas.microsoft.com/office/drawing/2010/main" xmlns:ma14="http://schemas.microsoft.com/office/mac/drawingml/2011/main" val="1"/>
+              <ma14:wrappingTextBoxFlag xmlns:ma14="http://schemas.microsoft.com/office/mac/drawingml/2011/main" xmlns:a14="http://schemas.microsoft.com/office/drawing/2010/main" xmlns:m="http://schemas.openxmlformats.org/officeDocument/2006/math" xmlns="" val="1"/>
             </a:ext>
           </a:extLst>
         </p:spPr>
@@ -23413,7 +23249,7 @@
           </a:ln>
           <a:extLst>
             <a:ext uri="{C572A759-6A51-4108-AA02-DFA0A04FC94B}">
-              <ma14:wrappingTextBoxFlag xmlns="" xmlns:m="http://schemas.openxmlformats.org/officeDocument/2006/math" xmlns:a14="http://schemas.microsoft.com/office/drawing/2010/main" xmlns:ma14="http://schemas.microsoft.com/office/mac/drawingml/2011/main" val="1"/>
+              <ma14:wrappingTextBoxFlag xmlns:ma14="http://schemas.microsoft.com/office/mac/drawingml/2011/main" xmlns:a14="http://schemas.microsoft.com/office/drawing/2010/main" xmlns:m="http://schemas.openxmlformats.org/officeDocument/2006/math" xmlns="" val="1"/>
             </a:ext>
           </a:extLst>
         </p:spPr>
@@ -23507,7 +23343,7 @@
           </a:ln>
           <a:extLst>
             <a:ext uri="{C572A759-6A51-4108-AA02-DFA0A04FC94B}">
-              <ma14:wrappingTextBoxFlag xmlns="" xmlns:m="http://schemas.openxmlformats.org/officeDocument/2006/math" xmlns:a14="http://schemas.microsoft.com/office/drawing/2010/main" xmlns:ma14="http://schemas.microsoft.com/office/mac/drawingml/2011/main" val="1"/>
+              <ma14:wrappingTextBoxFlag xmlns:ma14="http://schemas.microsoft.com/office/mac/drawingml/2011/main" xmlns:a14="http://schemas.microsoft.com/office/drawing/2010/main" xmlns:m="http://schemas.openxmlformats.org/officeDocument/2006/math" xmlns="" val="1"/>
             </a:ext>
           </a:extLst>
         </p:spPr>
@@ -23571,6 +23407,363 @@
               </a:defRPr>
             </a:pPr>
             <a:endParaRPr/>
+          </a:p>
+        </p:txBody>
+      </p:sp>
+      <p:pic>
+        <p:nvPicPr>
+          <p:cNvPr id="10" name="Picture 9" descr="A logo with colorful lines&#10;&#10;AI-generated content may be incorrect.">
+            <a:extLst>
+              <a:ext uri="{FF2B5EF4-FFF2-40B4-BE49-F238E27FC236}">
+                <a16:creationId xmlns:a16="http://schemas.microsoft.com/office/drawing/2014/main" id="{8A74AA45-139F-D908-CF8F-6416BD71A7EC}"/>
+              </a:ext>
+            </a:extLst>
+          </p:cNvPr>
+          <p:cNvPicPr>
+            <a:picLocks noChangeAspect="1"/>
+          </p:cNvPicPr>
+          <p:nvPr/>
+        </p:nvPicPr>
+        <p:blipFill>
+          <a:blip r:embed="rId13">
+            <a:extLst>
+              <a:ext uri="{28A0092B-C50C-407E-A947-70E740481C1C}">
+                <a14:useLocalDpi xmlns:a14="http://schemas.microsoft.com/office/drawing/2010/main" val="0"/>
+              </a:ext>
+            </a:extLst>
+          </a:blip>
+          <a:stretch>
+            <a:fillRect/>
+          </a:stretch>
+        </p:blipFill>
+        <p:spPr>
+          <a:xfrm>
+            <a:off x="440200" y="9673495"/>
+            <a:ext cx="1804178" cy="1028022"/>
+          </a:xfrm>
+          <a:prstGeom prst="rect">
+            <a:avLst/>
+          </a:prstGeom>
+        </p:spPr>
+      </p:pic>
+      <p:sp>
+        <p:nvSpPr>
+          <p:cNvPr id="136" name="Four Column Layout : : CHEAT SHEET">
+            <a:extLst>
+              <a:ext uri="{FF2B5EF4-FFF2-40B4-BE49-F238E27FC236}">
+                <a16:creationId xmlns:a16="http://schemas.microsoft.com/office/drawing/2014/main" id="{E87E1659-6A53-6DD2-279D-45D904F14716}"/>
+              </a:ext>
+            </a:extLst>
+          </p:cNvPr>
+          <p:cNvSpPr txBox="1">
+            <a:spLocks/>
+          </p:cNvSpPr>
+          <p:nvPr/>
+        </p:nvSpPr>
+        <p:spPr>
+          <a:xfrm>
+            <a:off x="275720" y="361177"/>
+            <a:ext cx="13399781" cy="803346"/>
+          </a:xfrm>
+          <a:prstGeom prst="rect">
+            <a:avLst/>
+          </a:prstGeom>
+          <a:ln w="12700">
+            <a:miter lim="400000"/>
+          </a:ln>
+          <a:extLst>
+            <a:ext uri="{C572A759-6A51-4108-AA02-DFA0A04FC94B}">
+              <ma14:wrappingTextBoxFlag xmlns="" xmlns:m="http://schemas.openxmlformats.org/officeDocument/2006/math" xmlns:a14="http://schemas.microsoft.com/office/drawing/2010/main" xmlns:ma14="http://schemas.microsoft.com/office/mac/drawingml/2011/main" val="1"/>
+            </a:ext>
+          </a:extLst>
+        </p:spPr>
+        <p:txBody>
+          <a:bodyPr lIns="0" tIns="0" rIns="0" bIns="0" anchor="t">
+            <a:normAutofit/>
+          </a:bodyPr>
+          <a:lstStyle>
+            <a:lvl1pPr marL="0" marR="0" indent="0" algn="l" defTabSz="584200" rtl="0" latinLnBrk="0">
+              <a:lnSpc>
+                <a:spcPct val="80000"/>
+              </a:lnSpc>
+              <a:spcBef>
+                <a:spcPts val="0"/>
+              </a:spcBef>
+              <a:spcAft>
+                <a:spcPts val="0"/>
+              </a:spcAft>
+              <a:buClrTx/>
+              <a:buSzTx/>
+              <a:buFontTx/>
+              <a:buNone/>
+              <a:tabLst/>
+              <a:defRPr sz="4800" b="0" i="0" u="none" strike="noStrike" cap="none" spc="0" baseline="0">
+                <a:ln>
+                  <a:noFill/>
+                </a:ln>
+                <a:solidFill>
+                  <a:srgbClr val="585858"/>
+                </a:solidFill>
+                <a:uFillTx/>
+                <a:latin typeface="+mn-lt"/>
+                <a:ea typeface="+mn-ea"/>
+                <a:cs typeface="+mn-cs"/>
+                <a:sym typeface="Source Sans Pro Light"/>
+              </a:defRPr>
+            </a:lvl1pPr>
+            <a:lvl2pPr marL="0" marR="0" indent="228600" algn="l" defTabSz="584200" rtl="0" latinLnBrk="0">
+              <a:lnSpc>
+                <a:spcPct val="80000"/>
+              </a:lnSpc>
+              <a:spcBef>
+                <a:spcPts val="0"/>
+              </a:spcBef>
+              <a:spcAft>
+                <a:spcPts val="0"/>
+              </a:spcAft>
+              <a:buClrTx/>
+              <a:buSzTx/>
+              <a:buFontTx/>
+              <a:buNone/>
+              <a:tabLst/>
+              <a:defRPr sz="4800" b="0" i="0" u="none" strike="noStrike" cap="none" spc="0" baseline="0">
+                <a:ln>
+                  <a:noFill/>
+                </a:ln>
+                <a:solidFill>
+                  <a:srgbClr val="585858"/>
+                </a:solidFill>
+                <a:uFillTx/>
+                <a:latin typeface="+mn-lt"/>
+                <a:ea typeface="+mn-ea"/>
+                <a:cs typeface="+mn-cs"/>
+                <a:sym typeface="Source Sans Pro Light"/>
+              </a:defRPr>
+            </a:lvl2pPr>
+            <a:lvl3pPr marL="0" marR="0" indent="457200" algn="l" defTabSz="584200" rtl="0" latinLnBrk="0">
+              <a:lnSpc>
+                <a:spcPct val="80000"/>
+              </a:lnSpc>
+              <a:spcBef>
+                <a:spcPts val="0"/>
+              </a:spcBef>
+              <a:spcAft>
+                <a:spcPts val="0"/>
+              </a:spcAft>
+              <a:buClrTx/>
+              <a:buSzTx/>
+              <a:buFontTx/>
+              <a:buNone/>
+              <a:tabLst/>
+              <a:defRPr sz="4800" b="0" i="0" u="none" strike="noStrike" cap="none" spc="0" baseline="0">
+                <a:ln>
+                  <a:noFill/>
+                </a:ln>
+                <a:solidFill>
+                  <a:srgbClr val="585858"/>
+                </a:solidFill>
+                <a:uFillTx/>
+                <a:latin typeface="+mn-lt"/>
+                <a:ea typeface="+mn-ea"/>
+                <a:cs typeface="+mn-cs"/>
+                <a:sym typeface="Source Sans Pro Light"/>
+              </a:defRPr>
+            </a:lvl3pPr>
+            <a:lvl4pPr marL="0" marR="0" indent="685800" algn="l" defTabSz="584200" rtl="0" latinLnBrk="0">
+              <a:lnSpc>
+                <a:spcPct val="80000"/>
+              </a:lnSpc>
+              <a:spcBef>
+                <a:spcPts val="0"/>
+              </a:spcBef>
+              <a:spcAft>
+                <a:spcPts val="0"/>
+              </a:spcAft>
+              <a:buClrTx/>
+              <a:buSzTx/>
+              <a:buFontTx/>
+              <a:buNone/>
+              <a:tabLst/>
+              <a:defRPr sz="4800" b="0" i="0" u="none" strike="noStrike" cap="none" spc="0" baseline="0">
+                <a:ln>
+                  <a:noFill/>
+                </a:ln>
+                <a:solidFill>
+                  <a:srgbClr val="585858"/>
+                </a:solidFill>
+                <a:uFillTx/>
+                <a:latin typeface="+mn-lt"/>
+                <a:ea typeface="+mn-ea"/>
+                <a:cs typeface="+mn-cs"/>
+                <a:sym typeface="Source Sans Pro Light"/>
+              </a:defRPr>
+            </a:lvl4pPr>
+            <a:lvl5pPr marL="0" marR="0" indent="914400" algn="l" defTabSz="584200" rtl="0" latinLnBrk="0">
+              <a:lnSpc>
+                <a:spcPct val="80000"/>
+              </a:lnSpc>
+              <a:spcBef>
+                <a:spcPts val="0"/>
+              </a:spcBef>
+              <a:spcAft>
+                <a:spcPts val="0"/>
+              </a:spcAft>
+              <a:buClrTx/>
+              <a:buSzTx/>
+              <a:buFontTx/>
+              <a:buNone/>
+              <a:tabLst/>
+              <a:defRPr sz="4800" b="0" i="0" u="none" strike="noStrike" cap="none" spc="0" baseline="0">
+                <a:ln>
+                  <a:noFill/>
+                </a:ln>
+                <a:solidFill>
+                  <a:srgbClr val="585858"/>
+                </a:solidFill>
+                <a:uFillTx/>
+                <a:latin typeface="+mn-lt"/>
+                <a:ea typeface="+mn-ea"/>
+                <a:cs typeface="+mn-cs"/>
+                <a:sym typeface="Source Sans Pro Light"/>
+              </a:defRPr>
+            </a:lvl5pPr>
+            <a:lvl6pPr marL="0" marR="0" indent="1143000" algn="l" defTabSz="584200" rtl="0" latinLnBrk="0">
+              <a:lnSpc>
+                <a:spcPct val="80000"/>
+              </a:lnSpc>
+              <a:spcBef>
+                <a:spcPts val="0"/>
+              </a:spcBef>
+              <a:spcAft>
+                <a:spcPts val="0"/>
+              </a:spcAft>
+              <a:buClrTx/>
+              <a:buSzTx/>
+              <a:buFontTx/>
+              <a:buNone/>
+              <a:tabLst/>
+              <a:defRPr sz="4800" b="0" i="0" u="none" strike="noStrike" cap="none" spc="0" baseline="0">
+                <a:ln>
+                  <a:noFill/>
+                </a:ln>
+                <a:solidFill>
+                  <a:srgbClr val="585858"/>
+                </a:solidFill>
+                <a:uFillTx/>
+                <a:latin typeface="+mn-lt"/>
+                <a:ea typeface="+mn-ea"/>
+                <a:cs typeface="+mn-cs"/>
+                <a:sym typeface="Source Sans Pro Light"/>
+              </a:defRPr>
+            </a:lvl6pPr>
+            <a:lvl7pPr marL="0" marR="0" indent="1371600" algn="l" defTabSz="584200" rtl="0" latinLnBrk="0">
+              <a:lnSpc>
+                <a:spcPct val="80000"/>
+              </a:lnSpc>
+              <a:spcBef>
+                <a:spcPts val="0"/>
+              </a:spcBef>
+              <a:spcAft>
+                <a:spcPts val="0"/>
+              </a:spcAft>
+              <a:buClrTx/>
+              <a:buSzTx/>
+              <a:buFontTx/>
+              <a:buNone/>
+              <a:tabLst/>
+              <a:defRPr sz="4800" b="0" i="0" u="none" strike="noStrike" cap="none" spc="0" baseline="0">
+                <a:ln>
+                  <a:noFill/>
+                </a:ln>
+                <a:solidFill>
+                  <a:srgbClr val="585858"/>
+                </a:solidFill>
+                <a:uFillTx/>
+                <a:latin typeface="+mn-lt"/>
+                <a:ea typeface="+mn-ea"/>
+                <a:cs typeface="+mn-cs"/>
+                <a:sym typeface="Source Sans Pro Light"/>
+              </a:defRPr>
+            </a:lvl7pPr>
+            <a:lvl8pPr marL="0" marR="0" indent="1600200" algn="l" defTabSz="584200" rtl="0" latinLnBrk="0">
+              <a:lnSpc>
+                <a:spcPct val="80000"/>
+              </a:lnSpc>
+              <a:spcBef>
+                <a:spcPts val="0"/>
+              </a:spcBef>
+              <a:spcAft>
+                <a:spcPts val="0"/>
+              </a:spcAft>
+              <a:buClrTx/>
+              <a:buSzTx/>
+              <a:buFontTx/>
+              <a:buNone/>
+              <a:tabLst/>
+              <a:defRPr sz="4800" b="0" i="0" u="none" strike="noStrike" cap="none" spc="0" baseline="0">
+                <a:ln>
+                  <a:noFill/>
+                </a:ln>
+                <a:solidFill>
+                  <a:srgbClr val="585858"/>
+                </a:solidFill>
+                <a:uFillTx/>
+                <a:latin typeface="+mn-lt"/>
+                <a:ea typeface="+mn-ea"/>
+                <a:cs typeface="+mn-cs"/>
+                <a:sym typeface="Source Sans Pro Light"/>
+              </a:defRPr>
+            </a:lvl8pPr>
+            <a:lvl9pPr marL="0" marR="0" indent="1828800" algn="l" defTabSz="584200" rtl="0" latinLnBrk="0">
+              <a:lnSpc>
+                <a:spcPct val="80000"/>
+              </a:lnSpc>
+              <a:spcBef>
+                <a:spcPts val="0"/>
+              </a:spcBef>
+              <a:spcAft>
+                <a:spcPts val="0"/>
+              </a:spcAft>
+              <a:buClrTx/>
+              <a:buSzTx/>
+              <a:buFontTx/>
+              <a:buNone/>
+              <a:tabLst/>
+              <a:defRPr sz="4800" b="0" i="0" u="none" strike="noStrike" cap="none" spc="0" baseline="0">
+                <a:ln>
+                  <a:noFill/>
+                </a:ln>
+                <a:solidFill>
+                  <a:srgbClr val="585858"/>
+                </a:solidFill>
+                <a:uFillTx/>
+                <a:latin typeface="+mn-lt"/>
+                <a:ea typeface="+mn-ea"/>
+                <a:cs typeface="+mn-cs"/>
+                <a:sym typeface="Source Sans Pro Light"/>
+              </a:defRPr>
+            </a:lvl9pPr>
+          </a:lstStyle>
+          <a:p>
+            <a:pPr hangingPunct="1"/>
+            <a:r>
+              <a:rPr lang="en-US" sz="4000"/>
+              <a:t>Geospatial Data Carpentry Workshop for Urbanism: : </a:t>
+            </a:r>
+            <a:r>
+              <a:rPr lang="en-US" sz="3300">
+                <a:latin typeface="Source Sans Pro Semibold"/>
+                <a:ea typeface="Source Sans Pro Semibold"/>
+                <a:cs typeface="Source Sans Pro Semibold"/>
+                <a:sym typeface="Source Sans Pro Semibold"/>
+              </a:rPr>
+              <a:t>CHEATSHEET</a:t>
+            </a:r>
+            <a:r>
+              <a:rPr lang="en-US"/>
+              <a:t> </a:t>
+            </a:r>
+            <a:endParaRPr lang="en-US" dirty="0"/>
           </a:p>
         </p:txBody>
       </p:sp>

</xml_diff>

<commit_message>
add st_join to cheatsheet
</commit_message>
<xml_diff>
--- a/instructors/cheatsheet/GDCU2025_cheatsheet.pptx
+++ b/instructors/cheatsheet/GDCU2025_cheatsheet.pptx
@@ -2275,7 +2275,7 @@
           </a:ln>
           <a:extLst>
             <a:ext uri="{C572A759-6A51-4108-AA02-DFA0A04FC94B}">
-              <ma14:wrappingTextBoxFlag xmlns="" xmlns:m="http://schemas.openxmlformats.org/officeDocument/2006/math" xmlns:a14="http://schemas.microsoft.com/office/drawing/2010/main" xmlns:ma14="http://schemas.microsoft.com/office/mac/drawingml/2011/main" val="1"/>
+              <ma14:wrappingTextBoxFlag xmlns:ma14="http://schemas.microsoft.com/office/mac/drawingml/2011/main" xmlns:a14="http://schemas.microsoft.com/office/drawing/2010/main" xmlns:m="http://schemas.openxmlformats.org/officeDocument/2006/math" xmlns="" val="1"/>
             </a:ext>
           </a:extLst>
         </p:spPr>
@@ -2314,7 +2314,7 @@
           </a:ln>
           <a:extLst>
             <a:ext uri="{C572A759-6A51-4108-AA02-DFA0A04FC94B}">
-              <ma14:wrappingTextBoxFlag xmlns="" xmlns:m="http://schemas.openxmlformats.org/officeDocument/2006/math" xmlns:a14="http://schemas.microsoft.com/office/drawing/2010/main" xmlns:ma14="http://schemas.microsoft.com/office/mac/drawingml/2011/main" val="1"/>
+              <ma14:wrappingTextBoxFlag xmlns:ma14="http://schemas.microsoft.com/office/mac/drawingml/2011/main" xmlns:a14="http://schemas.microsoft.com/office/drawing/2010/main" xmlns:m="http://schemas.openxmlformats.org/officeDocument/2006/math" xmlns="" val="1"/>
             </a:ext>
           </a:extLst>
         </p:spPr>
@@ -3340,7 +3340,7 @@
           </a:ln>
           <a:extLst>
             <a:ext uri="{C572A759-6A51-4108-AA02-DFA0A04FC94B}">
-              <ma14:wrappingTextBoxFlag xmlns="" xmlns:m="http://schemas.openxmlformats.org/officeDocument/2006/math" xmlns:a14="http://schemas.microsoft.com/office/drawing/2010/main" xmlns:ma14="http://schemas.microsoft.com/office/mac/drawingml/2011/main" val="1"/>
+              <ma14:wrappingTextBoxFlag xmlns:ma14="http://schemas.microsoft.com/office/mac/drawingml/2011/main" xmlns:a14="http://schemas.microsoft.com/office/drawing/2010/main" xmlns:m="http://schemas.openxmlformats.org/officeDocument/2006/math" xmlns="" val="1"/>
             </a:ext>
           </a:extLst>
         </p:spPr>
@@ -3525,7 +3525,7 @@
           </a:ln>
           <a:extLst>
             <a:ext uri="{C572A759-6A51-4108-AA02-DFA0A04FC94B}">
-              <ma14:wrappingTextBoxFlag xmlns:ma14="http://schemas.microsoft.com/office/mac/drawingml/2011/main" xmlns:a14="http://schemas.microsoft.com/office/drawing/2010/main" xmlns:m="http://schemas.openxmlformats.org/officeDocument/2006/math" xmlns="" val="1"/>
+              <ma14:wrappingTextBoxFlag xmlns="" xmlns:m="http://schemas.openxmlformats.org/officeDocument/2006/math" xmlns:a14="http://schemas.microsoft.com/office/drawing/2010/main" xmlns:ma14="http://schemas.microsoft.com/office/mac/drawingml/2011/main" val="1"/>
             </a:ext>
           </a:extLst>
         </p:spPr>
@@ -3735,7 +3735,7 @@
           </a:ln>
           <a:extLst>
             <a:ext uri="{C572A759-6A51-4108-AA02-DFA0A04FC94B}">
-              <ma14:wrappingTextBoxFlag xmlns:ma14="http://schemas.microsoft.com/office/mac/drawingml/2011/main" xmlns:a14="http://schemas.microsoft.com/office/drawing/2010/main" xmlns:m="http://schemas.openxmlformats.org/officeDocument/2006/math" xmlns="" val="1"/>
+              <ma14:wrappingTextBoxFlag xmlns="" xmlns:m="http://schemas.openxmlformats.org/officeDocument/2006/math" xmlns:a14="http://schemas.microsoft.com/office/drawing/2010/main" xmlns:ma14="http://schemas.microsoft.com/office/mac/drawingml/2011/main" val="1"/>
             </a:ext>
           </a:extLst>
         </p:spPr>
@@ -3839,7 +3839,7 @@
           </a:ln>
           <a:extLst>
             <a:ext uri="{C572A759-6A51-4108-AA02-DFA0A04FC94B}">
-              <ma14:wrappingTextBoxFlag xmlns:ma14="http://schemas.microsoft.com/office/mac/drawingml/2011/main" xmlns:a14="http://schemas.microsoft.com/office/drawing/2010/main" xmlns:m="http://schemas.openxmlformats.org/officeDocument/2006/math" xmlns="" val="1"/>
+              <ma14:wrappingTextBoxFlag xmlns="" xmlns:m="http://schemas.openxmlformats.org/officeDocument/2006/math" xmlns:a14="http://schemas.microsoft.com/office/drawing/2010/main" xmlns:ma14="http://schemas.microsoft.com/office/mac/drawingml/2011/main" val="1"/>
             </a:ext>
           </a:extLst>
         </p:spPr>
@@ -3943,7 +3943,7 @@
           </a:ln>
           <a:extLst>
             <a:ext uri="{C572A759-6A51-4108-AA02-DFA0A04FC94B}">
-              <ma14:wrappingTextBoxFlag xmlns:ma14="http://schemas.microsoft.com/office/mac/drawingml/2011/main" xmlns:a14="http://schemas.microsoft.com/office/drawing/2010/main" xmlns:m="http://schemas.openxmlformats.org/officeDocument/2006/math" xmlns="" val="1"/>
+              <ma14:wrappingTextBoxFlag xmlns="" xmlns:m="http://schemas.openxmlformats.org/officeDocument/2006/math" xmlns:a14="http://schemas.microsoft.com/office/drawing/2010/main" xmlns:ma14="http://schemas.microsoft.com/office/mac/drawingml/2011/main" val="1"/>
             </a:ext>
           </a:extLst>
         </p:spPr>
@@ -4023,7 +4023,7 @@
           </a:ln>
           <a:extLst>
             <a:ext uri="{C572A759-6A51-4108-AA02-DFA0A04FC94B}">
-              <ma14:wrappingTextBoxFlag xmlns:ma14="http://schemas.microsoft.com/office/mac/drawingml/2011/main" xmlns:a14="http://schemas.microsoft.com/office/drawing/2010/main" xmlns:m="http://schemas.openxmlformats.org/officeDocument/2006/math" xmlns="" val="1"/>
+              <ma14:wrappingTextBoxFlag xmlns="" xmlns:m="http://schemas.openxmlformats.org/officeDocument/2006/math" xmlns:a14="http://schemas.microsoft.com/office/drawing/2010/main" xmlns:ma14="http://schemas.microsoft.com/office/mac/drawingml/2011/main" val="1"/>
             </a:ext>
           </a:extLst>
         </p:spPr>
@@ -4251,7 +4251,7 @@
           </a:ln>
           <a:extLst>
             <a:ext uri="{C572A759-6A51-4108-AA02-DFA0A04FC94B}">
-              <ma14:wrappingTextBoxFlag xmlns:ma14="http://schemas.microsoft.com/office/mac/drawingml/2011/main" xmlns:a14="http://schemas.microsoft.com/office/drawing/2010/main" xmlns:m="http://schemas.openxmlformats.org/officeDocument/2006/math" xmlns="" val="1"/>
+              <ma14:wrappingTextBoxFlag xmlns="" xmlns:m="http://schemas.openxmlformats.org/officeDocument/2006/math" xmlns:a14="http://schemas.microsoft.com/office/drawing/2010/main" xmlns:ma14="http://schemas.microsoft.com/office/mac/drawingml/2011/main" val="1"/>
             </a:ext>
           </a:extLst>
         </p:spPr>
@@ -4439,7 +4439,7 @@
           </a:ln>
           <a:extLst>
             <a:ext uri="{C572A759-6A51-4108-AA02-DFA0A04FC94B}">
-              <ma14:wrappingTextBoxFlag xmlns:ma14="http://schemas.microsoft.com/office/mac/drawingml/2011/main" xmlns:a14="http://schemas.microsoft.com/office/drawing/2010/main" xmlns:m="http://schemas.openxmlformats.org/officeDocument/2006/math" xmlns="" val="1"/>
+              <ma14:wrappingTextBoxFlag xmlns="" xmlns:m="http://schemas.openxmlformats.org/officeDocument/2006/math" xmlns:a14="http://schemas.microsoft.com/office/drawing/2010/main" xmlns:ma14="http://schemas.microsoft.com/office/mac/drawingml/2011/main" val="1"/>
             </a:ext>
           </a:extLst>
         </p:spPr>
@@ -4645,7 +4645,7 @@
           </a:ln>
           <a:extLst>
             <a:ext uri="{C572A759-6A51-4108-AA02-DFA0A04FC94B}">
-              <ma14:wrappingTextBoxFlag xmlns:ma14="http://schemas.microsoft.com/office/mac/drawingml/2011/main" xmlns:a14="http://schemas.microsoft.com/office/drawing/2010/main" xmlns:m="http://schemas.openxmlformats.org/officeDocument/2006/math" xmlns="" val="1"/>
+              <ma14:wrappingTextBoxFlag xmlns="" xmlns:m="http://schemas.openxmlformats.org/officeDocument/2006/math" xmlns:a14="http://schemas.microsoft.com/office/drawing/2010/main" xmlns:ma14="http://schemas.microsoft.com/office/mac/drawingml/2011/main" val="1"/>
             </a:ext>
           </a:extLst>
         </p:spPr>
@@ -4761,7 +4761,7 @@
           </a:ln>
           <a:extLst>
             <a:ext uri="{C572A759-6A51-4108-AA02-DFA0A04FC94B}">
-              <ma14:wrappingTextBoxFlag xmlns:ma14="http://schemas.microsoft.com/office/mac/drawingml/2011/main" xmlns:a14="http://schemas.microsoft.com/office/drawing/2010/main" xmlns:m="http://schemas.openxmlformats.org/officeDocument/2006/math" xmlns="" val="1"/>
+              <ma14:wrappingTextBoxFlag xmlns="" xmlns:m="http://schemas.openxmlformats.org/officeDocument/2006/math" xmlns:a14="http://schemas.microsoft.com/office/drawing/2010/main" xmlns:ma14="http://schemas.microsoft.com/office/mac/drawingml/2011/main" val="1"/>
             </a:ext>
           </a:extLst>
         </p:spPr>
@@ -4859,7 +4859,7 @@
           </a:ln>
           <a:extLst>
             <a:ext uri="{C572A759-6A51-4108-AA02-DFA0A04FC94B}">
-              <ma14:wrappingTextBoxFlag xmlns:ma14="http://schemas.microsoft.com/office/mac/drawingml/2011/main" xmlns:a14="http://schemas.microsoft.com/office/drawing/2010/main" xmlns:m="http://schemas.openxmlformats.org/officeDocument/2006/math" xmlns="" val="1"/>
+              <ma14:wrappingTextBoxFlag xmlns="" xmlns:m="http://schemas.openxmlformats.org/officeDocument/2006/math" xmlns:a14="http://schemas.microsoft.com/office/drawing/2010/main" xmlns:ma14="http://schemas.microsoft.com/office/mac/drawingml/2011/main" val="1"/>
             </a:ext>
           </a:extLst>
         </p:spPr>
@@ -4984,7 +4984,7 @@
           </a:ln>
           <a:extLst>
             <a:ext uri="{C572A759-6A51-4108-AA02-DFA0A04FC94B}">
-              <ma14:wrappingTextBoxFlag xmlns:ma14="http://schemas.microsoft.com/office/mac/drawingml/2011/main" xmlns:a14="http://schemas.microsoft.com/office/drawing/2010/main" xmlns:m="http://schemas.openxmlformats.org/officeDocument/2006/math" xmlns="" val="1"/>
+              <ma14:wrappingTextBoxFlag xmlns="" xmlns:m="http://schemas.openxmlformats.org/officeDocument/2006/math" xmlns:a14="http://schemas.microsoft.com/office/drawing/2010/main" xmlns:ma14="http://schemas.microsoft.com/office/mac/drawingml/2011/main" val="1"/>
             </a:ext>
           </a:extLst>
         </p:spPr>
@@ -5078,7 +5078,7 @@
           </a:ln>
           <a:extLst>
             <a:ext uri="{C572A759-6A51-4108-AA02-DFA0A04FC94B}">
-              <ma14:wrappingTextBoxFlag xmlns:ma14="http://schemas.microsoft.com/office/mac/drawingml/2011/main" xmlns:a14="http://schemas.microsoft.com/office/drawing/2010/main" xmlns:m="http://schemas.openxmlformats.org/officeDocument/2006/math" xmlns="" val="1"/>
+              <ma14:wrappingTextBoxFlag xmlns="" xmlns:m="http://schemas.openxmlformats.org/officeDocument/2006/math" xmlns:a14="http://schemas.microsoft.com/office/drawing/2010/main" xmlns:ma14="http://schemas.microsoft.com/office/mac/drawingml/2011/main" val="1"/>
             </a:ext>
           </a:extLst>
         </p:spPr>
@@ -5172,7 +5172,7 @@
           </a:ln>
           <a:extLst>
             <a:ext uri="{C572A759-6A51-4108-AA02-DFA0A04FC94B}">
-              <ma14:wrappingTextBoxFlag xmlns:ma14="http://schemas.microsoft.com/office/mac/drawingml/2011/main" xmlns:a14="http://schemas.microsoft.com/office/drawing/2010/main" xmlns:m="http://schemas.openxmlformats.org/officeDocument/2006/math" xmlns="" val="1"/>
+              <ma14:wrappingTextBoxFlag xmlns="" xmlns:m="http://schemas.openxmlformats.org/officeDocument/2006/math" xmlns:a14="http://schemas.microsoft.com/office/drawing/2010/main" xmlns:ma14="http://schemas.microsoft.com/office/mac/drawingml/2011/main" val="1"/>
             </a:ext>
           </a:extLst>
         </p:spPr>
@@ -5275,7 +5275,7 @@
           </a:ln>
           <a:extLst>
             <a:ext uri="{C572A759-6A51-4108-AA02-DFA0A04FC94B}">
-              <ma14:wrappingTextBoxFlag xmlns:ma14="http://schemas.microsoft.com/office/mac/drawingml/2011/main" xmlns:a14="http://schemas.microsoft.com/office/drawing/2010/main" xmlns:m="http://schemas.openxmlformats.org/officeDocument/2006/math" xmlns="" val="1"/>
+              <ma14:wrappingTextBoxFlag xmlns="" xmlns:m="http://schemas.openxmlformats.org/officeDocument/2006/math" xmlns:a14="http://schemas.microsoft.com/office/drawing/2010/main" xmlns:ma14="http://schemas.microsoft.com/office/mac/drawingml/2011/main" val="1"/>
             </a:ext>
           </a:extLst>
         </p:spPr>
@@ -5415,7 +5415,7 @@
           </a:ln>
           <a:extLst>
             <a:ext uri="{C572A759-6A51-4108-AA02-DFA0A04FC94B}">
-              <ma14:wrappingTextBoxFlag xmlns:ma14="http://schemas.microsoft.com/office/mac/drawingml/2011/main" xmlns:a14="http://schemas.microsoft.com/office/drawing/2010/main" xmlns:m="http://schemas.openxmlformats.org/officeDocument/2006/math" xmlns="" val="1"/>
+              <ma14:wrappingTextBoxFlag xmlns="" xmlns:m="http://schemas.openxmlformats.org/officeDocument/2006/math" xmlns:a14="http://schemas.microsoft.com/office/drawing/2010/main" xmlns:ma14="http://schemas.microsoft.com/office/mac/drawingml/2011/main" val="1"/>
             </a:ext>
           </a:extLst>
         </p:spPr>
@@ -5960,7 +5960,7 @@
           <a:effectLst/>
           <a:extLst>
             <a:ext uri="{C572A759-6A51-4108-AA02-DFA0A04FC94B}">
-              <ma14:wrappingTextBoxFlag xmlns:ma14="http://schemas.microsoft.com/office/mac/drawingml/2011/main" xmlns:a14="http://schemas.microsoft.com/office/drawing/2010/main" xmlns:m="http://schemas.openxmlformats.org/officeDocument/2006/math" xmlns="" val="1"/>
+              <ma14:wrappingTextBoxFlag xmlns="" xmlns:m="http://schemas.openxmlformats.org/officeDocument/2006/math" xmlns:a14="http://schemas.microsoft.com/office/drawing/2010/main" xmlns:ma14="http://schemas.microsoft.com/office/mac/drawingml/2011/main" val="1"/>
             </a:ext>
           </a:extLst>
         </p:spPr>
@@ -6012,7 +6012,7 @@
           </a:ln>
           <a:extLst>
             <a:ext uri="{C572A759-6A51-4108-AA02-DFA0A04FC94B}">
-              <ma14:wrappingTextBoxFlag xmlns:ma14="http://schemas.microsoft.com/office/mac/drawingml/2011/main" xmlns:a14="http://schemas.microsoft.com/office/drawing/2010/main" xmlns:m="http://schemas.openxmlformats.org/officeDocument/2006/math" xmlns="" val="1"/>
+              <ma14:wrappingTextBoxFlag xmlns="" xmlns:m="http://schemas.openxmlformats.org/officeDocument/2006/math" xmlns:a14="http://schemas.microsoft.com/office/drawing/2010/main" xmlns:ma14="http://schemas.microsoft.com/office/mac/drawingml/2011/main" val="1"/>
             </a:ext>
           </a:extLst>
         </p:spPr>
@@ -6164,7 +6164,7 @@
           </a:ln>
           <a:extLst>
             <a:ext uri="{C572A759-6A51-4108-AA02-DFA0A04FC94B}">
-              <ma14:wrappingTextBoxFlag xmlns:ma14="http://schemas.microsoft.com/office/mac/drawingml/2011/main" xmlns:a14="http://schemas.microsoft.com/office/drawing/2010/main" xmlns:m="http://schemas.openxmlformats.org/officeDocument/2006/math" xmlns="" val="1"/>
+              <ma14:wrappingTextBoxFlag xmlns="" xmlns:m="http://schemas.openxmlformats.org/officeDocument/2006/math" xmlns:a14="http://schemas.microsoft.com/office/drawing/2010/main" xmlns:ma14="http://schemas.microsoft.com/office/mac/drawingml/2011/main" val="1"/>
             </a:ext>
           </a:extLst>
         </p:spPr>
@@ -6429,7 +6429,7 @@
                 <a:effectLst/>
                 <a:extLst>
                   <a:ext uri="{C572A759-6A51-4108-AA02-DFA0A04FC94B}">
-                    <ma14:wrappingTextBoxFlag xmlns:ma14="http://schemas.microsoft.com/office/mac/drawingml/2011/main" xmlns:a14="http://schemas.microsoft.com/office/drawing/2010/main" xmlns:m="http://schemas.openxmlformats.org/officeDocument/2006/math" xmlns="" val="1"/>
+                    <ma14:wrappingTextBoxFlag xmlns="" xmlns:m="http://schemas.openxmlformats.org/officeDocument/2006/math" xmlns:a14="http://schemas.microsoft.com/office/drawing/2010/main" xmlns:ma14="http://schemas.microsoft.com/office/mac/drawingml/2011/main" val="1"/>
                   </a:ext>
                 </a:extLst>
               </p:spPr>
@@ -6811,7 +6811,7 @@
           </a:ln>
           <a:extLst>
             <a:ext uri="{C572A759-6A51-4108-AA02-DFA0A04FC94B}">
-              <ma14:wrappingTextBoxFlag xmlns:ma14="http://schemas.microsoft.com/office/mac/drawingml/2011/main" xmlns:a14="http://schemas.microsoft.com/office/drawing/2010/main" xmlns:m="http://schemas.openxmlformats.org/officeDocument/2006/math" xmlns="" val="1"/>
+              <ma14:wrappingTextBoxFlag xmlns="" xmlns:m="http://schemas.openxmlformats.org/officeDocument/2006/math" xmlns:a14="http://schemas.microsoft.com/office/drawing/2010/main" xmlns:ma14="http://schemas.microsoft.com/office/mac/drawingml/2011/main" val="1"/>
             </a:ext>
           </a:extLst>
         </p:spPr>
@@ -8308,7 +8308,7 @@
             <a:effectLst/>
             <a:extLst>
               <a:ext uri="{C572A759-6A51-4108-AA02-DFA0A04FC94B}">
-                <ma14:wrappingTextBoxFlag xmlns:ma14="http://schemas.microsoft.com/office/mac/drawingml/2011/main" xmlns:a14="http://schemas.microsoft.com/office/drawing/2010/main" xmlns:m="http://schemas.openxmlformats.org/officeDocument/2006/math" xmlns="" val="1"/>
+                <ma14:wrappingTextBoxFlag xmlns="" xmlns:m="http://schemas.openxmlformats.org/officeDocument/2006/math" xmlns:a14="http://schemas.microsoft.com/office/drawing/2010/main" xmlns:ma14="http://schemas.microsoft.com/office/mac/drawingml/2011/main" val="1"/>
               </a:ext>
             </a:extLst>
           </p:spPr>
@@ -8640,7 +8640,7 @@
           </a:ln>
           <a:extLst>
             <a:ext uri="{C572A759-6A51-4108-AA02-DFA0A04FC94B}">
-              <ma14:wrappingTextBoxFlag xmlns:ma14="http://schemas.microsoft.com/office/mac/drawingml/2011/main" xmlns:a14="http://schemas.microsoft.com/office/drawing/2010/main" xmlns:m="http://schemas.openxmlformats.org/officeDocument/2006/math" xmlns="" val="1"/>
+              <ma14:wrappingTextBoxFlag xmlns="" xmlns:m="http://schemas.openxmlformats.org/officeDocument/2006/math" xmlns:a14="http://schemas.microsoft.com/office/drawing/2010/main" xmlns:ma14="http://schemas.microsoft.com/office/mac/drawingml/2011/main" val="1"/>
             </a:ext>
           </a:extLst>
         </p:spPr>
@@ -8799,7 +8799,7 @@
             <a:effectLst/>
             <a:extLst>
               <a:ext uri="{C572A759-6A51-4108-AA02-DFA0A04FC94B}">
-                <ma14:wrappingTextBoxFlag xmlns:ma14="http://schemas.microsoft.com/office/mac/drawingml/2011/main" xmlns:a14="http://schemas.microsoft.com/office/drawing/2010/main" xmlns:m="http://schemas.openxmlformats.org/officeDocument/2006/math" xmlns="" val="1"/>
+                <ma14:wrappingTextBoxFlag xmlns="" xmlns:m="http://schemas.openxmlformats.org/officeDocument/2006/math" xmlns:a14="http://schemas.microsoft.com/office/drawing/2010/main" xmlns:ma14="http://schemas.microsoft.com/office/mac/drawingml/2011/main" val="1"/>
               </a:ext>
             </a:extLst>
           </p:spPr>
@@ -9084,7 +9084,7 @@
             <a:effectLst/>
             <a:extLst>
               <a:ext uri="{C572A759-6A51-4108-AA02-DFA0A04FC94B}">
-                <ma14:wrappingTextBoxFlag xmlns:ma14="http://schemas.microsoft.com/office/mac/drawingml/2011/main" xmlns:a14="http://schemas.microsoft.com/office/drawing/2010/main" xmlns:m="http://schemas.openxmlformats.org/officeDocument/2006/math" xmlns="" val="1"/>
+                <ma14:wrappingTextBoxFlag xmlns="" xmlns:m="http://schemas.openxmlformats.org/officeDocument/2006/math" xmlns:a14="http://schemas.microsoft.com/office/drawing/2010/main" xmlns:ma14="http://schemas.microsoft.com/office/mac/drawingml/2011/main" val="1"/>
               </a:ext>
             </a:extLst>
           </p:spPr>
@@ -9676,7 +9676,7 @@
           </a:ln>
           <a:extLst>
             <a:ext uri="{C572A759-6A51-4108-AA02-DFA0A04FC94B}">
-              <ma14:wrappingTextBoxFlag xmlns="" xmlns:m="http://schemas.openxmlformats.org/officeDocument/2006/math" xmlns:a14="http://schemas.microsoft.com/office/drawing/2010/main" xmlns:ma14="http://schemas.microsoft.com/office/mac/drawingml/2011/main" val="1"/>
+              <ma14:wrappingTextBoxFlag xmlns:ma14="http://schemas.microsoft.com/office/mac/drawingml/2011/main" xmlns:a14="http://schemas.microsoft.com/office/drawing/2010/main" xmlns:m="http://schemas.openxmlformats.org/officeDocument/2006/math" xmlns="" val="1"/>
             </a:ext>
           </a:extLst>
         </p:spPr>
@@ -9748,7 +9748,7 @@
             </a:ln>
             <a:extLst>
               <a:ext uri="{C572A759-6A51-4108-AA02-DFA0A04FC94B}">
-                <ma14:wrappingTextBoxFlag xmlns:ma14="http://schemas.microsoft.com/office/mac/drawingml/2011/main" xmlns:a14="http://schemas.microsoft.com/office/drawing/2010/main" xmlns:m="http://schemas.openxmlformats.org/officeDocument/2006/math" xmlns="" val="1"/>
+                <ma14:wrappingTextBoxFlag xmlns="" xmlns:m="http://schemas.openxmlformats.org/officeDocument/2006/math" xmlns:a14="http://schemas.microsoft.com/office/drawing/2010/main" xmlns:ma14="http://schemas.microsoft.com/office/mac/drawingml/2011/main" val="1"/>
               </a:ext>
             </a:extLst>
           </p:spPr>
@@ -9804,7 +9804,7 @@
             <a:sp3d/>
             <a:extLst>
               <a:ext uri="{C572A759-6A51-4108-AA02-DFA0A04FC94B}">
-                <ma14:wrappingTextBoxFlag xmlns="" xmlns:m="http://schemas.openxmlformats.org/officeDocument/2006/math" xmlns:a14="http://schemas.microsoft.com/office/drawing/2010/main" xmlns:ma14="http://schemas.microsoft.com/office/mac/drawingml/2011/main" val="1"/>
+                <ma14:wrappingTextBoxFlag xmlns:ma14="http://schemas.microsoft.com/office/mac/drawingml/2011/main" xmlns:a14="http://schemas.microsoft.com/office/drawing/2010/main" xmlns:m="http://schemas.openxmlformats.org/officeDocument/2006/math" xmlns="" val="1"/>
               </a:ext>
             </a:extLst>
           </p:spPr>
@@ -10197,7 +10197,7 @@
             <a:sp3d/>
             <a:extLst>
               <a:ext uri="{C572A759-6A51-4108-AA02-DFA0A04FC94B}">
-                <ma14:wrappingTextBoxFlag xmlns="" xmlns:ma14="http://schemas.microsoft.com/office/mac/drawingml/2011/main" xmlns:a14="http://schemas.microsoft.com/office/drawing/2010/main" xmlns:m="http://schemas.openxmlformats.org/officeDocument/2006/math" val="1"/>
+                <ma14:wrappingTextBoxFlag xmlns:m="http://schemas.openxmlformats.org/officeDocument/2006/math" xmlns:a14="http://schemas.microsoft.com/office/drawing/2010/main" xmlns:ma14="http://schemas.microsoft.com/office/mac/drawingml/2011/main" xmlns="" val="1"/>
               </a:ext>
             </a:extLst>
           </p:spPr>
@@ -10537,7 +10537,7 @@
             </a:ln>
             <a:extLst>
               <a:ext uri="{C572A759-6A51-4108-AA02-DFA0A04FC94B}">
-                <ma14:wrappingTextBoxFlag xmlns:ma14="http://schemas.microsoft.com/office/mac/drawingml/2011/main" xmlns:a14="http://schemas.microsoft.com/office/drawing/2010/main" xmlns:m="http://schemas.openxmlformats.org/officeDocument/2006/math" xmlns="" val="1"/>
+                <ma14:wrappingTextBoxFlag xmlns="" xmlns:m="http://schemas.openxmlformats.org/officeDocument/2006/math" xmlns:a14="http://schemas.microsoft.com/office/drawing/2010/main" xmlns:ma14="http://schemas.microsoft.com/office/mac/drawingml/2011/main" val="1"/>
               </a:ext>
             </a:extLst>
           </p:spPr>
@@ -10652,7 +10652,7 @@
             </a:ln>
             <a:extLst>
               <a:ext uri="{C572A759-6A51-4108-AA02-DFA0A04FC94B}">
-                <ma14:wrappingTextBoxFlag xmlns:ma14="http://schemas.microsoft.com/office/mac/drawingml/2011/main" xmlns:a14="http://schemas.microsoft.com/office/drawing/2010/main" xmlns:m="http://schemas.openxmlformats.org/officeDocument/2006/math" xmlns="" val="1"/>
+                <ma14:wrappingTextBoxFlag xmlns="" xmlns:m="http://schemas.openxmlformats.org/officeDocument/2006/math" xmlns:a14="http://schemas.microsoft.com/office/drawing/2010/main" xmlns:ma14="http://schemas.microsoft.com/office/mac/drawingml/2011/main" val="1"/>
               </a:ext>
             </a:extLst>
           </p:spPr>
@@ -10767,7 +10767,7 @@
             </a:ln>
             <a:extLst>
               <a:ext uri="{C572A759-6A51-4108-AA02-DFA0A04FC94B}">
-                <ma14:wrappingTextBoxFlag xmlns:ma14="http://schemas.microsoft.com/office/mac/drawingml/2011/main" xmlns:a14="http://schemas.microsoft.com/office/drawing/2010/main" xmlns:m="http://schemas.openxmlformats.org/officeDocument/2006/math" xmlns="" val="1"/>
+                <ma14:wrappingTextBoxFlag xmlns="" xmlns:m="http://schemas.openxmlformats.org/officeDocument/2006/math" xmlns:a14="http://schemas.microsoft.com/office/drawing/2010/main" xmlns:ma14="http://schemas.microsoft.com/office/mac/drawingml/2011/main" val="1"/>
               </a:ext>
             </a:extLst>
           </p:spPr>
@@ -11882,7 +11882,7 @@
             </a:ln>
             <a:extLst>
               <a:ext uri="{C572A759-6A51-4108-AA02-DFA0A04FC94B}">
-                <ma14:wrappingTextBoxFlag xmlns:ma14="http://schemas.microsoft.com/office/mac/drawingml/2011/main" xmlns:a14="http://schemas.microsoft.com/office/drawing/2010/main" xmlns:m="http://schemas.openxmlformats.org/officeDocument/2006/math" xmlns="" val="1"/>
+                <ma14:wrappingTextBoxFlag xmlns="" xmlns:m="http://schemas.openxmlformats.org/officeDocument/2006/math" xmlns:a14="http://schemas.microsoft.com/office/drawing/2010/main" xmlns:ma14="http://schemas.microsoft.com/office/mac/drawingml/2011/main" val="1"/>
               </a:ext>
             </a:extLst>
           </p:spPr>
@@ -12507,7 +12507,7 @@
           </a:ln>
           <a:extLst>
             <a:ext uri="{C572A759-6A51-4108-AA02-DFA0A04FC94B}">
-              <ma14:wrappingTextBoxFlag xmlns:m="http://schemas.openxmlformats.org/officeDocument/2006/math" xmlns:a14="http://schemas.microsoft.com/office/drawing/2010/main" xmlns:ma14="http://schemas.microsoft.com/office/mac/drawingml/2011/main" xmlns="" val="1"/>
+              <ma14:wrappingTextBoxFlag xmlns="" xmlns:ma14="http://schemas.microsoft.com/office/mac/drawingml/2011/main" xmlns:a14="http://schemas.microsoft.com/office/drawing/2010/main" xmlns:m="http://schemas.openxmlformats.org/officeDocument/2006/math" val="1"/>
             </a:ext>
           </a:extLst>
         </p:spPr>
@@ -12563,7 +12563,7 @@
           </a:ln>
           <a:extLst>
             <a:ext uri="{C572A759-6A51-4108-AA02-DFA0A04FC94B}">
-              <ma14:wrappingTextBoxFlag xmlns:ma14="http://schemas.microsoft.com/office/mac/drawingml/2011/main" xmlns:a14="http://schemas.microsoft.com/office/drawing/2010/main" xmlns:m="http://schemas.openxmlformats.org/officeDocument/2006/math" xmlns="" val="1"/>
+              <ma14:wrappingTextBoxFlag xmlns="" xmlns:m="http://schemas.openxmlformats.org/officeDocument/2006/math" xmlns:a14="http://schemas.microsoft.com/office/drawing/2010/main" xmlns:ma14="http://schemas.microsoft.com/office/mac/drawingml/2011/main" val="1"/>
             </a:ext>
           </a:extLst>
         </p:spPr>
@@ -12817,7 +12817,7 @@
           </a:ln>
           <a:extLst>
             <a:ext uri="{C572A759-6A51-4108-AA02-DFA0A04FC94B}">
-              <ma14:wrappingTextBoxFlag xmlns:ma14="http://schemas.microsoft.com/office/mac/drawingml/2011/main" xmlns:a14="http://schemas.microsoft.com/office/drawing/2010/main" xmlns:m="http://schemas.openxmlformats.org/officeDocument/2006/math" xmlns="" val="1"/>
+              <ma14:wrappingTextBoxFlag xmlns="" xmlns:m="http://schemas.openxmlformats.org/officeDocument/2006/math" xmlns:a14="http://schemas.microsoft.com/office/drawing/2010/main" xmlns:ma14="http://schemas.microsoft.com/office/mac/drawingml/2011/main" val="1"/>
             </a:ext>
           </a:extLst>
         </p:spPr>
@@ -12927,7 +12927,7 @@
           </a:ln>
           <a:extLst>
             <a:ext uri="{C572A759-6A51-4108-AA02-DFA0A04FC94B}">
-              <ma14:wrappingTextBoxFlag xmlns:ma14="http://schemas.microsoft.com/office/mac/drawingml/2011/main" xmlns:a14="http://schemas.microsoft.com/office/drawing/2010/main" xmlns:m="http://schemas.openxmlformats.org/officeDocument/2006/math" xmlns="" val="1"/>
+              <ma14:wrappingTextBoxFlag xmlns="" xmlns:m="http://schemas.openxmlformats.org/officeDocument/2006/math" xmlns:a14="http://schemas.microsoft.com/office/drawing/2010/main" xmlns:ma14="http://schemas.microsoft.com/office/mac/drawingml/2011/main" val="1"/>
             </a:ext>
           </a:extLst>
         </p:spPr>
@@ -13163,7 +13163,7 @@
           </a:ln>
           <a:extLst>
             <a:ext uri="{C572A759-6A51-4108-AA02-DFA0A04FC94B}">
-              <ma14:wrappingTextBoxFlag xmlns:ma14="http://schemas.microsoft.com/office/mac/drawingml/2011/main" xmlns:a14="http://schemas.microsoft.com/office/drawing/2010/main" xmlns:m="http://schemas.openxmlformats.org/officeDocument/2006/math" xmlns="" val="1"/>
+              <ma14:wrappingTextBoxFlag xmlns="" xmlns:m="http://schemas.openxmlformats.org/officeDocument/2006/math" xmlns:a14="http://schemas.microsoft.com/office/drawing/2010/main" xmlns:ma14="http://schemas.microsoft.com/office/mac/drawingml/2011/main" val="1"/>
             </a:ext>
           </a:extLst>
         </p:spPr>
@@ -13461,7 +13461,7 @@
           </a:ln>
           <a:extLst>
             <a:ext uri="{C572A759-6A51-4108-AA02-DFA0A04FC94B}">
-              <ma14:wrappingTextBoxFlag xmlns:ma14="http://schemas.microsoft.com/office/mac/drawingml/2011/main" xmlns:a14="http://schemas.microsoft.com/office/drawing/2010/main" xmlns:m="http://schemas.openxmlformats.org/officeDocument/2006/math" xmlns="" val="1"/>
+              <ma14:wrappingTextBoxFlag xmlns="" xmlns:m="http://schemas.openxmlformats.org/officeDocument/2006/math" xmlns:a14="http://schemas.microsoft.com/office/drawing/2010/main" xmlns:ma14="http://schemas.microsoft.com/office/mac/drawingml/2011/main" val="1"/>
             </a:ext>
           </a:extLst>
         </p:spPr>
@@ -13565,7 +13565,7 @@
           </a:ln>
           <a:extLst>
             <a:ext uri="{C572A759-6A51-4108-AA02-DFA0A04FC94B}">
-              <ma14:wrappingTextBoxFlag xmlns:ma14="http://schemas.microsoft.com/office/mac/drawingml/2011/main" xmlns:a14="http://schemas.microsoft.com/office/drawing/2010/main" xmlns:m="http://schemas.openxmlformats.org/officeDocument/2006/math" xmlns="" val="1"/>
+              <ma14:wrappingTextBoxFlag xmlns="" xmlns:m="http://schemas.openxmlformats.org/officeDocument/2006/math" xmlns:a14="http://schemas.microsoft.com/office/drawing/2010/main" xmlns:ma14="http://schemas.microsoft.com/office/mac/drawingml/2011/main" val="1"/>
             </a:ext>
           </a:extLst>
         </p:spPr>
@@ -13771,7 +13771,7 @@
           </a:ln>
           <a:extLst>
             <a:ext uri="{C572A759-6A51-4108-AA02-DFA0A04FC94B}">
-              <ma14:wrappingTextBoxFlag xmlns:m="http://schemas.openxmlformats.org/officeDocument/2006/math" xmlns:a14="http://schemas.microsoft.com/office/drawing/2010/main" xmlns:ma14="http://schemas.microsoft.com/office/mac/drawingml/2011/main" xmlns="" val="1"/>
+              <ma14:wrappingTextBoxFlag xmlns="" xmlns:ma14="http://schemas.microsoft.com/office/mac/drawingml/2011/main" xmlns:a14="http://schemas.microsoft.com/office/drawing/2010/main" xmlns:m="http://schemas.openxmlformats.org/officeDocument/2006/math" val="1"/>
             </a:ext>
           </a:extLst>
         </p:spPr>
@@ -13939,7 +13939,7 @@
           </a:ln>
           <a:extLst>
             <a:ext uri="{C572A759-6A51-4108-AA02-DFA0A04FC94B}">
-              <ma14:wrappingTextBoxFlag xmlns:m="http://schemas.openxmlformats.org/officeDocument/2006/math" xmlns:a14="http://schemas.microsoft.com/office/drawing/2010/main" xmlns:ma14="http://schemas.microsoft.com/office/mac/drawingml/2011/main" xmlns="" val="1"/>
+              <ma14:wrappingTextBoxFlag xmlns="" xmlns:ma14="http://schemas.microsoft.com/office/mac/drawingml/2011/main" xmlns:a14="http://schemas.microsoft.com/office/drawing/2010/main" xmlns:m="http://schemas.openxmlformats.org/officeDocument/2006/math" val="1"/>
             </a:ext>
           </a:extLst>
         </p:spPr>
@@ -14267,7 +14267,7 @@
           </a:ln>
           <a:extLst>
             <a:ext uri="{C572A759-6A51-4108-AA02-DFA0A04FC94B}">
-              <ma14:wrappingTextBoxFlag xmlns="" xmlns:m="http://schemas.openxmlformats.org/officeDocument/2006/math" xmlns:a14="http://schemas.microsoft.com/office/drawing/2010/main" xmlns:ma14="http://schemas.microsoft.com/office/mac/drawingml/2011/main" val="1"/>
+              <ma14:wrappingTextBoxFlag xmlns:ma14="http://schemas.microsoft.com/office/mac/drawingml/2011/main" xmlns:a14="http://schemas.microsoft.com/office/drawing/2010/main" xmlns:m="http://schemas.openxmlformats.org/officeDocument/2006/math" xmlns="" val="1"/>
             </a:ext>
           </a:extLst>
         </p:spPr>
@@ -14416,7 +14416,7 @@
           </a:ln>
           <a:extLst>
             <a:ext uri="{C572A759-6A51-4108-AA02-DFA0A04FC94B}">
-              <ma14:wrappingTextBoxFlag xmlns="" xmlns:m="http://schemas.openxmlformats.org/officeDocument/2006/math" xmlns:a14="http://schemas.microsoft.com/office/drawing/2010/main" xmlns:ma14="http://schemas.microsoft.com/office/mac/drawingml/2011/main" val="1"/>
+              <ma14:wrappingTextBoxFlag xmlns:ma14="http://schemas.microsoft.com/office/mac/drawingml/2011/main" xmlns:a14="http://schemas.microsoft.com/office/drawing/2010/main" xmlns:m="http://schemas.openxmlformats.org/officeDocument/2006/math" xmlns="" val="1"/>
             </a:ext>
           </a:extLst>
         </p:spPr>
@@ -14520,7 +14520,7 @@
           </a:ln>
           <a:extLst>
             <a:ext uri="{C572A759-6A51-4108-AA02-DFA0A04FC94B}">
-              <ma14:wrappingTextBoxFlag xmlns="" xmlns:m="http://schemas.openxmlformats.org/officeDocument/2006/math" xmlns:a14="http://schemas.microsoft.com/office/drawing/2010/main" xmlns:ma14="http://schemas.microsoft.com/office/mac/drawingml/2011/main" val="1"/>
+              <ma14:wrappingTextBoxFlag xmlns:ma14="http://schemas.microsoft.com/office/mac/drawingml/2011/main" xmlns:a14="http://schemas.microsoft.com/office/drawing/2010/main" xmlns:m="http://schemas.openxmlformats.org/officeDocument/2006/math" xmlns="" val="1"/>
             </a:ext>
           </a:extLst>
         </p:spPr>
@@ -14576,7 +14576,7 @@
           </a:ln>
           <a:extLst>
             <a:ext uri="{C572A759-6A51-4108-AA02-DFA0A04FC94B}">
-              <ma14:wrappingTextBoxFlag xmlns="" xmlns:m="http://schemas.openxmlformats.org/officeDocument/2006/math" xmlns:a14="http://schemas.microsoft.com/office/drawing/2010/main" xmlns:ma14="http://schemas.microsoft.com/office/mac/drawingml/2011/main" val="1"/>
+              <ma14:wrappingTextBoxFlag xmlns:ma14="http://schemas.microsoft.com/office/mac/drawingml/2011/main" xmlns:a14="http://schemas.microsoft.com/office/drawing/2010/main" xmlns:m="http://schemas.openxmlformats.org/officeDocument/2006/math" xmlns="" val="1"/>
             </a:ext>
           </a:extLst>
         </p:spPr>
@@ -14639,7 +14639,7 @@
           </a:ln>
           <a:extLst>
             <a:ext uri="{C572A759-6A51-4108-AA02-DFA0A04FC94B}">
-              <ma14:wrappingTextBoxFlag xmlns="" xmlns:m="http://schemas.openxmlformats.org/officeDocument/2006/math" xmlns:a14="http://schemas.microsoft.com/office/drawing/2010/main" xmlns:ma14="http://schemas.microsoft.com/office/mac/drawingml/2011/main" val="1"/>
+              <ma14:wrappingTextBoxFlag xmlns:ma14="http://schemas.microsoft.com/office/mac/drawingml/2011/main" xmlns:a14="http://schemas.microsoft.com/office/drawing/2010/main" xmlns:m="http://schemas.openxmlformats.org/officeDocument/2006/math" xmlns="" val="1"/>
             </a:ext>
           </a:extLst>
         </p:spPr>
@@ -14683,7 +14683,7 @@
           </a:ln>
           <a:extLst>
             <a:ext uri="{C572A759-6A51-4108-AA02-DFA0A04FC94B}">
-              <ma14:wrappingTextBoxFlag xmlns="" xmlns:m="http://schemas.openxmlformats.org/officeDocument/2006/math" xmlns:a14="http://schemas.microsoft.com/office/drawing/2010/main" xmlns:ma14="http://schemas.microsoft.com/office/mac/drawingml/2011/main" val="1"/>
+              <ma14:wrappingTextBoxFlag xmlns:ma14="http://schemas.microsoft.com/office/mac/drawingml/2011/main" xmlns:a14="http://schemas.microsoft.com/office/drawing/2010/main" xmlns:m="http://schemas.openxmlformats.org/officeDocument/2006/math" xmlns="" val="1"/>
             </a:ext>
           </a:extLst>
         </p:spPr>
@@ -14733,7 +14733,7 @@
           </a:ln>
           <a:extLst>
             <a:ext uri="{C572A759-6A51-4108-AA02-DFA0A04FC94B}">
-              <ma14:wrappingTextBoxFlag xmlns="" xmlns:m="http://schemas.openxmlformats.org/officeDocument/2006/math" xmlns:a14="http://schemas.microsoft.com/office/drawing/2010/main" xmlns:ma14="http://schemas.microsoft.com/office/mac/drawingml/2011/main" val="1"/>
+              <ma14:wrappingTextBoxFlag xmlns:ma14="http://schemas.microsoft.com/office/mac/drawingml/2011/main" xmlns:a14="http://schemas.microsoft.com/office/drawing/2010/main" xmlns:m="http://schemas.openxmlformats.org/officeDocument/2006/math" xmlns="" val="1"/>
             </a:ext>
           </a:extLst>
         </p:spPr>
@@ -14802,7 +14802,7 @@
           </a:ln>
           <a:extLst>
             <a:ext uri="{C572A759-6A51-4108-AA02-DFA0A04FC94B}">
-              <ma14:wrappingTextBoxFlag xmlns="" xmlns:m="http://schemas.openxmlformats.org/officeDocument/2006/math" xmlns:a14="http://schemas.microsoft.com/office/drawing/2010/main" xmlns:ma14="http://schemas.microsoft.com/office/mac/drawingml/2011/main" val="1"/>
+              <ma14:wrappingTextBoxFlag xmlns:ma14="http://schemas.microsoft.com/office/mac/drawingml/2011/main" xmlns:a14="http://schemas.microsoft.com/office/drawing/2010/main" xmlns:m="http://schemas.openxmlformats.org/officeDocument/2006/math" xmlns="" val="1"/>
             </a:ext>
           </a:extLst>
         </p:spPr>
@@ -15122,7 +15122,7 @@
           </a:ln>
           <a:extLst>
             <a:ext uri="{C572A759-6A51-4108-AA02-DFA0A04FC94B}">
-              <ma14:wrappingTextBoxFlag xmlns="" xmlns:m="http://schemas.openxmlformats.org/officeDocument/2006/math" xmlns:a14="http://schemas.microsoft.com/office/drawing/2010/main" xmlns:ma14="http://schemas.microsoft.com/office/mac/drawingml/2011/main" val="1"/>
+              <ma14:wrappingTextBoxFlag xmlns:ma14="http://schemas.microsoft.com/office/mac/drawingml/2011/main" xmlns:a14="http://schemas.microsoft.com/office/drawing/2010/main" xmlns:m="http://schemas.openxmlformats.org/officeDocument/2006/math" xmlns="" val="1"/>
             </a:ext>
           </a:extLst>
         </p:spPr>
@@ -15243,7 +15243,7 @@
           </a:ln>
           <a:extLst>
             <a:ext uri="{C572A759-6A51-4108-AA02-DFA0A04FC94B}">
-              <ma14:wrappingTextBoxFlag xmlns="" xmlns:m="http://schemas.openxmlformats.org/officeDocument/2006/math" xmlns:a14="http://schemas.microsoft.com/office/drawing/2010/main" xmlns:ma14="http://schemas.microsoft.com/office/mac/drawingml/2011/main" val="1"/>
+              <ma14:wrappingTextBoxFlag xmlns:ma14="http://schemas.microsoft.com/office/mac/drawingml/2011/main" xmlns:a14="http://schemas.microsoft.com/office/drawing/2010/main" xmlns:m="http://schemas.openxmlformats.org/officeDocument/2006/math" xmlns="" val="1"/>
             </a:ext>
           </a:extLst>
         </p:spPr>
@@ -15306,7 +15306,7 @@
           </a:ln>
           <a:extLst>
             <a:ext uri="{C572A759-6A51-4108-AA02-DFA0A04FC94B}">
-              <ma14:wrappingTextBoxFlag xmlns="" xmlns:m="http://schemas.openxmlformats.org/officeDocument/2006/math" xmlns:a14="http://schemas.microsoft.com/office/drawing/2010/main" xmlns:ma14="http://schemas.microsoft.com/office/mac/drawingml/2011/main" val="1"/>
+              <ma14:wrappingTextBoxFlag xmlns:ma14="http://schemas.microsoft.com/office/mac/drawingml/2011/main" xmlns:a14="http://schemas.microsoft.com/office/drawing/2010/main" xmlns:m="http://schemas.openxmlformats.org/officeDocument/2006/math" xmlns="" val="1"/>
             </a:ext>
           </a:extLst>
         </p:spPr>
@@ -15350,7 +15350,7 @@
           </a:ln>
           <a:extLst>
             <a:ext uri="{C572A759-6A51-4108-AA02-DFA0A04FC94B}">
-              <ma14:wrappingTextBoxFlag xmlns="" xmlns:m="http://schemas.openxmlformats.org/officeDocument/2006/math" xmlns:a14="http://schemas.microsoft.com/office/drawing/2010/main" xmlns:ma14="http://schemas.microsoft.com/office/mac/drawingml/2011/main" val="1"/>
+              <ma14:wrappingTextBoxFlag xmlns:ma14="http://schemas.microsoft.com/office/mac/drawingml/2011/main" xmlns:a14="http://schemas.microsoft.com/office/drawing/2010/main" xmlns:m="http://schemas.openxmlformats.org/officeDocument/2006/math" xmlns="" val="1"/>
             </a:ext>
           </a:extLst>
         </p:spPr>
@@ -15450,7 +15450,7 @@
           </a:ln>
           <a:extLst>
             <a:ext uri="{C572A759-6A51-4108-AA02-DFA0A04FC94B}">
-              <ma14:wrappingTextBoxFlag xmlns="" xmlns:m="http://schemas.openxmlformats.org/officeDocument/2006/math" xmlns:a14="http://schemas.microsoft.com/office/drawing/2010/main" xmlns:ma14="http://schemas.microsoft.com/office/mac/drawingml/2011/main" val="1"/>
+              <ma14:wrappingTextBoxFlag xmlns:ma14="http://schemas.microsoft.com/office/mac/drawingml/2011/main" xmlns:a14="http://schemas.microsoft.com/office/drawing/2010/main" xmlns:m="http://schemas.openxmlformats.org/officeDocument/2006/math" xmlns="" val="1"/>
             </a:ext>
           </a:extLst>
         </p:spPr>
@@ -15579,7 +15579,7 @@
           </a:ln>
           <a:extLst>
             <a:ext uri="{C572A759-6A51-4108-AA02-DFA0A04FC94B}">
-              <ma14:wrappingTextBoxFlag xmlns="" xmlns:m="http://schemas.openxmlformats.org/officeDocument/2006/math" xmlns:a14="http://schemas.microsoft.com/office/drawing/2010/main" xmlns:ma14="http://schemas.microsoft.com/office/mac/drawingml/2011/main" val="1"/>
+              <ma14:wrappingTextBoxFlag xmlns:ma14="http://schemas.microsoft.com/office/mac/drawingml/2011/main" xmlns:a14="http://schemas.microsoft.com/office/drawing/2010/main" xmlns:m="http://schemas.openxmlformats.org/officeDocument/2006/math" xmlns="" val="1"/>
             </a:ext>
           </a:extLst>
         </p:spPr>
@@ -15727,7 +15727,7 @@
           </a:ln>
           <a:extLst>
             <a:ext uri="{C572A759-6A51-4108-AA02-DFA0A04FC94B}">
-              <ma14:wrappingTextBoxFlag xmlns="" xmlns:m="http://schemas.openxmlformats.org/officeDocument/2006/math" xmlns:a14="http://schemas.microsoft.com/office/drawing/2010/main" xmlns:ma14="http://schemas.microsoft.com/office/mac/drawingml/2011/main" val="1"/>
+              <ma14:wrappingTextBoxFlag xmlns:ma14="http://schemas.microsoft.com/office/mac/drawingml/2011/main" xmlns:a14="http://schemas.microsoft.com/office/drawing/2010/main" xmlns:m="http://schemas.openxmlformats.org/officeDocument/2006/math" xmlns="" val="1"/>
             </a:ext>
           </a:extLst>
         </p:spPr>
@@ -16494,7 +16494,7 @@
         </p:nvSpPr>
         <p:spPr>
           <a:xfrm>
-            <a:off x="10695563" y="4464167"/>
+            <a:off x="10135391" y="4464542"/>
             <a:ext cx="1213441" cy="538415"/>
           </a:xfrm>
           <a:custGeom>
@@ -16574,7 +16574,7 @@
           </a:ln>
           <a:extLst>
             <a:ext uri="{C572A759-6A51-4108-AA02-DFA0A04FC94B}">
-              <ma14:wrappingTextBoxFlag xmlns="" xmlns:m="http://schemas.openxmlformats.org/officeDocument/2006/math" xmlns:a14="http://schemas.microsoft.com/office/drawing/2010/main" xmlns:ma14="http://schemas.microsoft.com/office/mac/drawingml/2011/main" val="1"/>
+              <ma14:wrappingTextBoxFlag xmlns:ma14="http://schemas.microsoft.com/office/mac/drawingml/2011/main" xmlns:a14="http://schemas.microsoft.com/office/drawing/2010/main" xmlns:m="http://schemas.openxmlformats.org/officeDocument/2006/math" xmlns="" val="1"/>
             </a:ext>
           </a:extLst>
         </p:spPr>
@@ -16628,8 +16628,8 @@
         </p:nvSpPr>
         <p:spPr>
           <a:xfrm>
-            <a:off x="12376052" y="4285680"/>
-            <a:ext cx="1371604" cy="504658"/>
+            <a:off x="12412194" y="4303166"/>
+            <a:ext cx="1371604" cy="456463"/>
           </a:xfrm>
           <a:custGeom>
             <a:avLst/>
@@ -16708,7 +16708,7 @@
           </a:ln>
           <a:extLst>
             <a:ext uri="{C572A759-6A51-4108-AA02-DFA0A04FC94B}">
-              <ma14:wrappingTextBoxFlag xmlns="" xmlns:m="http://schemas.openxmlformats.org/officeDocument/2006/math" xmlns:a14="http://schemas.microsoft.com/office/drawing/2010/main" xmlns:ma14="http://schemas.microsoft.com/office/mac/drawingml/2011/main" val="1"/>
+              <ma14:wrappingTextBoxFlag xmlns:ma14="http://schemas.microsoft.com/office/mac/drawingml/2011/main" xmlns:a14="http://schemas.microsoft.com/office/drawing/2010/main" xmlns:m="http://schemas.openxmlformats.org/officeDocument/2006/math" xmlns="" val="1"/>
             </a:ext>
           </a:extLst>
         </p:spPr>
@@ -16811,8 +16811,8 @@
         </p:nvSpPr>
         <p:spPr>
           <a:xfrm>
-            <a:off x="10805555" y="5469810"/>
-            <a:ext cx="2166835" cy="647276"/>
+            <a:off x="10872985" y="5486181"/>
+            <a:ext cx="2815005" cy="442605"/>
           </a:xfrm>
           <a:prstGeom prst="rect">
             <a:avLst/>
@@ -16822,7 +16822,7 @@
           </a:ln>
           <a:extLst>
             <a:ext uri="{C572A759-6A51-4108-AA02-DFA0A04FC94B}">
-              <ma14:wrappingTextBoxFlag xmlns="" xmlns:m="http://schemas.openxmlformats.org/officeDocument/2006/math" xmlns:a14="http://schemas.microsoft.com/office/drawing/2010/main" xmlns:ma14="http://schemas.microsoft.com/office/mac/drawingml/2011/main" val="1"/>
+              <ma14:wrappingTextBoxFlag xmlns:ma14="http://schemas.microsoft.com/office/mac/drawingml/2011/main" xmlns:a14="http://schemas.microsoft.com/office/drawing/2010/main" xmlns:m="http://schemas.openxmlformats.org/officeDocument/2006/math" xmlns="" val="1"/>
             </a:ext>
           </a:extLst>
         </p:spPr>
@@ -16856,28 +16856,6 @@
               <a:rPr lang="en-US" dirty="0"/>
               <a:t>A centroid corresponds to the </a:t>
             </a:r>
-          </a:p>
-          <a:p>
-            <a:pPr>
-              <a:lnSpc>
-                <a:spcPct val="90000"/>
-              </a:lnSpc>
-              <a:spcBef>
-                <a:spcPts val="300"/>
-              </a:spcBef>
-              <a:buClr>
-                <a:schemeClr val="accent4">
-                  <a:hueOff val="384618"/>
-                  <a:satOff val="3869"/>
-                  <a:lumOff val="5802"/>
-                </a:schemeClr>
-              </a:buClr>
-              <a:defRPr b="0">
-                <a:solidFill>
-                  <a:srgbClr val="000000"/>
-                </a:solidFill>
-              </a:defRPr>
-            </a:pPr>
             <a:r>
               <a:rPr lang="en-US" dirty="0" err="1"/>
               <a:t>centre</a:t>
@@ -16915,7 +16893,7 @@
           </a:ln>
           <a:extLst>
             <a:ext uri="{C572A759-6A51-4108-AA02-DFA0A04FC94B}">
-              <ma14:wrappingTextBoxFlag xmlns="" xmlns:m="http://schemas.openxmlformats.org/officeDocument/2006/math" xmlns:a14="http://schemas.microsoft.com/office/drawing/2010/main" xmlns:ma14="http://schemas.microsoft.com/office/mac/drawingml/2011/main" val="1"/>
+              <ma14:wrappingTextBoxFlag xmlns:ma14="http://schemas.microsoft.com/office/mac/drawingml/2011/main" xmlns:a14="http://schemas.microsoft.com/office/drawing/2010/main" xmlns:m="http://schemas.openxmlformats.org/officeDocument/2006/math" xmlns="" val="1"/>
             </a:ext>
           </a:extLst>
         </p:spPr>
@@ -16948,7 +16926,7 @@
         </p:nvSpPr>
         <p:spPr>
           <a:xfrm>
-            <a:off x="10658227" y="6124026"/>
+            <a:off x="10675480" y="5951496"/>
             <a:ext cx="2537609" cy="664204"/>
           </a:xfrm>
           <a:prstGeom prst="rect">
@@ -16965,7 +16943,7 @@
           </a:ln>
           <a:extLst>
             <a:ext uri="{C572A759-6A51-4108-AA02-DFA0A04FC94B}">
-              <ma14:wrappingTextBoxFlag xmlns="" xmlns:m="http://schemas.openxmlformats.org/officeDocument/2006/math" xmlns:a14="http://schemas.microsoft.com/office/drawing/2010/main" xmlns:ma14="http://schemas.microsoft.com/office/mac/drawingml/2011/main" val="1"/>
+              <ma14:wrappingTextBoxFlag xmlns:ma14="http://schemas.microsoft.com/office/mac/drawingml/2011/main" xmlns:a14="http://schemas.microsoft.com/office/drawing/2010/main" xmlns:m="http://schemas.openxmlformats.org/officeDocument/2006/math" xmlns="" val="1"/>
             </a:ext>
           </a:extLst>
         </p:spPr>
@@ -17322,13 +17300,13 @@
         </p:nvSpPr>
         <p:spPr>
           <a:xfrm>
-            <a:off x="12855960" y="5592963"/>
-            <a:ext cx="1017302" cy="734864"/>
+            <a:off x="12897860" y="5729380"/>
+            <a:ext cx="975401" cy="734864"/>
           </a:xfrm>
           <a:prstGeom prst="wedgeRoundRectCallout">
             <a:avLst>
-              <a:gd name="adj1" fmla="val -77175"/>
-              <a:gd name="adj2" fmla="val 41863"/>
+              <a:gd name="adj1" fmla="val -72087"/>
+              <a:gd name="adj2" fmla="val -2744"/>
               <a:gd name="adj3" fmla="val 16667"/>
             </a:avLst>
           </a:prstGeom>
@@ -17390,8 +17368,8 @@
         </p:nvSpPr>
         <p:spPr>
           <a:xfrm>
-            <a:off x="10906808" y="6733520"/>
-            <a:ext cx="1213441" cy="538415"/>
+            <a:off x="9947178" y="6457098"/>
+            <a:ext cx="1213441" cy="571899"/>
           </a:xfrm>
           <a:custGeom>
             <a:avLst/>
@@ -17470,7 +17448,7 @@
           </a:ln>
           <a:extLst>
             <a:ext uri="{C572A759-6A51-4108-AA02-DFA0A04FC94B}">
-              <ma14:wrappingTextBoxFlag xmlns="" xmlns:m="http://schemas.openxmlformats.org/officeDocument/2006/math" xmlns:a14="http://schemas.microsoft.com/office/drawing/2010/main" xmlns:ma14="http://schemas.microsoft.com/office/mac/drawingml/2011/main" val="1"/>
+              <ma14:wrappingTextBoxFlag xmlns:ma14="http://schemas.microsoft.com/office/mac/drawingml/2011/main" xmlns:a14="http://schemas.microsoft.com/office/drawing/2010/main" xmlns:m="http://schemas.openxmlformats.org/officeDocument/2006/math" xmlns="" val="1"/>
             </a:ext>
           </a:extLst>
         </p:spPr>
@@ -17524,7 +17502,7 @@
         </p:nvSpPr>
         <p:spPr>
           <a:xfrm>
-            <a:off x="10644723" y="8986364"/>
+            <a:off x="10644018" y="9331627"/>
             <a:ext cx="3031484" cy="1"/>
           </a:xfrm>
           <a:prstGeom prst="line">
@@ -17574,8 +17552,8 @@
         </p:nvSpPr>
         <p:spPr>
           <a:xfrm>
-            <a:off x="10808308" y="7708105"/>
-            <a:ext cx="2877962" cy="775003"/>
+            <a:off x="10808308" y="7356753"/>
+            <a:ext cx="2877962" cy="1018147"/>
           </a:xfrm>
           <a:prstGeom prst="rect">
             <a:avLst/>
@@ -17585,7 +17563,7 @@
           </a:ln>
           <a:extLst>
             <a:ext uri="{C572A759-6A51-4108-AA02-DFA0A04FC94B}">
-              <ma14:wrappingTextBoxFlag xmlns="" xmlns:m="http://schemas.openxmlformats.org/officeDocument/2006/math" xmlns:a14="http://schemas.microsoft.com/office/drawing/2010/main" xmlns:ma14="http://schemas.microsoft.com/office/mac/drawingml/2011/main" val="1"/>
+              <ma14:wrappingTextBoxFlag xmlns:ma14="http://schemas.microsoft.com/office/mac/drawingml/2011/main" xmlns:a14="http://schemas.microsoft.com/office/drawing/2010/main" xmlns:m="http://schemas.openxmlformats.org/officeDocument/2006/math" xmlns="" val="1"/>
             </a:ext>
           </a:extLst>
         </p:spPr>
@@ -17617,7 +17595,59 @@
             </a:pPr>
             <a:r>
               <a:rPr lang="en-US" dirty="0"/>
-              <a:t>‘Intersect’ tests whether geometric objects x and y intersect each other. ‘Intersection’ performs the intersection and returns an object of the same type as x.</a:t>
+              <a:t>‘Intersect’ tests whether geometric objects x and y intersect each other. </a:t>
+            </a:r>
+          </a:p>
+          <a:p>
+            <a:pPr>
+              <a:lnSpc>
+                <a:spcPct val="90000"/>
+              </a:lnSpc>
+              <a:spcBef>
+                <a:spcPts val="300"/>
+              </a:spcBef>
+              <a:buClr>
+                <a:schemeClr val="accent4">
+                  <a:hueOff val="384618"/>
+                  <a:satOff val="3869"/>
+                  <a:lumOff val="5802"/>
+                </a:schemeClr>
+              </a:buClr>
+              <a:defRPr b="0">
+                <a:solidFill>
+                  <a:srgbClr val="000000"/>
+                </a:solidFill>
+              </a:defRPr>
+            </a:pPr>
+            <a:r>
+              <a:rPr lang="en-US" dirty="0"/>
+              <a:t>‘Intersection’ performs the intersection and returns an object of the same type as x. </a:t>
+            </a:r>
+          </a:p>
+          <a:p>
+            <a:pPr>
+              <a:lnSpc>
+                <a:spcPct val="90000"/>
+              </a:lnSpc>
+              <a:spcBef>
+                <a:spcPts val="300"/>
+              </a:spcBef>
+              <a:buClr>
+                <a:schemeClr val="accent4">
+                  <a:hueOff val="384618"/>
+                  <a:satOff val="3869"/>
+                  <a:lumOff val="5802"/>
+                </a:schemeClr>
+              </a:buClr>
+              <a:defRPr b="0">
+                <a:solidFill>
+                  <a:srgbClr val="000000"/>
+                </a:solidFill>
+              </a:defRPr>
+            </a:pPr>
+            <a:r>
+              <a:rPr lang="en-US" dirty="0"/>
+              <a:t>‘Join’ spatially matches x and y objects.</a:t>
             </a:r>
             <a:endParaRPr dirty="0"/>
           </a:p>
@@ -17637,8 +17667,8 @@
         </p:nvSpPr>
         <p:spPr>
           <a:xfrm>
-            <a:off x="10644874" y="7465434"/>
-            <a:ext cx="1910779" cy="210314"/>
+            <a:off x="10644874" y="7147383"/>
+            <a:ext cx="1535677" cy="210314"/>
           </a:xfrm>
           <a:prstGeom prst="rect">
             <a:avLst/>
@@ -17648,7 +17678,7 @@
           </a:ln>
           <a:extLst>
             <a:ext uri="{C572A759-6A51-4108-AA02-DFA0A04FC94B}">
-              <ma14:wrappingTextBoxFlag xmlns="" xmlns:m="http://schemas.openxmlformats.org/officeDocument/2006/math" xmlns:a14="http://schemas.microsoft.com/office/drawing/2010/main" xmlns:ma14="http://schemas.microsoft.com/office/mac/drawingml/2011/main" val="1"/>
+              <ma14:wrappingTextBoxFlag xmlns:ma14="http://schemas.microsoft.com/office/mac/drawingml/2011/main" xmlns:a14="http://schemas.microsoft.com/office/drawing/2010/main" xmlns:m="http://schemas.openxmlformats.org/officeDocument/2006/math" xmlns="" val="1"/>
             </a:ext>
           </a:extLst>
         </p:spPr>
@@ -17661,7 +17691,7 @@
             <a:pPr lvl="1" indent="0"/>
             <a:r>
               <a:rPr lang="en-US" dirty="0"/>
-              <a:t>INTERSECT / INTERSECTION</a:t>
+              <a:t>INTERSECTION &amp; JOIN</a:t>
             </a:r>
             <a:endParaRPr dirty="0"/>
           </a:p>
@@ -17681,8 +17711,8 @@
         </p:nvSpPr>
         <p:spPr>
           <a:xfrm>
-            <a:off x="10641216" y="8515277"/>
-            <a:ext cx="2871790" cy="294872"/>
+            <a:off x="10641216" y="8410944"/>
+            <a:ext cx="2979344" cy="479538"/>
           </a:xfrm>
           <a:prstGeom prst="rect">
             <a:avLst/>
@@ -17698,7 +17728,7 @@
           </a:ln>
           <a:extLst>
             <a:ext uri="{C572A759-6A51-4108-AA02-DFA0A04FC94B}">
-              <ma14:wrappingTextBoxFlag xmlns="" xmlns:m="http://schemas.openxmlformats.org/officeDocument/2006/math" xmlns:a14="http://schemas.microsoft.com/office/drawing/2010/main" xmlns:ma14="http://schemas.microsoft.com/office/mac/drawingml/2011/main" val="1"/>
+              <ma14:wrappingTextBoxFlag xmlns:ma14="http://schemas.microsoft.com/office/mac/drawingml/2011/main" xmlns:a14="http://schemas.microsoft.com/office/drawing/2010/main" xmlns:m="http://schemas.openxmlformats.org/officeDocument/2006/math" xmlns="" val="1"/>
             </a:ext>
           </a:extLst>
         </p:spPr>
@@ -17742,7 +17772,42 @@
               <a:rPr lang="en-US" dirty="0"/>
               <a:t>)</a:t>
             </a:r>
-            <a:endParaRPr dirty="0"/>
+          </a:p>
+          <a:p>
+            <a:pPr>
+              <a:spcBef>
+                <a:spcPts val="0"/>
+              </a:spcBef>
+              <a:defRPr b="0">
+                <a:solidFill>
+                  <a:srgbClr val="000000"/>
+                </a:solidFill>
+                <a:latin typeface="Menlo"/>
+                <a:ea typeface="Menlo"/>
+                <a:cs typeface="Menlo"/>
+                <a:sym typeface="Menlo"/>
+              </a:defRPr>
+            </a:pPr>
+            <a:r>
+              <a:rPr lang="en-US" dirty="0"/>
+              <a:t>sf::</a:t>
+            </a:r>
+            <a:r>
+              <a:rPr lang="en-US" dirty="0" err="1"/>
+              <a:t>st_join</a:t>
+            </a:r>
+            <a:r>
+              <a:rPr lang="en-US" dirty="0"/>
+              <a:t>(</a:t>
+            </a:r>
+            <a:r>
+              <a:rPr lang="en-US" dirty="0" err="1"/>
+              <a:t>x,y</a:t>
+            </a:r>
+            <a:r>
+              <a:rPr lang="en-US" dirty="0"/>
+              <a:t>, left=T)</a:t>
+            </a:r>
           </a:p>
         </p:txBody>
       </p:sp>
@@ -17760,7 +17825,7 @@
         </p:nvSpPr>
         <p:spPr>
           <a:xfrm>
-            <a:off x="10654786" y="7373819"/>
+            <a:off x="10654786" y="7055768"/>
             <a:ext cx="3031484" cy="1"/>
           </a:xfrm>
           <a:prstGeom prst="line">
@@ -17810,8 +17875,8 @@
         </p:nvSpPr>
         <p:spPr>
           <a:xfrm>
-            <a:off x="10801947" y="9279762"/>
-            <a:ext cx="2852489" cy="481077"/>
+            <a:off x="10805554" y="9522124"/>
+            <a:ext cx="2852489" cy="276405"/>
           </a:xfrm>
           <a:prstGeom prst="rect">
             <a:avLst/>
@@ -17821,7 +17886,7 @@
           </a:ln>
           <a:extLst>
             <a:ext uri="{C572A759-6A51-4108-AA02-DFA0A04FC94B}">
-              <ma14:wrappingTextBoxFlag xmlns="" xmlns:m="http://schemas.openxmlformats.org/officeDocument/2006/math" xmlns:a14="http://schemas.microsoft.com/office/drawing/2010/main" xmlns:ma14="http://schemas.microsoft.com/office/mac/drawingml/2011/main" val="1"/>
+              <ma14:wrappingTextBoxFlag xmlns:ma14="http://schemas.microsoft.com/office/mac/drawingml/2011/main" xmlns:a14="http://schemas.microsoft.com/office/drawing/2010/main" xmlns:m="http://schemas.openxmlformats.org/officeDocument/2006/math" xmlns="" val="1"/>
             </a:ext>
           </a:extLst>
         </p:spPr>
@@ -17853,33 +17918,7 @@
             </a:pPr>
             <a:r>
               <a:rPr lang="en-US" dirty="0"/>
-              <a:t>Computation of the area of a set of </a:t>
-            </a:r>
-          </a:p>
-          <a:p>
-            <a:pPr>
-              <a:lnSpc>
-                <a:spcPct val="90000"/>
-              </a:lnSpc>
-              <a:spcBef>
-                <a:spcPts val="300"/>
-              </a:spcBef>
-              <a:buClr>
-                <a:schemeClr val="accent4">
-                  <a:hueOff val="384618"/>
-                  <a:satOff val="3869"/>
-                  <a:lumOff val="5802"/>
-                </a:schemeClr>
-              </a:buClr>
-              <a:defRPr b="0">
-                <a:solidFill>
-                  <a:srgbClr val="000000"/>
-                </a:solidFill>
-              </a:defRPr>
-            </a:pPr>
-            <a:r>
-              <a:rPr lang="en-US" dirty="0"/>
-              <a:t>features x</a:t>
+              <a:t>Computes the area of features x</a:t>
             </a:r>
             <a:endParaRPr dirty="0"/>
           </a:p>
@@ -17899,7 +17938,7 @@
         </p:nvSpPr>
         <p:spPr>
           <a:xfrm>
-            <a:off x="10641216" y="9074283"/>
+            <a:off x="10641216" y="9372456"/>
             <a:ext cx="381515" cy="210314"/>
           </a:xfrm>
           <a:prstGeom prst="rect">
@@ -17910,7 +17949,7 @@
           </a:ln>
           <a:extLst>
             <a:ext uri="{C572A759-6A51-4108-AA02-DFA0A04FC94B}">
-              <ma14:wrappingTextBoxFlag xmlns="" xmlns:m="http://schemas.openxmlformats.org/officeDocument/2006/math" xmlns:a14="http://schemas.microsoft.com/office/drawing/2010/main" xmlns:ma14="http://schemas.microsoft.com/office/mac/drawingml/2011/main" val="1"/>
+              <ma14:wrappingTextBoxFlag xmlns:ma14="http://schemas.microsoft.com/office/mac/drawingml/2011/main" xmlns:a14="http://schemas.microsoft.com/office/drawing/2010/main" xmlns:m="http://schemas.openxmlformats.org/officeDocument/2006/math" xmlns="" val="1"/>
             </a:ext>
           </a:extLst>
         </p:spPr>
@@ -17960,7 +17999,7 @@
           </a:ln>
           <a:extLst>
             <a:ext uri="{C572A759-6A51-4108-AA02-DFA0A04FC94B}">
-              <ma14:wrappingTextBoxFlag xmlns="" xmlns:m="http://schemas.openxmlformats.org/officeDocument/2006/math" xmlns:a14="http://schemas.microsoft.com/office/drawing/2010/main" xmlns:ma14="http://schemas.microsoft.com/office/mac/drawingml/2011/main" val="1"/>
+              <ma14:wrappingTextBoxFlag xmlns:ma14="http://schemas.microsoft.com/office/mac/drawingml/2011/main" xmlns:a14="http://schemas.microsoft.com/office/drawing/2010/main" xmlns:m="http://schemas.openxmlformats.org/officeDocument/2006/math" xmlns="" val="1"/>
             </a:ext>
           </a:extLst>
         </p:spPr>
@@ -18042,7 +18081,7 @@
         </p:nvSpPr>
         <p:spPr>
           <a:xfrm>
-            <a:off x="13097996" y="9451274"/>
+            <a:off x="13125373" y="9520325"/>
             <a:ext cx="775266" cy="530552"/>
           </a:xfrm>
           <a:prstGeom prst="wedgeRoundRectCallout">
@@ -18110,7 +18149,7 @@
         </p:nvSpPr>
         <p:spPr>
           <a:xfrm>
-            <a:off x="12633597" y="7465540"/>
+            <a:off x="12633597" y="7107733"/>
             <a:ext cx="264264" cy="264264"/>
           </a:xfrm>
           <a:prstGeom prst="ellipse">
@@ -18195,7 +18234,7 @@
         </p:nvSpPr>
         <p:spPr>
           <a:xfrm rot="7949562">
-            <a:off x="13086116" y="7555287"/>
+            <a:off x="13086116" y="7197480"/>
             <a:ext cx="92030" cy="92030"/>
           </a:xfrm>
           <a:prstGeom prst="halfFrame">
@@ -18276,7 +18315,7 @@
         </p:nvSpPr>
         <p:spPr>
           <a:xfrm>
-            <a:off x="12729934" y="7449778"/>
+            <a:off x="12729934" y="7091971"/>
             <a:ext cx="254866" cy="299118"/>
           </a:xfrm>
           <a:prstGeom prst="rect">
@@ -18361,7 +18400,7 @@
         </p:nvSpPr>
         <p:spPr>
           <a:xfrm rot="12152760">
-            <a:off x="13233085" y="7475520"/>
+            <a:off x="13233085" y="7117713"/>
             <a:ext cx="242671" cy="242671"/>
           </a:xfrm>
           <a:prstGeom prst="chord">
@@ -18551,7 +18590,7 @@
           </a:ln>
           <a:extLst>
             <a:ext uri="{C572A759-6A51-4108-AA02-DFA0A04FC94B}">
-              <ma14:wrappingTextBoxFlag xmlns="" xmlns:m="http://schemas.openxmlformats.org/officeDocument/2006/math" xmlns:a14="http://schemas.microsoft.com/office/drawing/2010/main" xmlns:ma14="http://schemas.microsoft.com/office/mac/drawingml/2011/main" val="1"/>
+              <ma14:wrappingTextBoxFlag xmlns:ma14="http://schemas.microsoft.com/office/mac/drawingml/2011/main" xmlns:a14="http://schemas.microsoft.com/office/drawing/2010/main" xmlns:m="http://schemas.openxmlformats.org/officeDocument/2006/math" xmlns="" val="1"/>
             </a:ext>
           </a:extLst>
         </p:spPr>
@@ -18753,7 +18792,7 @@
           </a:ln>
           <a:extLst>
             <a:ext uri="{C572A759-6A51-4108-AA02-DFA0A04FC94B}">
-              <ma14:wrappingTextBoxFlag xmlns="" xmlns:m="http://schemas.openxmlformats.org/officeDocument/2006/math" xmlns:a14="http://schemas.microsoft.com/office/drawing/2010/main" xmlns:ma14="http://schemas.microsoft.com/office/mac/drawingml/2011/main" val="1"/>
+              <ma14:wrappingTextBoxFlag xmlns:ma14="http://schemas.microsoft.com/office/mac/drawingml/2011/main" xmlns:a14="http://schemas.microsoft.com/office/drawing/2010/main" xmlns:m="http://schemas.openxmlformats.org/officeDocument/2006/math" xmlns="" val="1"/>
             </a:ext>
           </a:extLst>
         </p:spPr>
@@ -18817,7 +18856,7 @@
           </a:ln>
           <a:extLst>
             <a:ext uri="{C572A759-6A51-4108-AA02-DFA0A04FC94B}">
-              <ma14:wrappingTextBoxFlag xmlns="" xmlns:m="http://schemas.openxmlformats.org/officeDocument/2006/math" xmlns:a14="http://schemas.microsoft.com/office/drawing/2010/main" xmlns:ma14="http://schemas.microsoft.com/office/mac/drawingml/2011/main" val="1"/>
+              <ma14:wrappingTextBoxFlag xmlns:ma14="http://schemas.microsoft.com/office/mac/drawingml/2011/main" xmlns:a14="http://schemas.microsoft.com/office/drawing/2010/main" xmlns:m="http://schemas.openxmlformats.org/officeDocument/2006/math" xmlns="" val="1"/>
             </a:ext>
           </a:extLst>
         </p:spPr>
@@ -18946,7 +18985,7 @@
           </a:ln>
           <a:extLst>
             <a:ext uri="{C572A759-6A51-4108-AA02-DFA0A04FC94B}">
-              <ma14:wrappingTextBoxFlag xmlns="" xmlns:m="http://schemas.openxmlformats.org/officeDocument/2006/math" xmlns:a14="http://schemas.microsoft.com/office/drawing/2010/main" xmlns:ma14="http://schemas.microsoft.com/office/mac/drawingml/2011/main" val="1"/>
+              <ma14:wrappingTextBoxFlag xmlns:ma14="http://schemas.microsoft.com/office/mac/drawingml/2011/main" xmlns:a14="http://schemas.microsoft.com/office/drawing/2010/main" xmlns:m="http://schemas.openxmlformats.org/officeDocument/2006/math" xmlns="" val="1"/>
             </a:ext>
           </a:extLst>
         </p:spPr>
@@ -19195,7 +19234,7 @@
           </a:ln>
           <a:extLst>
             <a:ext uri="{C572A759-6A51-4108-AA02-DFA0A04FC94B}">
-              <ma14:wrappingTextBoxFlag xmlns="" xmlns:m="http://schemas.openxmlformats.org/officeDocument/2006/math" xmlns:a14="http://schemas.microsoft.com/office/drawing/2010/main" xmlns:ma14="http://schemas.microsoft.com/office/mac/drawingml/2011/main" val="1"/>
+              <ma14:wrappingTextBoxFlag xmlns:ma14="http://schemas.microsoft.com/office/mac/drawingml/2011/main" xmlns:a14="http://schemas.microsoft.com/office/drawing/2010/main" xmlns:m="http://schemas.openxmlformats.org/officeDocument/2006/math" xmlns="" val="1"/>
             </a:ext>
           </a:extLst>
         </p:spPr>
@@ -19265,7 +19304,7 @@
           </a:ln>
           <a:extLst>
             <a:ext uri="{C572A759-6A51-4108-AA02-DFA0A04FC94B}">
-              <ma14:wrappingTextBoxFlag xmlns:ma14="http://schemas.microsoft.com/office/mac/drawingml/2011/main" xmlns:a14="http://schemas.microsoft.com/office/drawing/2010/main" xmlns:m="http://schemas.openxmlformats.org/officeDocument/2006/math" xmlns="" val="1"/>
+              <ma14:wrappingTextBoxFlag xmlns="" xmlns:m="http://schemas.openxmlformats.org/officeDocument/2006/math" xmlns:a14="http://schemas.microsoft.com/office/drawing/2010/main" xmlns:ma14="http://schemas.microsoft.com/office/mac/drawingml/2011/main" val="1"/>
             </a:ext>
           </a:extLst>
         </p:spPr>
@@ -19417,7 +19456,7 @@
           </a:ln>
           <a:extLst>
             <a:ext uri="{C572A759-6A51-4108-AA02-DFA0A04FC94B}">
-              <ma14:wrappingTextBoxFlag xmlns:ma14="http://schemas.microsoft.com/office/mac/drawingml/2011/main" xmlns:a14="http://schemas.microsoft.com/office/drawing/2010/main" xmlns:m="http://schemas.openxmlformats.org/officeDocument/2006/math" xmlns="" val="1"/>
+              <ma14:wrappingTextBoxFlag xmlns="" xmlns:m="http://schemas.openxmlformats.org/officeDocument/2006/math" xmlns:a14="http://schemas.microsoft.com/office/drawing/2010/main" xmlns:ma14="http://schemas.microsoft.com/office/mac/drawingml/2011/main" val="1"/>
             </a:ext>
           </a:extLst>
         </p:spPr>
@@ -19558,7 +19597,7 @@
           </a:ln>
           <a:extLst>
             <a:ext uri="{C572A759-6A51-4108-AA02-DFA0A04FC94B}">
-              <ma14:wrappingTextBoxFlag xmlns:ma14="http://schemas.microsoft.com/office/mac/drawingml/2011/main" xmlns:a14="http://schemas.microsoft.com/office/drawing/2010/main" xmlns:m="http://schemas.openxmlformats.org/officeDocument/2006/math" xmlns="" val="1"/>
+              <ma14:wrappingTextBoxFlag xmlns="" xmlns:m="http://schemas.openxmlformats.org/officeDocument/2006/math" xmlns:a14="http://schemas.microsoft.com/office/drawing/2010/main" xmlns:ma14="http://schemas.microsoft.com/office/mac/drawingml/2011/main" val="1"/>
             </a:ext>
           </a:extLst>
         </p:spPr>
@@ -19661,7 +19700,7 @@
           </a:ln>
           <a:extLst>
             <a:ext uri="{C572A759-6A51-4108-AA02-DFA0A04FC94B}">
-              <ma14:wrappingTextBoxFlag xmlns:ma14="http://schemas.microsoft.com/office/mac/drawingml/2011/main" xmlns:a14="http://schemas.microsoft.com/office/drawing/2010/main" xmlns:m="http://schemas.openxmlformats.org/officeDocument/2006/math" xmlns="" val="1"/>
+              <ma14:wrappingTextBoxFlag xmlns="" xmlns:m="http://schemas.openxmlformats.org/officeDocument/2006/math" xmlns:a14="http://schemas.microsoft.com/office/drawing/2010/main" xmlns:ma14="http://schemas.microsoft.com/office/mac/drawingml/2011/main" val="1"/>
             </a:ext>
           </a:extLst>
         </p:spPr>
@@ -19799,7 +19838,7 @@
           </a:ln>
           <a:extLst>
             <a:ext uri="{C572A759-6A51-4108-AA02-DFA0A04FC94B}">
-              <ma14:wrappingTextBoxFlag xmlns:ma14="http://schemas.microsoft.com/office/mac/drawingml/2011/main" xmlns:a14="http://schemas.microsoft.com/office/drawing/2010/main" xmlns:m="http://schemas.openxmlformats.org/officeDocument/2006/math" xmlns="" val="1"/>
+              <ma14:wrappingTextBoxFlag xmlns="" xmlns:m="http://schemas.openxmlformats.org/officeDocument/2006/math" xmlns:a14="http://schemas.microsoft.com/office/drawing/2010/main" xmlns:ma14="http://schemas.microsoft.com/office/mac/drawingml/2011/main" val="1"/>
             </a:ext>
           </a:extLst>
         </p:spPr>
@@ -19879,7 +19918,7 @@
           </a:ln>
           <a:extLst>
             <a:ext uri="{C572A759-6A51-4108-AA02-DFA0A04FC94B}">
-              <ma14:wrappingTextBoxFlag xmlns:ma14="http://schemas.microsoft.com/office/mac/drawingml/2011/main" xmlns:a14="http://schemas.microsoft.com/office/drawing/2010/main" xmlns:m="http://schemas.openxmlformats.org/officeDocument/2006/math" xmlns="" val="1"/>
+              <ma14:wrappingTextBoxFlag xmlns="" xmlns:m="http://schemas.openxmlformats.org/officeDocument/2006/math" xmlns:a14="http://schemas.microsoft.com/office/drawing/2010/main" xmlns:ma14="http://schemas.microsoft.com/office/mac/drawingml/2011/main" val="1"/>
             </a:ext>
           </a:extLst>
         </p:spPr>
@@ -19995,7 +20034,7 @@
           </a:ln>
           <a:extLst>
             <a:ext uri="{C572A759-6A51-4108-AA02-DFA0A04FC94B}">
-              <ma14:wrappingTextBoxFlag xmlns:ma14="http://schemas.microsoft.com/office/mac/drawingml/2011/main" xmlns:a14="http://schemas.microsoft.com/office/drawing/2010/main" xmlns:m="http://schemas.openxmlformats.org/officeDocument/2006/math" xmlns="" val="1"/>
+              <ma14:wrappingTextBoxFlag xmlns="" xmlns:m="http://schemas.openxmlformats.org/officeDocument/2006/math" xmlns:a14="http://schemas.microsoft.com/office/drawing/2010/main" xmlns:ma14="http://schemas.microsoft.com/office/mac/drawingml/2011/main" val="1"/>
             </a:ext>
           </a:extLst>
         </p:spPr>
@@ -20165,7 +20204,7 @@
           </a:ln>
           <a:extLst>
             <a:ext uri="{C572A759-6A51-4108-AA02-DFA0A04FC94B}">
-              <ma14:wrappingTextBoxFlag xmlns:ma14="http://schemas.microsoft.com/office/mac/drawingml/2011/main" xmlns:a14="http://schemas.microsoft.com/office/drawing/2010/main" xmlns:m="http://schemas.openxmlformats.org/officeDocument/2006/math" xmlns="" val="1"/>
+              <ma14:wrappingTextBoxFlag xmlns="" xmlns:m="http://schemas.openxmlformats.org/officeDocument/2006/math" xmlns:a14="http://schemas.microsoft.com/office/drawing/2010/main" xmlns:ma14="http://schemas.microsoft.com/office/mac/drawingml/2011/main" val="1"/>
             </a:ext>
           </a:extLst>
         </p:spPr>
@@ -20281,7 +20320,7 @@
           </a:ln>
           <a:extLst>
             <a:ext uri="{C572A759-6A51-4108-AA02-DFA0A04FC94B}">
-              <ma14:wrappingTextBoxFlag xmlns:ma14="http://schemas.microsoft.com/office/mac/drawingml/2011/main" xmlns:a14="http://schemas.microsoft.com/office/drawing/2010/main" xmlns:m="http://schemas.openxmlformats.org/officeDocument/2006/math" xmlns="" val="1"/>
+              <ma14:wrappingTextBoxFlag xmlns="" xmlns:m="http://schemas.openxmlformats.org/officeDocument/2006/math" xmlns:a14="http://schemas.microsoft.com/office/drawing/2010/main" xmlns:ma14="http://schemas.microsoft.com/office/mac/drawingml/2011/main" val="1"/>
             </a:ext>
           </a:extLst>
         </p:spPr>
@@ -20379,7 +20418,7 @@
           </a:ln>
           <a:extLst>
             <a:ext uri="{C572A759-6A51-4108-AA02-DFA0A04FC94B}">
-              <ma14:wrappingTextBoxFlag xmlns:ma14="http://schemas.microsoft.com/office/mac/drawingml/2011/main" xmlns:a14="http://schemas.microsoft.com/office/drawing/2010/main" xmlns:m="http://schemas.openxmlformats.org/officeDocument/2006/math" xmlns="" val="1"/>
+              <ma14:wrappingTextBoxFlag xmlns="" xmlns:m="http://schemas.openxmlformats.org/officeDocument/2006/math" xmlns:a14="http://schemas.microsoft.com/office/drawing/2010/main" xmlns:ma14="http://schemas.microsoft.com/office/mac/drawingml/2011/main" val="1"/>
             </a:ext>
           </a:extLst>
         </p:spPr>
@@ -20602,7 +20641,7 @@
           </a:ln>
           <a:extLst>
             <a:ext uri="{C572A759-6A51-4108-AA02-DFA0A04FC94B}">
-              <ma14:wrappingTextBoxFlag xmlns:ma14="http://schemas.microsoft.com/office/mac/drawingml/2011/main" xmlns:a14="http://schemas.microsoft.com/office/drawing/2010/main" xmlns:m="http://schemas.openxmlformats.org/officeDocument/2006/math" xmlns="" val="1"/>
+              <ma14:wrappingTextBoxFlag xmlns="" xmlns:m="http://schemas.openxmlformats.org/officeDocument/2006/math" xmlns:a14="http://schemas.microsoft.com/office/drawing/2010/main" xmlns:ma14="http://schemas.microsoft.com/office/mac/drawingml/2011/main" val="1"/>
             </a:ext>
           </a:extLst>
         </p:spPr>
@@ -20732,7 +20771,7 @@
           </a:ln>
           <a:extLst>
             <a:ext uri="{C572A759-6A51-4108-AA02-DFA0A04FC94B}">
-              <ma14:wrappingTextBoxFlag xmlns:ma14="http://schemas.microsoft.com/office/mac/drawingml/2011/main" xmlns:a14="http://schemas.microsoft.com/office/drawing/2010/main" xmlns:m="http://schemas.openxmlformats.org/officeDocument/2006/math" xmlns="" val="1"/>
+              <ma14:wrappingTextBoxFlag xmlns="" xmlns:m="http://schemas.openxmlformats.org/officeDocument/2006/math" xmlns:a14="http://schemas.microsoft.com/office/drawing/2010/main" xmlns:ma14="http://schemas.microsoft.com/office/mac/drawingml/2011/main" val="1"/>
             </a:ext>
           </a:extLst>
         </p:spPr>
@@ -20895,7 +20934,7 @@
           </a:ln>
           <a:extLst>
             <a:ext uri="{C572A759-6A51-4108-AA02-DFA0A04FC94B}">
-              <ma14:wrappingTextBoxFlag xmlns:ma14="http://schemas.microsoft.com/office/mac/drawingml/2011/main" xmlns:a14="http://schemas.microsoft.com/office/drawing/2010/main" xmlns:m="http://schemas.openxmlformats.org/officeDocument/2006/math" xmlns="" val="1"/>
+              <ma14:wrappingTextBoxFlag xmlns="" xmlns:m="http://schemas.openxmlformats.org/officeDocument/2006/math" xmlns:a14="http://schemas.microsoft.com/office/drawing/2010/main" xmlns:ma14="http://schemas.microsoft.com/office/mac/drawingml/2011/main" val="1"/>
             </a:ext>
           </a:extLst>
         </p:spPr>
@@ -21023,7 +21062,7 @@
           </a:ln>
           <a:extLst>
             <a:ext uri="{C572A759-6A51-4108-AA02-DFA0A04FC94B}">
-              <ma14:wrappingTextBoxFlag xmlns:ma14="http://schemas.microsoft.com/office/mac/drawingml/2011/main" xmlns:a14="http://schemas.microsoft.com/office/drawing/2010/main" xmlns:m="http://schemas.openxmlformats.org/officeDocument/2006/math" xmlns="" val="1"/>
+              <ma14:wrappingTextBoxFlag xmlns="" xmlns:m="http://schemas.openxmlformats.org/officeDocument/2006/math" xmlns:a14="http://schemas.microsoft.com/office/drawing/2010/main" xmlns:ma14="http://schemas.microsoft.com/office/mac/drawingml/2011/main" val="1"/>
             </a:ext>
           </a:extLst>
         </p:spPr>
@@ -21151,7 +21190,7 @@
           </a:ln>
           <a:extLst>
             <a:ext uri="{C572A759-6A51-4108-AA02-DFA0A04FC94B}">
-              <ma14:wrappingTextBoxFlag xmlns:ma14="http://schemas.microsoft.com/office/mac/drawingml/2011/main" xmlns:a14="http://schemas.microsoft.com/office/drawing/2010/main" xmlns:m="http://schemas.openxmlformats.org/officeDocument/2006/math" xmlns="" val="1"/>
+              <ma14:wrappingTextBoxFlag xmlns="" xmlns:m="http://schemas.openxmlformats.org/officeDocument/2006/math" xmlns:a14="http://schemas.microsoft.com/office/drawing/2010/main" xmlns:ma14="http://schemas.microsoft.com/office/mac/drawingml/2011/main" val="1"/>
             </a:ext>
           </a:extLst>
         </p:spPr>
@@ -21268,7 +21307,7 @@
           </a:ln>
           <a:extLst>
             <a:ext uri="{C572A759-6A51-4108-AA02-DFA0A04FC94B}">
-              <ma14:wrappingTextBoxFlag xmlns:ma14="http://schemas.microsoft.com/office/mac/drawingml/2011/main" xmlns:a14="http://schemas.microsoft.com/office/drawing/2010/main" xmlns:m="http://schemas.openxmlformats.org/officeDocument/2006/math" xmlns="" val="1"/>
+              <ma14:wrappingTextBoxFlag xmlns="" xmlns:m="http://schemas.openxmlformats.org/officeDocument/2006/math" xmlns:a14="http://schemas.microsoft.com/office/drawing/2010/main" xmlns:ma14="http://schemas.microsoft.com/office/mac/drawingml/2011/main" val="1"/>
             </a:ext>
           </a:extLst>
         </p:spPr>
@@ -21403,7 +21442,7 @@
           </a:ln>
           <a:extLst>
             <a:ext uri="{C572A759-6A51-4108-AA02-DFA0A04FC94B}">
-              <ma14:wrappingTextBoxFlag xmlns:ma14="http://schemas.microsoft.com/office/mac/drawingml/2011/main" xmlns:a14="http://schemas.microsoft.com/office/drawing/2010/main" xmlns:m="http://schemas.openxmlformats.org/officeDocument/2006/math" xmlns="" val="1"/>
+              <ma14:wrappingTextBoxFlag xmlns="" xmlns:m="http://schemas.openxmlformats.org/officeDocument/2006/math" xmlns:a14="http://schemas.microsoft.com/office/drawing/2010/main" xmlns:ma14="http://schemas.microsoft.com/office/mac/drawingml/2011/main" val="1"/>
             </a:ext>
           </a:extLst>
         </p:spPr>
@@ -22907,7 +22946,7 @@
           </a:ln>
           <a:extLst>
             <a:ext uri="{C572A759-6A51-4108-AA02-DFA0A04FC94B}">
-              <ma14:wrappingTextBoxFlag xmlns:ma14="http://schemas.microsoft.com/office/mac/drawingml/2011/main" xmlns:a14="http://schemas.microsoft.com/office/drawing/2010/main" xmlns:m="http://schemas.openxmlformats.org/officeDocument/2006/math" xmlns="" val="1"/>
+              <ma14:wrappingTextBoxFlag xmlns="" xmlns:m="http://schemas.openxmlformats.org/officeDocument/2006/math" xmlns:a14="http://schemas.microsoft.com/office/drawing/2010/main" xmlns:ma14="http://schemas.microsoft.com/office/mac/drawingml/2011/main" val="1"/>
             </a:ext>
           </a:extLst>
         </p:spPr>
@@ -22951,7 +22990,7 @@
           </a:ln>
           <a:extLst>
             <a:ext uri="{C572A759-6A51-4108-AA02-DFA0A04FC94B}">
-              <ma14:wrappingTextBoxFlag xmlns="" xmlns:m="http://schemas.openxmlformats.org/officeDocument/2006/math" xmlns:a14="http://schemas.microsoft.com/office/drawing/2010/main" xmlns:ma14="http://schemas.microsoft.com/office/mac/drawingml/2011/main" val="1"/>
+              <ma14:wrappingTextBoxFlag xmlns:ma14="http://schemas.microsoft.com/office/mac/drawingml/2011/main" xmlns:a14="http://schemas.microsoft.com/office/drawing/2010/main" xmlns:m="http://schemas.openxmlformats.org/officeDocument/2006/math" xmlns="" val="1"/>
             </a:ext>
           </a:extLst>
         </p:spPr>
@@ -23155,7 +23194,7 @@
           </a:ln>
           <a:extLst>
             <a:ext uri="{C572A759-6A51-4108-AA02-DFA0A04FC94B}">
-              <ma14:wrappingTextBoxFlag xmlns:ma14="http://schemas.microsoft.com/office/mac/drawingml/2011/main" xmlns:a14="http://schemas.microsoft.com/office/drawing/2010/main" xmlns:m="http://schemas.openxmlformats.org/officeDocument/2006/math" xmlns="" val="1"/>
+              <ma14:wrappingTextBoxFlag xmlns="" xmlns:m="http://schemas.openxmlformats.org/officeDocument/2006/math" xmlns:a14="http://schemas.microsoft.com/office/drawing/2010/main" xmlns:ma14="http://schemas.microsoft.com/office/mac/drawingml/2011/main" val="1"/>
             </a:ext>
           </a:extLst>
         </p:spPr>
@@ -23249,7 +23288,7 @@
           </a:ln>
           <a:extLst>
             <a:ext uri="{C572A759-6A51-4108-AA02-DFA0A04FC94B}">
-              <ma14:wrappingTextBoxFlag xmlns:ma14="http://schemas.microsoft.com/office/mac/drawingml/2011/main" xmlns:a14="http://schemas.microsoft.com/office/drawing/2010/main" xmlns:m="http://schemas.openxmlformats.org/officeDocument/2006/math" xmlns="" val="1"/>
+              <ma14:wrappingTextBoxFlag xmlns="" xmlns:m="http://schemas.openxmlformats.org/officeDocument/2006/math" xmlns:a14="http://schemas.microsoft.com/office/drawing/2010/main" xmlns:ma14="http://schemas.microsoft.com/office/mac/drawingml/2011/main" val="1"/>
             </a:ext>
           </a:extLst>
         </p:spPr>
@@ -23343,7 +23382,7 @@
           </a:ln>
           <a:extLst>
             <a:ext uri="{C572A759-6A51-4108-AA02-DFA0A04FC94B}">
-              <ma14:wrappingTextBoxFlag xmlns:ma14="http://schemas.microsoft.com/office/mac/drawingml/2011/main" xmlns:a14="http://schemas.microsoft.com/office/drawing/2010/main" xmlns:m="http://schemas.openxmlformats.org/officeDocument/2006/math" xmlns="" val="1"/>
+              <ma14:wrappingTextBoxFlag xmlns="" xmlns:m="http://schemas.openxmlformats.org/officeDocument/2006/math" xmlns:a14="http://schemas.microsoft.com/office/drawing/2010/main" xmlns:ma14="http://schemas.microsoft.com/office/mac/drawingml/2011/main" val="1"/>
             </a:ext>
           </a:extLst>
         </p:spPr>
@@ -23473,7 +23512,7 @@
           </a:ln>
           <a:extLst>
             <a:ext uri="{C572A759-6A51-4108-AA02-DFA0A04FC94B}">
-              <ma14:wrappingTextBoxFlag xmlns="" xmlns:m="http://schemas.openxmlformats.org/officeDocument/2006/math" xmlns:a14="http://schemas.microsoft.com/office/drawing/2010/main" xmlns:ma14="http://schemas.microsoft.com/office/mac/drawingml/2011/main" val="1"/>
+              <ma14:wrappingTextBoxFlag xmlns:ma14="http://schemas.microsoft.com/office/mac/drawingml/2011/main" xmlns:a14="http://schemas.microsoft.com/office/drawing/2010/main" xmlns:m="http://schemas.openxmlformats.org/officeDocument/2006/math" xmlns="" val="1"/>
             </a:ext>
           </a:extLst>
         </p:spPr>
@@ -23764,6 +23803,89 @@
               <a:t> </a:t>
             </a:r>
             <a:endParaRPr lang="en-US" dirty="0"/>
+          </a:p>
+        </p:txBody>
+      </p:sp>
+      <p:sp>
+        <p:nvSpPr>
+          <p:cNvPr id="154" name="Rounded Rectangular Callout 153">
+            <a:extLst>
+              <a:ext uri="{FF2B5EF4-FFF2-40B4-BE49-F238E27FC236}">
+                <a16:creationId xmlns:a16="http://schemas.microsoft.com/office/drawing/2014/main" id="{61EBA4DB-7635-5A4C-68D1-9DBDCB4BF83C}"/>
+              </a:ext>
+            </a:extLst>
+          </p:cNvPr>
+          <p:cNvSpPr/>
+          <p:nvPr/>
+        </p:nvSpPr>
+        <p:spPr>
+          <a:xfrm>
+            <a:off x="12412194" y="8916738"/>
+            <a:ext cx="1436103" cy="530552"/>
+          </a:xfrm>
+          <a:prstGeom prst="wedgeRoundRectCallout">
+            <a:avLst>
+              <a:gd name="adj1" fmla="val -24239"/>
+              <a:gd name="adj2" fmla="val -66832"/>
+              <a:gd name="adj3" fmla="val 16667"/>
+            </a:avLst>
+          </a:prstGeom>
+          <a:solidFill>
+            <a:srgbClr val="65A0D5"/>
+          </a:solidFill>
+          <a:ln w="12700" cap="flat">
+            <a:noFill/>
+            <a:miter lim="400000"/>
+          </a:ln>
+          <a:effectLst/>
+          <a:sp3d/>
+        </p:spPr>
+        <p:style>
+          <a:lnRef idx="0">
+            <a:scrgbClr r="0" g="0" b="0"/>
+          </a:lnRef>
+          <a:fillRef idx="0">
+            <a:scrgbClr r="0" g="0" b="0"/>
+          </a:fillRef>
+          <a:effectRef idx="0">
+            <a:scrgbClr r="0" g="0" b="0"/>
+          </a:effectRef>
+          <a:fontRef idx="none"/>
+        </p:style>
+        <p:txBody>
+          <a:bodyPr rot="0" spcFirstLastPara="1" vertOverflow="overflow" horzOverflow="overflow" vert="horz" wrap="square" lIns="54570" tIns="54570" rIns="54570" bIns="54570" numCol="1" spcCol="38100" rtlCol="0" anchor="ctr">
+            <a:spAutoFit/>
+          </a:bodyPr>
+          <a:lstStyle/>
+          <a:p>
+            <a:pPr>
+              <a:spcBef>
+                <a:spcPts val="0"/>
+              </a:spcBef>
+            </a:pPr>
+            <a:r>
+              <a:rPr lang="en-US" dirty="0">
+                <a:solidFill>
+                  <a:schemeClr val="bg1"/>
+                </a:solidFill>
+              </a:rPr>
+              <a:t>T for a left join </a:t>
+            </a:r>
+          </a:p>
+          <a:p>
+            <a:pPr>
+              <a:spcBef>
+                <a:spcPts val="0"/>
+              </a:spcBef>
+            </a:pPr>
+            <a:r>
+              <a:rPr lang="en-US" dirty="0">
+                <a:solidFill>
+                  <a:schemeClr val="bg1"/>
+                </a:solidFill>
+              </a:rPr>
+              <a:t>F for an inner join</a:t>
+            </a:r>
           </a:p>
         </p:txBody>
       </p:sp>

</xml_diff>